<commit_message>
JDBC: Carregamento do driver, URL de conexão, DriverManager e Connection.
</commit_message>
<xml_diff>
--- a/2-Java-Programmer-Modulo-II/19.Capitulo11.pptx
+++ b/2-Java-Programmer-Modulo-II/19.Capitulo11.pptx
@@ -5,7 +5,7 @@
     <p:sldMasterId id="2147483660" r:id="rId1"/>
   </p:sldMasterIdLst>
   <p:notesMasterIdLst>
-    <p:notesMasterId r:id="rId22"/>
+    <p:notesMasterId r:id="rId28"/>
   </p:notesMasterIdLst>
   <p:sldIdLst>
     <p:sldId id="256" r:id="rId2"/>
@@ -21,13 +21,19 @@
     <p:sldId id="306" r:id="rId12"/>
     <p:sldId id="324" r:id="rId13"/>
     <p:sldId id="307" r:id="rId14"/>
-    <p:sldId id="308" r:id="rId15"/>
-    <p:sldId id="309" r:id="rId16"/>
-    <p:sldId id="310" r:id="rId17"/>
-    <p:sldId id="311" r:id="rId18"/>
-    <p:sldId id="312" r:id="rId19"/>
-    <p:sldId id="313" r:id="rId20"/>
-    <p:sldId id="314" r:id="rId21"/>
+    <p:sldId id="326" r:id="rId15"/>
+    <p:sldId id="328" r:id="rId16"/>
+    <p:sldId id="329" r:id="rId17"/>
+    <p:sldId id="327" r:id="rId18"/>
+    <p:sldId id="308" r:id="rId19"/>
+    <p:sldId id="330" r:id="rId20"/>
+    <p:sldId id="331" r:id="rId21"/>
+    <p:sldId id="309" r:id="rId22"/>
+    <p:sldId id="310" r:id="rId23"/>
+    <p:sldId id="311" r:id="rId24"/>
+    <p:sldId id="312" r:id="rId25"/>
+    <p:sldId id="313" r:id="rId26"/>
+    <p:sldId id="314" r:id="rId27"/>
   </p:sldIdLst>
   <p:sldSz cx="9144000" cy="6858000" type="screen4x3"/>
   <p:notesSz cx="6858000" cy="9144000"/>
@@ -268,7 +274,7 @@
               <a:pPr>
                 <a:defRPr/>
               </a:pPr>
-              <a:t>04/06/2012</a:t>
+              <a:t>05/06/2012</a:t>
             </a:fld>
             <a:endParaRPr lang="pt-BR"/>
           </a:p>
@@ -1776,6 +1782,528 @@
 </p:notes>
 </file>
 
+<file path=ppt/notesSlides/notesSlide21.xml><?xml version="1.0" encoding="utf-8"?>
+<p:notes xmlns:a="http://schemas.openxmlformats.org/drawingml/2006/main" xmlns:r="http://schemas.openxmlformats.org/officeDocument/2006/relationships" xmlns:p="http://schemas.openxmlformats.org/presentationml/2006/main">
+  <p:cSld>
+    <p:spTree>
+      <p:nvGrpSpPr>
+        <p:cNvPr id="1" name=""/>
+        <p:cNvGrpSpPr/>
+        <p:nvPr/>
+      </p:nvGrpSpPr>
+      <p:grpSpPr>
+        <a:xfrm>
+          <a:off x="0" y="0"/>
+          <a:ext cx="0" cy="0"/>
+          <a:chOff x="0" y="0"/>
+          <a:chExt cx="0" cy="0"/>
+        </a:xfrm>
+      </p:grpSpPr>
+      <p:sp>
+        <p:nvSpPr>
+          <p:cNvPr id="2" name="Espaço Reservado para Imagem de Slide 1"/>
+          <p:cNvSpPr>
+            <a:spLocks noGrp="1" noRot="1" noChangeAspect="1"/>
+          </p:cNvSpPr>
+          <p:nvPr>
+            <p:ph type="sldImg"/>
+          </p:nvPr>
+        </p:nvSpPr>
+        <p:spPr/>
+      </p:sp>
+      <p:sp>
+        <p:nvSpPr>
+          <p:cNvPr id="3" name="Espaço Reservado para Anotações 2"/>
+          <p:cNvSpPr>
+            <a:spLocks noGrp="1"/>
+          </p:cNvSpPr>
+          <p:nvPr>
+            <p:ph type="body" idx="1"/>
+          </p:nvPr>
+        </p:nvSpPr>
+        <p:spPr/>
+        <p:txBody>
+          <a:bodyPr>
+            <a:normAutofit/>
+          </a:bodyPr>
+          <a:lstStyle/>
+          <a:p>
+            <a:endParaRPr lang="pt-BR"/>
+          </a:p>
+        </p:txBody>
+      </p:sp>
+      <p:sp>
+        <p:nvSpPr>
+          <p:cNvPr id="4" name="Espaço Reservado para Número de Slide 3"/>
+          <p:cNvSpPr>
+            <a:spLocks noGrp="1"/>
+          </p:cNvSpPr>
+          <p:nvPr>
+            <p:ph type="sldNum" sz="quarter" idx="10"/>
+          </p:nvPr>
+        </p:nvSpPr>
+        <p:spPr/>
+        <p:txBody>
+          <a:bodyPr/>
+          <a:lstStyle/>
+          <a:p>
+            <a:pPr>
+              <a:defRPr/>
+            </a:pPr>
+            <a:fld id="{8E95BD27-5466-443F-B42B-02049F05E6C9}" type="slidenum">
+              <a:rPr lang="pt-BR" smtClean="0"/>
+              <a:pPr>
+                <a:defRPr/>
+              </a:pPr>
+              <a:t>21</a:t>
+            </a:fld>
+            <a:endParaRPr lang="pt-BR"/>
+          </a:p>
+        </p:txBody>
+      </p:sp>
+    </p:spTree>
+  </p:cSld>
+  <p:clrMapOvr>
+    <a:masterClrMapping/>
+  </p:clrMapOvr>
+</p:notes>
+</file>
+
+<file path=ppt/notesSlides/notesSlide22.xml><?xml version="1.0" encoding="utf-8"?>
+<p:notes xmlns:a="http://schemas.openxmlformats.org/drawingml/2006/main" xmlns:r="http://schemas.openxmlformats.org/officeDocument/2006/relationships" xmlns:p="http://schemas.openxmlformats.org/presentationml/2006/main">
+  <p:cSld>
+    <p:spTree>
+      <p:nvGrpSpPr>
+        <p:cNvPr id="1" name=""/>
+        <p:cNvGrpSpPr/>
+        <p:nvPr/>
+      </p:nvGrpSpPr>
+      <p:grpSpPr>
+        <a:xfrm>
+          <a:off x="0" y="0"/>
+          <a:ext cx="0" cy="0"/>
+          <a:chOff x="0" y="0"/>
+          <a:chExt cx="0" cy="0"/>
+        </a:xfrm>
+      </p:grpSpPr>
+      <p:sp>
+        <p:nvSpPr>
+          <p:cNvPr id="2" name="Espaço Reservado para Imagem de Slide 1"/>
+          <p:cNvSpPr>
+            <a:spLocks noGrp="1" noRot="1" noChangeAspect="1"/>
+          </p:cNvSpPr>
+          <p:nvPr>
+            <p:ph type="sldImg"/>
+          </p:nvPr>
+        </p:nvSpPr>
+        <p:spPr/>
+      </p:sp>
+      <p:sp>
+        <p:nvSpPr>
+          <p:cNvPr id="3" name="Espaço Reservado para Anotações 2"/>
+          <p:cNvSpPr>
+            <a:spLocks noGrp="1"/>
+          </p:cNvSpPr>
+          <p:nvPr>
+            <p:ph type="body" idx="1"/>
+          </p:nvPr>
+        </p:nvSpPr>
+        <p:spPr/>
+        <p:txBody>
+          <a:bodyPr>
+            <a:normAutofit/>
+          </a:bodyPr>
+          <a:lstStyle/>
+          <a:p>
+            <a:endParaRPr lang="pt-BR"/>
+          </a:p>
+        </p:txBody>
+      </p:sp>
+      <p:sp>
+        <p:nvSpPr>
+          <p:cNvPr id="4" name="Espaço Reservado para Número de Slide 3"/>
+          <p:cNvSpPr>
+            <a:spLocks noGrp="1"/>
+          </p:cNvSpPr>
+          <p:nvPr>
+            <p:ph type="sldNum" sz="quarter" idx="10"/>
+          </p:nvPr>
+        </p:nvSpPr>
+        <p:spPr/>
+        <p:txBody>
+          <a:bodyPr/>
+          <a:lstStyle/>
+          <a:p>
+            <a:pPr>
+              <a:defRPr/>
+            </a:pPr>
+            <a:fld id="{8E95BD27-5466-443F-B42B-02049F05E6C9}" type="slidenum">
+              <a:rPr lang="pt-BR" smtClean="0"/>
+              <a:pPr>
+                <a:defRPr/>
+              </a:pPr>
+              <a:t>22</a:t>
+            </a:fld>
+            <a:endParaRPr lang="pt-BR"/>
+          </a:p>
+        </p:txBody>
+      </p:sp>
+    </p:spTree>
+  </p:cSld>
+  <p:clrMapOvr>
+    <a:masterClrMapping/>
+  </p:clrMapOvr>
+</p:notes>
+</file>
+
+<file path=ppt/notesSlides/notesSlide23.xml><?xml version="1.0" encoding="utf-8"?>
+<p:notes xmlns:a="http://schemas.openxmlformats.org/drawingml/2006/main" xmlns:r="http://schemas.openxmlformats.org/officeDocument/2006/relationships" xmlns:p="http://schemas.openxmlformats.org/presentationml/2006/main">
+  <p:cSld>
+    <p:spTree>
+      <p:nvGrpSpPr>
+        <p:cNvPr id="1" name=""/>
+        <p:cNvGrpSpPr/>
+        <p:nvPr/>
+      </p:nvGrpSpPr>
+      <p:grpSpPr>
+        <a:xfrm>
+          <a:off x="0" y="0"/>
+          <a:ext cx="0" cy="0"/>
+          <a:chOff x="0" y="0"/>
+          <a:chExt cx="0" cy="0"/>
+        </a:xfrm>
+      </p:grpSpPr>
+      <p:sp>
+        <p:nvSpPr>
+          <p:cNvPr id="2" name="Espaço Reservado para Imagem de Slide 1"/>
+          <p:cNvSpPr>
+            <a:spLocks noGrp="1" noRot="1" noChangeAspect="1"/>
+          </p:cNvSpPr>
+          <p:nvPr>
+            <p:ph type="sldImg"/>
+          </p:nvPr>
+        </p:nvSpPr>
+        <p:spPr/>
+      </p:sp>
+      <p:sp>
+        <p:nvSpPr>
+          <p:cNvPr id="3" name="Espaço Reservado para Anotações 2"/>
+          <p:cNvSpPr>
+            <a:spLocks noGrp="1"/>
+          </p:cNvSpPr>
+          <p:nvPr>
+            <p:ph type="body" idx="1"/>
+          </p:nvPr>
+        </p:nvSpPr>
+        <p:spPr/>
+        <p:txBody>
+          <a:bodyPr>
+            <a:normAutofit/>
+          </a:bodyPr>
+          <a:lstStyle/>
+          <a:p>
+            <a:endParaRPr lang="pt-BR"/>
+          </a:p>
+        </p:txBody>
+      </p:sp>
+      <p:sp>
+        <p:nvSpPr>
+          <p:cNvPr id="4" name="Espaço Reservado para Número de Slide 3"/>
+          <p:cNvSpPr>
+            <a:spLocks noGrp="1"/>
+          </p:cNvSpPr>
+          <p:nvPr>
+            <p:ph type="sldNum" sz="quarter" idx="10"/>
+          </p:nvPr>
+        </p:nvSpPr>
+        <p:spPr/>
+        <p:txBody>
+          <a:bodyPr/>
+          <a:lstStyle/>
+          <a:p>
+            <a:pPr>
+              <a:defRPr/>
+            </a:pPr>
+            <a:fld id="{8E95BD27-5466-443F-B42B-02049F05E6C9}" type="slidenum">
+              <a:rPr lang="pt-BR" smtClean="0"/>
+              <a:pPr>
+                <a:defRPr/>
+              </a:pPr>
+              <a:t>23</a:t>
+            </a:fld>
+            <a:endParaRPr lang="pt-BR"/>
+          </a:p>
+        </p:txBody>
+      </p:sp>
+    </p:spTree>
+  </p:cSld>
+  <p:clrMapOvr>
+    <a:masterClrMapping/>
+  </p:clrMapOvr>
+</p:notes>
+</file>
+
+<file path=ppt/notesSlides/notesSlide24.xml><?xml version="1.0" encoding="utf-8"?>
+<p:notes xmlns:a="http://schemas.openxmlformats.org/drawingml/2006/main" xmlns:r="http://schemas.openxmlformats.org/officeDocument/2006/relationships" xmlns:p="http://schemas.openxmlformats.org/presentationml/2006/main">
+  <p:cSld>
+    <p:spTree>
+      <p:nvGrpSpPr>
+        <p:cNvPr id="1" name=""/>
+        <p:cNvGrpSpPr/>
+        <p:nvPr/>
+      </p:nvGrpSpPr>
+      <p:grpSpPr>
+        <a:xfrm>
+          <a:off x="0" y="0"/>
+          <a:ext cx="0" cy="0"/>
+          <a:chOff x="0" y="0"/>
+          <a:chExt cx="0" cy="0"/>
+        </a:xfrm>
+      </p:grpSpPr>
+      <p:sp>
+        <p:nvSpPr>
+          <p:cNvPr id="2" name="Espaço Reservado para Imagem de Slide 1"/>
+          <p:cNvSpPr>
+            <a:spLocks noGrp="1" noRot="1" noChangeAspect="1"/>
+          </p:cNvSpPr>
+          <p:nvPr>
+            <p:ph type="sldImg"/>
+          </p:nvPr>
+        </p:nvSpPr>
+        <p:spPr/>
+      </p:sp>
+      <p:sp>
+        <p:nvSpPr>
+          <p:cNvPr id="3" name="Espaço Reservado para Anotações 2"/>
+          <p:cNvSpPr>
+            <a:spLocks noGrp="1"/>
+          </p:cNvSpPr>
+          <p:nvPr>
+            <p:ph type="body" idx="1"/>
+          </p:nvPr>
+        </p:nvSpPr>
+        <p:spPr/>
+        <p:txBody>
+          <a:bodyPr>
+            <a:normAutofit/>
+          </a:bodyPr>
+          <a:lstStyle/>
+          <a:p>
+            <a:endParaRPr lang="pt-BR"/>
+          </a:p>
+        </p:txBody>
+      </p:sp>
+      <p:sp>
+        <p:nvSpPr>
+          <p:cNvPr id="4" name="Espaço Reservado para Número de Slide 3"/>
+          <p:cNvSpPr>
+            <a:spLocks noGrp="1"/>
+          </p:cNvSpPr>
+          <p:nvPr>
+            <p:ph type="sldNum" sz="quarter" idx="10"/>
+          </p:nvPr>
+        </p:nvSpPr>
+        <p:spPr/>
+        <p:txBody>
+          <a:bodyPr/>
+          <a:lstStyle/>
+          <a:p>
+            <a:pPr>
+              <a:defRPr/>
+            </a:pPr>
+            <a:fld id="{8E95BD27-5466-443F-B42B-02049F05E6C9}" type="slidenum">
+              <a:rPr lang="pt-BR" smtClean="0"/>
+              <a:pPr>
+                <a:defRPr/>
+              </a:pPr>
+              <a:t>24</a:t>
+            </a:fld>
+            <a:endParaRPr lang="pt-BR"/>
+          </a:p>
+        </p:txBody>
+      </p:sp>
+    </p:spTree>
+  </p:cSld>
+  <p:clrMapOvr>
+    <a:masterClrMapping/>
+  </p:clrMapOvr>
+</p:notes>
+</file>
+
+<file path=ppt/notesSlides/notesSlide25.xml><?xml version="1.0" encoding="utf-8"?>
+<p:notes xmlns:a="http://schemas.openxmlformats.org/drawingml/2006/main" xmlns:r="http://schemas.openxmlformats.org/officeDocument/2006/relationships" xmlns:p="http://schemas.openxmlformats.org/presentationml/2006/main">
+  <p:cSld>
+    <p:spTree>
+      <p:nvGrpSpPr>
+        <p:cNvPr id="1" name=""/>
+        <p:cNvGrpSpPr/>
+        <p:nvPr/>
+      </p:nvGrpSpPr>
+      <p:grpSpPr>
+        <a:xfrm>
+          <a:off x="0" y="0"/>
+          <a:ext cx="0" cy="0"/>
+          <a:chOff x="0" y="0"/>
+          <a:chExt cx="0" cy="0"/>
+        </a:xfrm>
+      </p:grpSpPr>
+      <p:sp>
+        <p:nvSpPr>
+          <p:cNvPr id="2" name="Espaço Reservado para Imagem de Slide 1"/>
+          <p:cNvSpPr>
+            <a:spLocks noGrp="1" noRot="1" noChangeAspect="1"/>
+          </p:cNvSpPr>
+          <p:nvPr>
+            <p:ph type="sldImg"/>
+          </p:nvPr>
+        </p:nvSpPr>
+        <p:spPr/>
+      </p:sp>
+      <p:sp>
+        <p:nvSpPr>
+          <p:cNvPr id="3" name="Espaço Reservado para Anotações 2"/>
+          <p:cNvSpPr>
+            <a:spLocks noGrp="1"/>
+          </p:cNvSpPr>
+          <p:nvPr>
+            <p:ph type="body" idx="1"/>
+          </p:nvPr>
+        </p:nvSpPr>
+        <p:spPr/>
+        <p:txBody>
+          <a:bodyPr>
+            <a:normAutofit/>
+          </a:bodyPr>
+          <a:lstStyle/>
+          <a:p>
+            <a:endParaRPr lang="pt-BR"/>
+          </a:p>
+        </p:txBody>
+      </p:sp>
+      <p:sp>
+        <p:nvSpPr>
+          <p:cNvPr id="4" name="Espaço Reservado para Número de Slide 3"/>
+          <p:cNvSpPr>
+            <a:spLocks noGrp="1"/>
+          </p:cNvSpPr>
+          <p:nvPr>
+            <p:ph type="sldNum" sz="quarter" idx="10"/>
+          </p:nvPr>
+        </p:nvSpPr>
+        <p:spPr/>
+        <p:txBody>
+          <a:bodyPr/>
+          <a:lstStyle/>
+          <a:p>
+            <a:pPr>
+              <a:defRPr/>
+            </a:pPr>
+            <a:fld id="{8E95BD27-5466-443F-B42B-02049F05E6C9}" type="slidenum">
+              <a:rPr lang="pt-BR" smtClean="0"/>
+              <a:pPr>
+                <a:defRPr/>
+              </a:pPr>
+              <a:t>25</a:t>
+            </a:fld>
+            <a:endParaRPr lang="pt-BR"/>
+          </a:p>
+        </p:txBody>
+      </p:sp>
+    </p:spTree>
+  </p:cSld>
+  <p:clrMapOvr>
+    <a:masterClrMapping/>
+  </p:clrMapOvr>
+</p:notes>
+</file>
+
+<file path=ppt/notesSlides/notesSlide26.xml><?xml version="1.0" encoding="utf-8"?>
+<p:notes xmlns:a="http://schemas.openxmlformats.org/drawingml/2006/main" xmlns:r="http://schemas.openxmlformats.org/officeDocument/2006/relationships" xmlns:p="http://schemas.openxmlformats.org/presentationml/2006/main">
+  <p:cSld>
+    <p:spTree>
+      <p:nvGrpSpPr>
+        <p:cNvPr id="1" name=""/>
+        <p:cNvGrpSpPr/>
+        <p:nvPr/>
+      </p:nvGrpSpPr>
+      <p:grpSpPr>
+        <a:xfrm>
+          <a:off x="0" y="0"/>
+          <a:ext cx="0" cy="0"/>
+          <a:chOff x="0" y="0"/>
+          <a:chExt cx="0" cy="0"/>
+        </a:xfrm>
+      </p:grpSpPr>
+      <p:sp>
+        <p:nvSpPr>
+          <p:cNvPr id="2" name="Espaço Reservado para Imagem de Slide 1"/>
+          <p:cNvSpPr>
+            <a:spLocks noGrp="1" noRot="1" noChangeAspect="1"/>
+          </p:cNvSpPr>
+          <p:nvPr>
+            <p:ph type="sldImg"/>
+          </p:nvPr>
+        </p:nvSpPr>
+        <p:spPr/>
+      </p:sp>
+      <p:sp>
+        <p:nvSpPr>
+          <p:cNvPr id="3" name="Espaço Reservado para Anotações 2"/>
+          <p:cNvSpPr>
+            <a:spLocks noGrp="1"/>
+          </p:cNvSpPr>
+          <p:nvPr>
+            <p:ph type="body" idx="1"/>
+          </p:nvPr>
+        </p:nvSpPr>
+        <p:spPr/>
+        <p:txBody>
+          <a:bodyPr>
+            <a:normAutofit/>
+          </a:bodyPr>
+          <a:lstStyle/>
+          <a:p>
+            <a:endParaRPr lang="pt-BR"/>
+          </a:p>
+        </p:txBody>
+      </p:sp>
+      <p:sp>
+        <p:nvSpPr>
+          <p:cNvPr id="4" name="Espaço Reservado para Número de Slide 3"/>
+          <p:cNvSpPr>
+            <a:spLocks noGrp="1"/>
+          </p:cNvSpPr>
+          <p:nvPr>
+            <p:ph type="sldNum" sz="quarter" idx="10"/>
+          </p:nvPr>
+        </p:nvSpPr>
+        <p:spPr/>
+        <p:txBody>
+          <a:bodyPr/>
+          <a:lstStyle/>
+          <a:p>
+            <a:pPr>
+              <a:defRPr/>
+            </a:pPr>
+            <a:fld id="{8E95BD27-5466-443F-B42B-02049F05E6C9}" type="slidenum">
+              <a:rPr lang="pt-BR" smtClean="0"/>
+              <a:pPr>
+                <a:defRPr/>
+              </a:pPr>
+              <a:t>26</a:t>
+            </a:fld>
+            <a:endParaRPr lang="pt-BR"/>
+          </a:p>
+        </p:txBody>
+      </p:sp>
+    </p:spTree>
+  </p:cSld>
+  <p:clrMapOvr>
+    <a:masterClrMapping/>
+  </p:clrMapOvr>
+</p:notes>
+</file>
+
 <file path=ppt/notesSlides/notesSlide3.xml><?xml version="1.0" encoding="utf-8"?>
 <p:notes xmlns:a="http://schemas.openxmlformats.org/drawingml/2006/main" xmlns:r="http://schemas.openxmlformats.org/officeDocument/2006/relationships" xmlns:p="http://schemas.openxmlformats.org/presentationml/2006/main">
   <p:cSld>
@@ -2814,7 +3342,10 @@
             </a:pPr>
             <a:fld id="{1DAF6B2A-72D4-40A7-A8DB-1F8AFAF179E0}" type="datetime1">
               <a:rPr lang="pt-BR" smtClean="0"/>
-              <a:t>04/06/2012</a:t>
+              <a:pPr>
+                <a:defRPr/>
+              </a:pPr>
+              <a:t>05/06/2012</a:t>
             </a:fld>
             <a:endParaRPr lang="pt-BR"/>
           </a:p>
@@ -3003,7 +3534,10 @@
             </a:pPr>
             <a:fld id="{728E43D4-B686-4A17-B98D-13D2A2B71264}" type="datetime1">
               <a:rPr lang="pt-BR" smtClean="0"/>
-              <a:t>04/06/2012</a:t>
+              <a:pPr>
+                <a:defRPr/>
+              </a:pPr>
+              <a:t>05/06/2012</a:t>
             </a:fld>
             <a:endParaRPr lang="pt-BR"/>
           </a:p>
@@ -3202,7 +3736,10 @@
             </a:pPr>
             <a:fld id="{5C3B0FA1-DD8C-4C58-9110-74CAFDB4FA6B}" type="datetime1">
               <a:rPr lang="pt-BR" smtClean="0"/>
-              <a:t>04/06/2012</a:t>
+              <a:pPr>
+                <a:defRPr/>
+              </a:pPr>
+              <a:t>05/06/2012</a:t>
             </a:fld>
             <a:endParaRPr lang="pt-BR"/>
           </a:p>
@@ -3395,7 +3932,10 @@
             </a:pPr>
             <a:fld id="{00332F67-E43B-48EC-921C-D58481EF2426}" type="datetime1">
               <a:rPr lang="pt-BR" smtClean="0"/>
-              <a:t>04/06/2012</a:t>
+              <a:pPr>
+                <a:defRPr/>
+              </a:pPr>
+              <a:t>05/06/2012</a:t>
             </a:fld>
             <a:endParaRPr lang="pt-BR"/>
           </a:p>
@@ -3898,7 +4438,10 @@
             </a:pPr>
             <a:fld id="{869D2C96-D510-48AB-8522-83DF1E67F73F}" type="datetime1">
               <a:rPr lang="pt-BR" smtClean="0"/>
-              <a:t>04/06/2012</a:t>
+              <a:pPr>
+                <a:defRPr/>
+              </a:pPr>
+              <a:t>05/06/2012</a:t>
             </a:fld>
             <a:endParaRPr lang="pt-BR"/>
           </a:p>
@@ -4186,7 +4729,10 @@
             </a:pPr>
             <a:fld id="{4FCD4D6D-64E4-4D19-B98A-5FADBCF295B2}" type="datetime1">
               <a:rPr lang="pt-BR" smtClean="0"/>
-              <a:t>04/06/2012</a:t>
+              <a:pPr>
+                <a:defRPr/>
+              </a:pPr>
+              <a:t>05/06/2012</a:t>
             </a:fld>
             <a:endParaRPr lang="pt-BR"/>
           </a:p>
@@ -4584,7 +5130,10 @@
             </a:pPr>
             <a:fld id="{BD11C8DA-5B70-43FF-9549-C4CF6408C37C}" type="datetime1">
               <a:rPr lang="pt-BR" smtClean="0"/>
-              <a:t>04/06/2012</a:t>
+              <a:pPr>
+                <a:defRPr/>
+              </a:pPr>
+              <a:t>05/06/2012</a:t>
             </a:fld>
             <a:endParaRPr lang="pt-BR"/>
           </a:p>
@@ -4730,7 +5279,10 @@
             </a:pPr>
             <a:fld id="{E8BD7EBF-039A-413C-9379-0A9C36AA08C3}" type="datetime1">
               <a:rPr lang="pt-BR" smtClean="0"/>
-              <a:t>04/06/2012</a:t>
+              <a:pPr>
+                <a:defRPr/>
+              </a:pPr>
+              <a:t>05/06/2012</a:t>
             </a:fld>
             <a:endParaRPr lang="pt-BR"/>
           </a:p>
@@ -4844,7 +5396,10 @@
             </a:pPr>
             <a:fld id="{C6ABC476-E72E-41E1-B28A-890D38BC1A7B}" type="datetime1">
               <a:rPr lang="pt-BR" smtClean="0"/>
-              <a:t>04/06/2012</a:t>
+              <a:pPr>
+                <a:defRPr/>
+              </a:pPr>
+              <a:t>05/06/2012</a:t>
             </a:fld>
             <a:endParaRPr lang="pt-BR"/>
           </a:p>
@@ -5117,7 +5672,10 @@
             </a:pPr>
             <a:fld id="{8B780ADF-7D7B-4A28-9713-852E804F9466}" type="datetime1">
               <a:rPr lang="pt-BR" smtClean="0"/>
-              <a:t>04/06/2012</a:t>
+              <a:pPr>
+                <a:defRPr/>
+              </a:pPr>
+              <a:t>05/06/2012</a:t>
             </a:fld>
             <a:endParaRPr lang="pt-BR"/>
           </a:p>
@@ -5398,7 +5956,10 @@
             </a:pPr>
             <a:fld id="{752069B9-BF1D-4D2E-9A29-7861246DDC14}" type="datetime1">
               <a:rPr lang="pt-BR" smtClean="0"/>
-              <a:t>04/06/2012</a:t>
+              <a:pPr>
+                <a:defRPr/>
+              </a:pPr>
+              <a:t>05/06/2012</a:t>
             </a:fld>
             <a:endParaRPr lang="pt-BR"/>
           </a:p>
@@ -5873,7 +6434,10 @@
             </a:pPr>
             <a:fld id="{04A9998F-BBF5-43E3-95B4-6D5601814F68}" type="datetime1">
               <a:rPr lang="pt-BR" smtClean="0"/>
-              <a:t>04/06/2012</a:t>
+              <a:pPr>
+                <a:defRPr/>
+              </a:pPr>
+              <a:t>05/06/2012</a:t>
             </a:fld>
             <a:endParaRPr lang="pt-BR"/>
           </a:p>
@@ -6940,8 +7504,8 @@
           </p:nvPr>
         </p:nvGraphicFramePr>
         <p:xfrm>
-          <a:off x="755576" y="4077072"/>
-          <a:ext cx="1728192" cy="548640"/>
+          <a:off x="755576" y="3429000"/>
+          <a:ext cx="1944216" cy="936104"/>
         </p:xfrm>
         <a:graphic>
           <a:graphicData uri="http://schemas.openxmlformats.org/drawingml/2006/table">
@@ -6950,9 +7514,9 @@
                 <a:tableStyleId>{5C22544A-7EE6-4342-B048-85BDC9FD1C3A}</a:tableStyleId>
               </a:tblPr>
               <a:tblGrid>
-                <a:gridCol w="1728192"/>
+                <a:gridCol w="1944216"/>
               </a:tblGrid>
-              <a:tr h="137303">
+              <a:tr h="206022">
                 <a:tc>
                   <a:txBody>
                     <a:bodyPr/>
@@ -7021,7 +7585,7 @@
                   </a:tcPr>
                 </a:tc>
               </a:tr>
-              <a:tr h="222737">
+              <a:tr h="661784">
                 <a:tc>
                   <a:txBody>
                     <a:bodyPr/>
@@ -7090,8 +7654,8 @@
           </p:nvPr>
         </p:nvGraphicFramePr>
         <p:xfrm>
-          <a:off x="3707904" y="2636912"/>
-          <a:ext cx="1656184" cy="548640"/>
+          <a:off x="3635896" y="1844824"/>
+          <a:ext cx="1944216" cy="936104"/>
         </p:xfrm>
         <a:graphic>
           <a:graphicData uri="http://schemas.openxmlformats.org/drawingml/2006/table">
@@ -7100,9 +7664,9 @@
                 <a:tableStyleId>{5C22544A-7EE6-4342-B048-85BDC9FD1C3A}</a:tableStyleId>
               </a:tblPr>
               <a:tblGrid>
-                <a:gridCol w="1656184"/>
+                <a:gridCol w="1944216"/>
               </a:tblGrid>
-              <a:tr h="161721">
+              <a:tr h="255223">
                 <a:tc>
                   <a:txBody>
                     <a:bodyPr/>
@@ -7171,7 +7735,7 @@
                   </a:tcPr>
                 </a:tc>
               </a:tr>
-              <a:tr h="262347">
+              <a:tr h="661784">
                 <a:tc>
                   <a:txBody>
                     <a:bodyPr/>
@@ -7240,8 +7804,8 @@
           </p:nvPr>
         </p:nvGraphicFramePr>
         <p:xfrm>
-          <a:off x="6516216" y="4005064"/>
-          <a:ext cx="1800200" cy="665480"/>
+          <a:off x="6516216" y="5013176"/>
+          <a:ext cx="1944216" cy="956005"/>
         </p:xfrm>
         <a:graphic>
           <a:graphicData uri="http://schemas.openxmlformats.org/drawingml/2006/table">
@@ -7250,9 +7814,9 @@
                 <a:tableStyleId>{5C22544A-7EE6-4342-B048-85BDC9FD1C3A}</a:tableStyleId>
               </a:tblPr>
               <a:tblGrid>
-                <a:gridCol w="1800200"/>
+                <a:gridCol w="1944216"/>
               </a:tblGrid>
-              <a:tr h="175913">
+              <a:tr h="260363">
                 <a:tc>
                   <a:txBody>
                     <a:bodyPr/>
@@ -7375,7 +7939,7 @@
                   </a:tcPr>
                 </a:tc>
               </a:tr>
-              <a:tr h="0">
+              <a:tr h="564845">
                 <a:tc>
                   <a:txBody>
                     <a:bodyPr/>
@@ -7444,8 +8008,8 @@
           </p:nvPr>
         </p:nvGraphicFramePr>
         <p:xfrm>
-          <a:off x="755576" y="2780928"/>
-          <a:ext cx="1728192" cy="665480"/>
+          <a:off x="755576" y="1844825"/>
+          <a:ext cx="1944216" cy="954334"/>
         </p:xfrm>
         <a:graphic>
           <a:graphicData uri="http://schemas.openxmlformats.org/drawingml/2006/table">
@@ -7454,9 +8018,9 @@
                 <a:tableStyleId>{5C22544A-7EE6-4342-B048-85BDC9FD1C3A}</a:tableStyleId>
               </a:tblPr>
               <a:tblGrid>
-                <a:gridCol w="1728192"/>
+                <a:gridCol w="1944216"/>
               </a:tblGrid>
-              <a:tr h="136545">
+              <a:tr h="261535">
                 <a:tc>
                   <a:txBody>
                     <a:bodyPr/>
@@ -7579,7 +8143,7 @@
                   </a:tcPr>
                 </a:tc>
               </a:tr>
-              <a:tr h="221506">
+              <a:tr h="563174">
                 <a:tc>
                   <a:txBody>
                     <a:bodyPr/>
@@ -7646,8 +8210,8 @@
           <p:nvPr/>
         </p:nvGraphicFramePr>
         <p:xfrm>
-          <a:off x="3707904" y="3446408"/>
-          <a:ext cx="1656184" cy="548640"/>
+          <a:off x="3635896" y="3429000"/>
+          <a:ext cx="1944216" cy="936104"/>
         </p:xfrm>
         <a:graphic>
           <a:graphicData uri="http://schemas.openxmlformats.org/drawingml/2006/table">
@@ -7656,9 +8220,9 @@
                 <a:tableStyleId>{5C22544A-7EE6-4342-B048-85BDC9FD1C3A}</a:tableStyleId>
               </a:tblPr>
               <a:tblGrid>
-                <a:gridCol w="1656184"/>
+                <a:gridCol w="1944216"/>
               </a:tblGrid>
-              <a:tr h="218987">
+              <a:tr h="144016">
                 <a:tc>
                   <a:txBody>
                     <a:bodyPr/>
@@ -7721,7 +8285,7 @@
                   </a:tcPr>
                 </a:tc>
               </a:tr>
-              <a:tr h="201123">
+              <a:tr h="661784">
                 <a:tc>
                   <a:txBody>
                     <a:bodyPr/>
@@ -7791,8 +8355,8 @@
           <p:nvPr/>
         </p:nvGraphicFramePr>
         <p:xfrm>
-          <a:off x="3707904" y="4221088"/>
-          <a:ext cx="1656184" cy="548640"/>
+          <a:off x="3635896" y="5013176"/>
+          <a:ext cx="1944216" cy="936104"/>
         </p:xfrm>
         <a:graphic>
           <a:graphicData uri="http://schemas.openxmlformats.org/drawingml/2006/table">
@@ -7801,9 +8365,9 @@
                 <a:tableStyleId>{5C22544A-7EE6-4342-B048-85BDC9FD1C3A}</a:tableStyleId>
               </a:tblPr>
               <a:tblGrid>
-                <a:gridCol w="1656184"/>
+                <a:gridCol w="1944216"/>
               </a:tblGrid>
-              <a:tr h="220104">
+              <a:tr h="216024">
                 <a:tc>
                   <a:txBody>
                     <a:bodyPr/>
@@ -7872,7 +8436,7 @@
                   </a:tcPr>
                 </a:tc>
               </a:tr>
-              <a:tr h="131440">
+              <a:tr h="661784">
                 <a:tc>
                   <a:txBody>
                     <a:bodyPr/>
@@ -7932,184 +8496,14 @@
       </p:graphicFrame>
       <p:grpSp>
         <p:nvGrpSpPr>
-          <p:cNvPr id="2" name="Group 43"/>
-          <p:cNvGrpSpPr/>
-          <p:nvPr/>
-        </p:nvGrpSpPr>
-        <p:grpSpPr>
-          <a:xfrm>
-            <a:off x="-1404664" y="1772816"/>
-            <a:ext cx="1071570" cy="285752"/>
-            <a:chOff x="857224" y="2143116"/>
-            <a:chExt cx="714379" cy="428628"/>
-          </a:xfrm>
-        </p:grpSpPr>
-        <p:cxnSp>
-          <p:nvCxnSpPr>
-            <p:cNvPr id="31" name="Conector de seta reta 22"/>
-            <p:cNvCxnSpPr>
-              <a:cxnSpLocks noChangeShapeType="1"/>
-            </p:cNvCxnSpPr>
-            <p:nvPr/>
-          </p:nvCxnSpPr>
-          <p:spPr bwMode="auto">
-            <a:xfrm>
-              <a:off x="857224" y="2143116"/>
-              <a:ext cx="714379" cy="1"/>
-            </a:xfrm>
-            <a:prstGeom prst="straightConnector1">
-              <a:avLst/>
-            </a:prstGeom>
-            <a:noFill/>
-            <a:ln w="28575" algn="ctr">
-              <a:solidFill>
-                <a:srgbClr val="FFC000"/>
-              </a:solidFill>
-              <a:prstDash val="solid"/>
-              <a:round/>
-              <a:headEnd/>
-              <a:tailEnd type="triangle" w="lg" len="lg"/>
-            </a:ln>
-          </p:spPr>
-        </p:cxnSp>
-        <p:cxnSp>
-          <p:nvCxnSpPr>
-            <p:cNvPr id="35" name="Conector de seta reta 22"/>
-            <p:cNvCxnSpPr>
-              <a:cxnSpLocks noChangeShapeType="1"/>
-            </p:cNvCxnSpPr>
-            <p:nvPr/>
-          </p:nvCxnSpPr>
-          <p:spPr bwMode="auto">
-            <a:xfrm rot="5400000" flipH="1" flipV="1">
-              <a:off x="643704" y="2356636"/>
-              <a:ext cx="428628" cy="1588"/>
-            </a:xfrm>
-            <a:prstGeom prst="straightConnector1">
-              <a:avLst/>
-            </a:prstGeom>
-            <a:noFill/>
-            <a:ln w="28575" algn="ctr">
-              <a:solidFill>
-                <a:srgbClr val="FFC000"/>
-              </a:solidFill>
-              <a:prstDash val="solid"/>
-              <a:round/>
-              <a:headEnd type="none" w="med" len="med"/>
-              <a:tailEnd type="none" w="med" len="med"/>
-            </a:ln>
-          </p:spPr>
-        </p:cxnSp>
-      </p:grpSp>
-      <p:grpSp>
-        <p:nvGrpSpPr>
-          <p:cNvPr id="10" name="Group 61"/>
-          <p:cNvGrpSpPr/>
-          <p:nvPr/>
-        </p:nvGrpSpPr>
-        <p:grpSpPr>
-          <a:xfrm>
-            <a:off x="9828584" y="332656"/>
-            <a:ext cx="214317" cy="1347797"/>
-            <a:chOff x="2857487" y="3286125"/>
-            <a:chExt cx="214317" cy="1347797"/>
-          </a:xfrm>
-        </p:grpSpPr>
-        <p:cxnSp>
-          <p:nvCxnSpPr>
-            <p:cNvPr id="58" name="Conector de seta reta 22"/>
-            <p:cNvCxnSpPr>
-              <a:cxnSpLocks noChangeShapeType="1"/>
-            </p:cNvCxnSpPr>
-            <p:nvPr/>
-          </p:nvCxnSpPr>
-          <p:spPr bwMode="auto">
-            <a:xfrm rot="5400000" flipH="1" flipV="1">
-              <a:off x="2505060" y="3638552"/>
-              <a:ext cx="704856" cy="1"/>
-            </a:xfrm>
-            <a:prstGeom prst="straightConnector1">
-              <a:avLst/>
-            </a:prstGeom>
-            <a:noFill/>
-            <a:ln w="28575" algn="ctr">
-              <a:solidFill>
-                <a:schemeClr val="tx1"/>
-              </a:solidFill>
-              <a:prstDash val="dash"/>
-              <a:round/>
-              <a:headEnd type="none" w="med" len="med"/>
-              <a:tailEnd type="arrow" w="med" len="med"/>
-            </a:ln>
-          </p:spPr>
-        </p:cxnSp>
-        <p:cxnSp>
-          <p:nvCxnSpPr>
-            <p:cNvPr id="59" name="Conector de seta reta 22"/>
-            <p:cNvCxnSpPr>
-              <a:cxnSpLocks noChangeShapeType="1"/>
-            </p:cNvCxnSpPr>
-            <p:nvPr/>
-          </p:nvCxnSpPr>
-          <p:spPr bwMode="auto">
-            <a:xfrm rot="10800000">
-              <a:off x="2857488" y="3989413"/>
-              <a:ext cx="214314" cy="1567"/>
-            </a:xfrm>
-            <a:prstGeom prst="straightConnector1">
-              <a:avLst/>
-            </a:prstGeom>
-            <a:noFill/>
-            <a:ln w="28575" algn="ctr">
-              <a:solidFill>
-                <a:schemeClr val="tx1"/>
-              </a:solidFill>
-              <a:prstDash val="dash"/>
-              <a:round/>
-              <a:headEnd type="none" w="med" len="med"/>
-              <a:tailEnd type="none" w="med" len="med"/>
-            </a:ln>
-          </p:spPr>
-        </p:cxnSp>
-        <p:cxnSp>
-          <p:nvCxnSpPr>
-            <p:cNvPr id="60" name="Conector de seta reta 22"/>
-            <p:cNvCxnSpPr>
-              <a:cxnSpLocks noChangeShapeType="1"/>
-            </p:cNvCxnSpPr>
-            <p:nvPr/>
-          </p:nvCxnSpPr>
-          <p:spPr bwMode="auto">
-            <a:xfrm rot="5400000" flipH="1" flipV="1">
-              <a:off x="2755094" y="4317212"/>
-              <a:ext cx="633418" cy="2"/>
-            </a:xfrm>
-            <a:prstGeom prst="straightConnector1">
-              <a:avLst/>
-            </a:prstGeom>
-            <a:noFill/>
-            <a:ln w="28575" algn="ctr">
-              <a:solidFill>
-                <a:schemeClr val="tx1"/>
-              </a:solidFill>
-              <a:prstDash val="dash"/>
-              <a:round/>
-              <a:headEnd type="none" w="med" len="med"/>
-              <a:tailEnd type="none" w="med" len="med"/>
-            </a:ln>
-          </p:spPr>
-        </p:cxnSp>
-      </p:grpSp>
-      <p:grpSp>
-        <p:nvGrpSpPr>
           <p:cNvPr id="11" name="Group 62"/>
           <p:cNvGrpSpPr/>
           <p:nvPr/>
         </p:nvGrpSpPr>
         <p:grpSpPr>
-          <a:xfrm flipH="1">
-            <a:off x="-1260648" y="2780928"/>
-            <a:ext cx="714380" cy="428627"/>
+          <a:xfrm rot="16200000" flipH="1">
+            <a:off x="2555777" y="4437111"/>
+            <a:ext cx="1296145" cy="864099"/>
             <a:chOff x="2857487" y="3286125"/>
             <a:chExt cx="214317" cy="1347797"/>
           </a:xfrm>
@@ -8138,7 +8532,7 @@
               <a:prstDash val="solid"/>
               <a:round/>
               <a:headEnd/>
-              <a:tailEnd type="triangle" w="lg" len="lg"/>
+              <a:tailEnd type="diamond" w="lg" len="lg"/>
             </a:ln>
           </p:spPr>
         </p:cxnSp>
@@ -8199,77 +8593,6 @@
           </p:spPr>
         </p:cxnSp>
       </p:grpSp>
-      <p:grpSp>
-        <p:nvGrpSpPr>
-          <p:cNvPr id="12" name="Group 69"/>
-          <p:cNvGrpSpPr/>
-          <p:nvPr/>
-        </p:nvGrpSpPr>
-        <p:grpSpPr>
-          <a:xfrm flipH="1">
-            <a:off x="9396536" y="3501008"/>
-            <a:ext cx="1143008" cy="571504"/>
-            <a:chOff x="857224" y="2143116"/>
-            <a:chExt cx="714379" cy="428628"/>
-          </a:xfrm>
-        </p:grpSpPr>
-        <p:cxnSp>
-          <p:nvCxnSpPr>
-            <p:cNvPr id="71" name="Conector de seta reta 22"/>
-            <p:cNvCxnSpPr>
-              <a:cxnSpLocks noChangeShapeType="1"/>
-            </p:cNvCxnSpPr>
-            <p:nvPr/>
-          </p:nvCxnSpPr>
-          <p:spPr bwMode="auto">
-            <a:xfrm>
-              <a:off x="857224" y="2143116"/>
-              <a:ext cx="714379" cy="1"/>
-            </a:xfrm>
-            <a:prstGeom prst="straightConnector1">
-              <a:avLst/>
-            </a:prstGeom>
-            <a:noFill/>
-            <a:ln w="28575" algn="ctr">
-              <a:solidFill>
-                <a:schemeClr val="tx1"/>
-              </a:solidFill>
-              <a:prstDash val="dash"/>
-              <a:round/>
-              <a:headEnd type="none" w="med" len="med"/>
-              <a:tailEnd type="arrow" w="med" len="med"/>
-            </a:ln>
-          </p:spPr>
-        </p:cxnSp>
-        <p:cxnSp>
-          <p:nvCxnSpPr>
-            <p:cNvPr id="72" name="Conector de seta reta 22"/>
-            <p:cNvCxnSpPr>
-              <a:cxnSpLocks noChangeShapeType="1"/>
-            </p:cNvCxnSpPr>
-            <p:nvPr/>
-          </p:nvCxnSpPr>
-          <p:spPr bwMode="auto">
-            <a:xfrm rot="5400000" flipH="1" flipV="1">
-              <a:off x="643704" y="2356636"/>
-              <a:ext cx="428628" cy="1588"/>
-            </a:xfrm>
-            <a:prstGeom prst="straightConnector1">
-              <a:avLst/>
-            </a:prstGeom>
-            <a:noFill/>
-            <a:ln w="28575" algn="ctr">
-              <a:solidFill>
-                <a:schemeClr val="tx1"/>
-              </a:solidFill>
-              <a:prstDash val="dash"/>
-              <a:round/>
-              <a:headEnd type="none" w="med" len="med"/>
-              <a:tailEnd type="none" w="med" len="med"/>
-            </a:ln>
-          </p:spPr>
-        </p:cxnSp>
-      </p:grpSp>
       <p:cxnSp>
         <p:nvCxnSpPr>
           <p:cNvPr id="76" name="Conector de seta reta 22"/>
@@ -8280,8 +8603,8 @@
         </p:nvCxnSpPr>
         <p:spPr bwMode="auto">
           <a:xfrm flipV="1">
-            <a:off x="9972600" y="2564904"/>
-            <a:ext cx="0" cy="543446"/>
+            <a:off x="1763688" y="2852936"/>
+            <a:ext cx="0" cy="576064"/>
           </a:xfrm>
           <a:prstGeom prst="straightConnector1">
             <a:avLst/>
@@ -8294,7 +8617,7 @@
             <a:prstDash val="solid"/>
             <a:round/>
             <a:headEnd/>
-            <a:tailEnd type="triangle" w="lg" len="lg"/>
+            <a:tailEnd type="diamond" w="lg" len="lg"/>
           </a:ln>
         </p:spPr>
       </p:cxnSp>
@@ -8307,8 +8630,8 @@
           <p:nvPr/>
         </p:nvGraphicFramePr>
         <p:xfrm>
-          <a:off x="6516216" y="2835528"/>
-          <a:ext cx="1800200" cy="548640"/>
+          <a:off x="6516216" y="3429000"/>
+          <a:ext cx="1944216" cy="936104"/>
         </p:xfrm>
         <a:graphic>
           <a:graphicData uri="http://schemas.openxmlformats.org/drawingml/2006/table">
@@ -8317,9 +8640,9 @@
                 <a:tableStyleId>{5C22544A-7EE6-4342-B048-85BDC9FD1C3A}</a:tableStyleId>
               </a:tblPr>
               <a:tblGrid>
-                <a:gridCol w="1800200"/>
+                <a:gridCol w="1944216"/>
               </a:tblGrid>
-              <a:tr h="220104">
+              <a:tr h="200238">
                 <a:tc>
                   <a:txBody>
                     <a:bodyPr/>
@@ -8388,7 +8711,7 @@
                   </a:tcPr>
                 </a:tc>
               </a:tr>
-              <a:tr h="131440">
+              <a:tr h="661784">
                 <a:tc>
                   <a:txBody>
                     <a:bodyPr/>
@@ -8446,6 +8769,505 @@
           </a:graphicData>
         </a:graphic>
       </p:graphicFrame>
+      <p:cxnSp>
+        <p:nvCxnSpPr>
+          <p:cNvPr id="26" name="Conector de seta reta 22"/>
+          <p:cNvCxnSpPr>
+            <a:cxnSpLocks noChangeShapeType="1"/>
+          </p:cNvCxnSpPr>
+          <p:nvPr/>
+        </p:nvCxnSpPr>
+        <p:spPr bwMode="auto">
+          <a:xfrm flipV="1">
+            <a:off x="4644008" y="2780928"/>
+            <a:ext cx="0" cy="648072"/>
+          </a:xfrm>
+          <a:prstGeom prst="straightConnector1">
+            <a:avLst/>
+          </a:prstGeom>
+          <a:noFill/>
+          <a:ln w="28575" algn="ctr">
+            <a:solidFill>
+              <a:srgbClr val="FFC000"/>
+            </a:solidFill>
+            <a:prstDash val="solid"/>
+            <a:round/>
+            <a:headEnd/>
+            <a:tailEnd type="triangle" w="lg" len="lg"/>
+          </a:ln>
+        </p:spPr>
+      </p:cxnSp>
+      <p:cxnSp>
+        <p:nvCxnSpPr>
+          <p:cNvPr id="28" name="Conector de seta reta 22"/>
+          <p:cNvCxnSpPr>
+            <a:cxnSpLocks noChangeShapeType="1"/>
+          </p:cNvCxnSpPr>
+          <p:nvPr/>
+        </p:nvCxnSpPr>
+        <p:spPr bwMode="auto">
+          <a:xfrm flipV="1">
+            <a:off x="4644008" y="4365104"/>
+            <a:ext cx="0" cy="648072"/>
+          </a:xfrm>
+          <a:prstGeom prst="straightConnector1">
+            <a:avLst/>
+          </a:prstGeom>
+          <a:noFill/>
+          <a:ln w="28575" algn="ctr">
+            <a:solidFill>
+              <a:srgbClr val="FFC000"/>
+            </a:solidFill>
+            <a:prstDash val="solid"/>
+            <a:round/>
+            <a:headEnd/>
+            <a:tailEnd type="triangle" w="lg" len="lg"/>
+          </a:ln>
+        </p:spPr>
+      </p:cxnSp>
+      <p:cxnSp>
+        <p:nvCxnSpPr>
+          <p:cNvPr id="34" name="Conector de seta reta 22"/>
+          <p:cNvCxnSpPr>
+            <a:cxnSpLocks noChangeShapeType="1"/>
+          </p:cNvCxnSpPr>
+          <p:nvPr/>
+        </p:nvCxnSpPr>
+        <p:spPr bwMode="auto">
+          <a:xfrm flipH="1">
+            <a:off x="2771800" y="3933056"/>
+            <a:ext cx="864096" cy="0"/>
+          </a:xfrm>
+          <a:prstGeom prst="straightConnector1">
+            <a:avLst/>
+          </a:prstGeom>
+          <a:noFill/>
+          <a:ln w="28575" algn="ctr">
+            <a:solidFill>
+              <a:srgbClr val="FFC000"/>
+            </a:solidFill>
+            <a:prstDash val="solid"/>
+            <a:round/>
+            <a:headEnd/>
+            <a:tailEnd type="diamond" w="lg" len="lg"/>
+          </a:ln>
+        </p:spPr>
+      </p:cxnSp>
+      <p:grpSp>
+        <p:nvGrpSpPr>
+          <p:cNvPr id="41" name="Group 62"/>
+          <p:cNvGrpSpPr/>
+          <p:nvPr/>
+        </p:nvGrpSpPr>
+        <p:grpSpPr>
+          <a:xfrm rot="16200000">
+            <a:off x="2555779" y="2564905"/>
+            <a:ext cx="1296144" cy="864096"/>
+            <a:chOff x="2857487" y="3286125"/>
+            <a:chExt cx="214317" cy="1347797"/>
+          </a:xfrm>
+        </p:grpSpPr>
+        <p:cxnSp>
+          <p:nvCxnSpPr>
+            <p:cNvPr id="43" name="Conector de seta reta 22"/>
+            <p:cNvCxnSpPr>
+              <a:cxnSpLocks noChangeShapeType="1"/>
+            </p:cNvCxnSpPr>
+            <p:nvPr/>
+          </p:nvCxnSpPr>
+          <p:spPr bwMode="auto">
+            <a:xfrm rot="5400000" flipH="1" flipV="1">
+              <a:off x="2505060" y="3638552"/>
+              <a:ext cx="704856" cy="1"/>
+            </a:xfrm>
+            <a:prstGeom prst="straightConnector1">
+              <a:avLst/>
+            </a:prstGeom>
+            <a:noFill/>
+            <a:ln w="28575" algn="ctr">
+              <a:solidFill>
+                <a:srgbClr val="FFC000"/>
+              </a:solidFill>
+              <a:prstDash val="solid"/>
+              <a:round/>
+              <a:headEnd/>
+              <a:tailEnd type="diamond" w="lg" len="lg"/>
+            </a:ln>
+          </p:spPr>
+        </p:cxnSp>
+        <p:cxnSp>
+          <p:nvCxnSpPr>
+            <p:cNvPr id="44" name="Conector de seta reta 22"/>
+            <p:cNvCxnSpPr>
+              <a:cxnSpLocks noChangeShapeType="1"/>
+            </p:cNvCxnSpPr>
+            <p:nvPr/>
+          </p:nvCxnSpPr>
+          <p:spPr bwMode="auto">
+            <a:xfrm rot="10800000">
+              <a:off x="2857488" y="3989413"/>
+              <a:ext cx="214314" cy="1567"/>
+            </a:xfrm>
+            <a:prstGeom prst="straightConnector1">
+              <a:avLst/>
+            </a:prstGeom>
+            <a:noFill/>
+            <a:ln w="28575" algn="ctr">
+              <a:solidFill>
+                <a:srgbClr val="FFC000"/>
+              </a:solidFill>
+              <a:prstDash val="solid"/>
+              <a:round/>
+              <a:headEnd type="none" w="med" len="med"/>
+              <a:tailEnd type="none" w="med" len="med"/>
+            </a:ln>
+          </p:spPr>
+        </p:cxnSp>
+        <p:cxnSp>
+          <p:nvCxnSpPr>
+            <p:cNvPr id="45" name="Conector de seta reta 22"/>
+            <p:cNvCxnSpPr>
+              <a:cxnSpLocks noChangeShapeType="1"/>
+            </p:cNvCxnSpPr>
+            <p:nvPr/>
+          </p:nvCxnSpPr>
+          <p:spPr bwMode="auto">
+            <a:xfrm rot="5400000" flipH="1" flipV="1">
+              <a:off x="2755094" y="4317212"/>
+              <a:ext cx="633418" cy="2"/>
+            </a:xfrm>
+            <a:prstGeom prst="straightConnector1">
+              <a:avLst/>
+            </a:prstGeom>
+            <a:noFill/>
+            <a:ln w="28575" algn="ctr">
+              <a:solidFill>
+                <a:srgbClr val="FFC000"/>
+              </a:solidFill>
+              <a:prstDash val="solid"/>
+              <a:round/>
+              <a:headEnd type="none" w="med" len="med"/>
+              <a:tailEnd type="none" w="med" len="med"/>
+            </a:ln>
+          </p:spPr>
+        </p:cxnSp>
+      </p:grpSp>
+      <p:grpSp>
+        <p:nvGrpSpPr>
+          <p:cNvPr id="47" name="Group 62"/>
+          <p:cNvGrpSpPr/>
+          <p:nvPr/>
+        </p:nvGrpSpPr>
+        <p:grpSpPr>
+          <a:xfrm rot="5400000" flipH="1" flipV="1">
+            <a:off x="5436094" y="4437111"/>
+            <a:ext cx="1296145" cy="864099"/>
+            <a:chOff x="2857487" y="3286125"/>
+            <a:chExt cx="214317" cy="1347797"/>
+          </a:xfrm>
+        </p:grpSpPr>
+        <p:cxnSp>
+          <p:nvCxnSpPr>
+            <p:cNvPr id="48" name="Conector de seta reta 22"/>
+            <p:cNvCxnSpPr>
+              <a:cxnSpLocks noChangeShapeType="1"/>
+            </p:cNvCxnSpPr>
+            <p:nvPr/>
+          </p:nvCxnSpPr>
+          <p:spPr bwMode="auto">
+            <a:xfrm rot="5400000" flipH="1" flipV="1">
+              <a:off x="2505060" y="3638552"/>
+              <a:ext cx="704856" cy="1"/>
+            </a:xfrm>
+            <a:prstGeom prst="straightConnector1">
+              <a:avLst/>
+            </a:prstGeom>
+            <a:noFill/>
+            <a:ln w="28575" algn="ctr">
+              <a:solidFill>
+                <a:srgbClr val="FFC000"/>
+              </a:solidFill>
+              <a:prstDash val="solid"/>
+              <a:round/>
+              <a:headEnd/>
+              <a:tailEnd type="diamond" w="lg" len="lg"/>
+            </a:ln>
+          </p:spPr>
+        </p:cxnSp>
+        <p:cxnSp>
+          <p:nvCxnSpPr>
+            <p:cNvPr id="49" name="Conector de seta reta 22"/>
+            <p:cNvCxnSpPr>
+              <a:cxnSpLocks noChangeShapeType="1"/>
+            </p:cNvCxnSpPr>
+            <p:nvPr/>
+          </p:nvCxnSpPr>
+          <p:spPr bwMode="auto">
+            <a:xfrm rot="10800000">
+              <a:off x="2857488" y="3989413"/>
+              <a:ext cx="214314" cy="1567"/>
+            </a:xfrm>
+            <a:prstGeom prst="straightConnector1">
+              <a:avLst/>
+            </a:prstGeom>
+            <a:noFill/>
+            <a:ln w="28575" algn="ctr">
+              <a:solidFill>
+                <a:srgbClr val="FFC000"/>
+              </a:solidFill>
+              <a:prstDash val="solid"/>
+              <a:round/>
+              <a:headEnd type="none" w="med" len="med"/>
+              <a:tailEnd type="none" w="med" len="med"/>
+            </a:ln>
+          </p:spPr>
+        </p:cxnSp>
+        <p:cxnSp>
+          <p:nvCxnSpPr>
+            <p:cNvPr id="50" name="Conector de seta reta 22"/>
+            <p:cNvCxnSpPr>
+              <a:cxnSpLocks noChangeShapeType="1"/>
+            </p:cNvCxnSpPr>
+            <p:nvPr/>
+          </p:nvCxnSpPr>
+          <p:spPr bwMode="auto">
+            <a:xfrm rot="5400000" flipH="1" flipV="1">
+              <a:off x="2755094" y="4317212"/>
+              <a:ext cx="633418" cy="2"/>
+            </a:xfrm>
+            <a:prstGeom prst="straightConnector1">
+              <a:avLst/>
+            </a:prstGeom>
+            <a:noFill/>
+            <a:ln w="28575" algn="ctr">
+              <a:solidFill>
+                <a:srgbClr val="FFC000"/>
+              </a:solidFill>
+              <a:prstDash val="solid"/>
+              <a:round/>
+              <a:headEnd type="none" w="med" len="med"/>
+              <a:tailEnd type="none" w="med" len="med"/>
+            </a:ln>
+          </p:spPr>
+        </p:cxnSp>
+      </p:grpSp>
+      <p:cxnSp>
+        <p:nvCxnSpPr>
+          <p:cNvPr id="51" name="Conector de seta reta 22"/>
+          <p:cNvCxnSpPr>
+            <a:cxnSpLocks noChangeShapeType="1"/>
+          </p:cNvCxnSpPr>
+          <p:nvPr/>
+        </p:nvCxnSpPr>
+        <p:spPr bwMode="auto">
+          <a:xfrm flipH="1">
+            <a:off x="5652120" y="3933056"/>
+            <a:ext cx="864096" cy="0"/>
+          </a:xfrm>
+          <a:prstGeom prst="straightConnector1">
+            <a:avLst/>
+          </a:prstGeom>
+          <a:noFill/>
+          <a:ln w="28575" algn="ctr">
+            <a:solidFill>
+              <a:srgbClr val="FFC000"/>
+            </a:solidFill>
+            <a:prstDash val="solid"/>
+            <a:round/>
+            <a:headEnd/>
+            <a:tailEnd type="diamond" w="lg" len="lg"/>
+          </a:ln>
+        </p:spPr>
+      </p:cxnSp>
+      <p:grpSp>
+        <p:nvGrpSpPr>
+          <p:cNvPr id="52" name="Group 62"/>
+          <p:cNvGrpSpPr/>
+          <p:nvPr/>
+        </p:nvGrpSpPr>
+        <p:grpSpPr>
+          <a:xfrm rot="16200000" flipV="1">
+            <a:off x="5436096" y="2564904"/>
+            <a:ext cx="1296144" cy="864096"/>
+            <a:chOff x="2857487" y="3286125"/>
+            <a:chExt cx="214317" cy="1347797"/>
+          </a:xfrm>
+        </p:grpSpPr>
+        <p:cxnSp>
+          <p:nvCxnSpPr>
+            <p:cNvPr id="53" name="Conector de seta reta 22"/>
+            <p:cNvCxnSpPr>
+              <a:cxnSpLocks noChangeShapeType="1"/>
+            </p:cNvCxnSpPr>
+            <p:nvPr/>
+          </p:nvCxnSpPr>
+          <p:spPr bwMode="auto">
+            <a:xfrm rot="5400000" flipH="1" flipV="1">
+              <a:off x="2505060" y="3638552"/>
+              <a:ext cx="704856" cy="1"/>
+            </a:xfrm>
+            <a:prstGeom prst="straightConnector1">
+              <a:avLst/>
+            </a:prstGeom>
+            <a:noFill/>
+            <a:ln w="28575" algn="ctr">
+              <a:solidFill>
+                <a:srgbClr val="FFC000"/>
+              </a:solidFill>
+              <a:prstDash val="solid"/>
+              <a:round/>
+              <a:headEnd/>
+              <a:tailEnd type="none" w="lg" len="lg"/>
+            </a:ln>
+          </p:spPr>
+        </p:cxnSp>
+        <p:cxnSp>
+          <p:nvCxnSpPr>
+            <p:cNvPr id="54" name="Conector de seta reta 22"/>
+            <p:cNvCxnSpPr>
+              <a:cxnSpLocks noChangeShapeType="1"/>
+            </p:cNvCxnSpPr>
+            <p:nvPr/>
+          </p:nvCxnSpPr>
+          <p:spPr bwMode="auto">
+            <a:xfrm rot="10800000">
+              <a:off x="2857488" y="3989413"/>
+              <a:ext cx="214314" cy="1567"/>
+            </a:xfrm>
+            <a:prstGeom prst="straightConnector1">
+              <a:avLst/>
+            </a:prstGeom>
+            <a:noFill/>
+            <a:ln w="28575" algn="ctr">
+              <a:solidFill>
+                <a:srgbClr val="FFC000"/>
+              </a:solidFill>
+              <a:prstDash val="solid"/>
+              <a:round/>
+              <a:headEnd type="none" w="med" len="med"/>
+              <a:tailEnd type="none" w="med" len="med"/>
+            </a:ln>
+          </p:spPr>
+        </p:cxnSp>
+        <p:cxnSp>
+          <p:nvCxnSpPr>
+            <p:cNvPr id="55" name="Conector de seta reta 22"/>
+            <p:cNvCxnSpPr>
+              <a:cxnSpLocks noChangeShapeType="1"/>
+            </p:cNvCxnSpPr>
+            <p:nvPr/>
+          </p:nvCxnSpPr>
+          <p:spPr bwMode="auto">
+            <a:xfrm rot="5400000" flipH="1" flipV="1">
+              <a:off x="2755094" y="4317212"/>
+              <a:ext cx="633418" cy="2"/>
+            </a:xfrm>
+            <a:prstGeom prst="straightConnector1">
+              <a:avLst/>
+            </a:prstGeom>
+            <a:noFill/>
+            <a:ln w="28575" algn="ctr">
+              <a:solidFill>
+                <a:srgbClr val="FFC000"/>
+              </a:solidFill>
+              <a:prstDash val="solid"/>
+              <a:round/>
+              <a:headEnd type="diamond" w="lg" len="lg"/>
+              <a:tailEnd type="none" w="med" len="med"/>
+            </a:ln>
+          </p:spPr>
+        </p:cxnSp>
+      </p:grpSp>
+      <p:sp>
+        <p:nvSpPr>
+          <p:cNvPr id="46" name="CaixaDeTexto 45"/>
+          <p:cNvSpPr txBox="1"/>
+          <p:nvPr/>
+        </p:nvSpPr>
+        <p:spPr>
+          <a:xfrm>
+            <a:off x="5652120" y="1988840"/>
+            <a:ext cx="482824" cy="307777"/>
+          </a:xfrm>
+          <a:prstGeom prst="rect">
+            <a:avLst/>
+          </a:prstGeom>
+          <a:noFill/>
+        </p:spPr>
+        <p:txBody>
+          <a:bodyPr wrap="none" rtlCol="0">
+            <a:spAutoFit/>
+          </a:bodyPr>
+          <a:lstStyle/>
+          <a:p>
+            <a:r>
+              <a:rPr lang="pt-BR" sz="1400" dirty="0" smtClean="0"/>
+              <a:t>0..1</a:t>
+            </a:r>
+            <a:endParaRPr lang="pt-BR" sz="1400" dirty="0"/>
+          </a:p>
+        </p:txBody>
+      </p:sp>
+      <p:sp>
+        <p:nvSpPr>
+          <p:cNvPr id="56" name="CaixaDeTexto 55"/>
+          <p:cNvSpPr txBox="1"/>
+          <p:nvPr/>
+        </p:nvSpPr>
+        <p:spPr>
+          <a:xfrm>
+            <a:off x="5652120" y="3625279"/>
+            <a:ext cx="482824" cy="307777"/>
+          </a:xfrm>
+          <a:prstGeom prst="rect">
+            <a:avLst/>
+          </a:prstGeom>
+          <a:noFill/>
+        </p:spPr>
+        <p:txBody>
+          <a:bodyPr wrap="none" rtlCol="0">
+            <a:spAutoFit/>
+          </a:bodyPr>
+          <a:lstStyle/>
+          <a:p>
+            <a:r>
+              <a:rPr lang="pt-BR" sz="1400" dirty="0" smtClean="0"/>
+              <a:t>0..1</a:t>
+            </a:r>
+            <a:endParaRPr lang="pt-BR" sz="1400" dirty="0"/>
+          </a:p>
+        </p:txBody>
+      </p:sp>
+      <p:sp>
+        <p:nvSpPr>
+          <p:cNvPr id="57" name="CaixaDeTexto 56"/>
+          <p:cNvSpPr txBox="1"/>
+          <p:nvPr/>
+        </p:nvSpPr>
+        <p:spPr>
+          <a:xfrm>
+            <a:off x="5652120" y="5209455"/>
+            <a:ext cx="453970" cy="307777"/>
+          </a:xfrm>
+          <a:prstGeom prst="rect">
+            <a:avLst/>
+          </a:prstGeom>
+          <a:noFill/>
+        </p:spPr>
+        <p:txBody>
+          <a:bodyPr wrap="none" rtlCol="0">
+            <a:spAutoFit/>
+          </a:bodyPr>
+          <a:lstStyle/>
+          <a:p>
+            <a:r>
+              <a:rPr lang="pt-BR" sz="1400" dirty="0" smtClean="0"/>
+              <a:t>0..*</a:t>
+            </a:r>
+            <a:endParaRPr lang="pt-BR" sz="1400" dirty="0"/>
+          </a:p>
+        </p:txBody>
+      </p:sp>
     </p:spTree>
   </p:cSld>
   <p:clrMapOvr>
@@ -8517,7 +9339,153 @@
           <a:bodyPr/>
           <a:lstStyle/>
           <a:p>
-            <a:endParaRPr lang="pt-BR"/>
+            <a:r>
+              <a:rPr lang="pt-BR" sz="2800" dirty="0" smtClean="0"/>
+              <a:t>Carregamento do </a:t>
+            </a:r>
+            <a:r>
+              <a:rPr lang="pt-BR" sz="2800" dirty="0" err="1" smtClean="0"/>
+              <a:t>driver</a:t>
+            </a:r>
+            <a:endParaRPr lang="pt-BR" sz="2800" dirty="0" smtClean="0"/>
+          </a:p>
+          <a:p>
+            <a:pPr indent="-3175">
+              <a:buNone/>
+            </a:pPr>
+            <a:endParaRPr lang="pt-BR" sz="2200" dirty="0" smtClean="0"/>
+          </a:p>
+          <a:p>
+            <a:pPr indent="-3175">
+              <a:buNone/>
+            </a:pPr>
+            <a:r>
+              <a:rPr lang="pt-BR" sz="2200" dirty="0" smtClean="0"/>
+              <a:t>Antes de solicitar uma conexão com a base de dados, devemos primeiramente realizar o carregamento do </a:t>
+            </a:r>
+            <a:r>
+              <a:rPr lang="pt-BR" sz="2200" dirty="0" err="1" smtClean="0"/>
+              <a:t>driver</a:t>
+            </a:r>
+            <a:r>
+              <a:rPr lang="pt-BR" sz="2200" dirty="0" smtClean="0"/>
+              <a:t> para a memória através do comando:</a:t>
+            </a:r>
+          </a:p>
+          <a:p>
+            <a:pPr indent="-3175">
+              <a:buNone/>
+            </a:pPr>
+            <a:endParaRPr lang="pt-BR" sz="2200" dirty="0" smtClean="0"/>
+          </a:p>
+          <a:p>
+            <a:pPr indent="-3175" algn="ctr">
+              <a:buNone/>
+            </a:pPr>
+            <a:r>
+              <a:rPr lang="pt-BR" sz="2200" dirty="0" err="1" smtClean="0">
+                <a:solidFill>
+                  <a:srgbClr val="FFC000"/>
+                </a:solidFill>
+              </a:rPr>
+              <a:t>Class</a:t>
+            </a:r>
+            <a:r>
+              <a:rPr lang="pt-BR" sz="2200" dirty="0" smtClean="0">
+                <a:solidFill>
+                  <a:srgbClr val="FFC000"/>
+                </a:solidFill>
+              </a:rPr>
+              <a:t>.</a:t>
+            </a:r>
+            <a:r>
+              <a:rPr lang="pt-BR" sz="2200" dirty="0" err="1" smtClean="0">
+                <a:solidFill>
+                  <a:srgbClr val="FFC000"/>
+                </a:solidFill>
+              </a:rPr>
+              <a:t>forName</a:t>
+            </a:r>
+            <a:r>
+              <a:rPr lang="pt-BR" sz="2200" dirty="0" smtClean="0">
+                <a:solidFill>
+                  <a:srgbClr val="FFC000"/>
+                </a:solidFill>
+              </a:rPr>
+              <a:t>(“</a:t>
+            </a:r>
+            <a:r>
+              <a:rPr lang="pt-BR" sz="2200" dirty="0" err="1" smtClean="0"/>
+              <a:t>com.mysql.jdbc.Driver</a:t>
+            </a:r>
+            <a:r>
+              <a:rPr lang="pt-BR" sz="2200" dirty="0" err="1" smtClean="0">
+                <a:solidFill>
+                  <a:srgbClr val="FFC000"/>
+                </a:solidFill>
+              </a:rPr>
+              <a:t>”</a:t>
+            </a:r>
+            <a:r>
+              <a:rPr lang="pt-BR" sz="2200" dirty="0" smtClean="0">
+                <a:solidFill>
+                  <a:srgbClr val="FFC000"/>
+                </a:solidFill>
+              </a:rPr>
+              <a:t>)</a:t>
+            </a:r>
+          </a:p>
+          <a:p>
+            <a:pPr indent="-3175">
+              <a:buNone/>
+            </a:pPr>
+            <a:endParaRPr lang="pt-BR" sz="2200" dirty="0" smtClean="0"/>
+          </a:p>
+          <a:p>
+            <a:pPr indent="-3175">
+              <a:buNone/>
+            </a:pPr>
+            <a:r>
+              <a:rPr lang="pt-BR" sz="2200" dirty="0" smtClean="0"/>
+              <a:t>O comando </a:t>
+            </a:r>
+            <a:r>
+              <a:rPr lang="pt-BR" sz="2200" dirty="0" err="1" smtClean="0">
+                <a:solidFill>
+                  <a:srgbClr val="FFC000"/>
+                </a:solidFill>
+              </a:rPr>
+              <a:t>Class</a:t>
+            </a:r>
+            <a:r>
+              <a:rPr lang="pt-BR" sz="2200" dirty="0" smtClean="0">
+                <a:solidFill>
+                  <a:srgbClr val="FFC000"/>
+                </a:solidFill>
+              </a:rPr>
+              <a:t>.</a:t>
+            </a:r>
+            <a:r>
+              <a:rPr lang="pt-BR" sz="2200" dirty="0" err="1" smtClean="0">
+                <a:solidFill>
+                  <a:srgbClr val="FFC000"/>
+                </a:solidFill>
+              </a:rPr>
+              <a:t>forName</a:t>
+            </a:r>
+            <a:r>
+              <a:rPr lang="pt-BR" sz="2200" dirty="0" smtClean="0">
+                <a:solidFill>
+                  <a:srgbClr val="FFC000"/>
+                </a:solidFill>
+              </a:rPr>
+              <a:t>(“...”)</a:t>
+            </a:r>
+            <a:r>
+              <a:rPr lang="pt-BR" sz="2200" dirty="0" smtClean="0"/>
+              <a:t> realiza o carregamento de alguma classe para a memória sem criar instâncias.</a:t>
+            </a:r>
+            <a:endParaRPr lang="pt-BR" sz="2200" dirty="0"/>
           </a:p>
         </p:txBody>
       </p:sp>
@@ -8600,7 +9568,7 @@
             <a:pPr eaLnBrk="1" hangingPunct="1"/>
             <a:r>
               <a:rPr lang="pt-BR" dirty="0" smtClean="0"/>
-              <a:t>Operações na base de dados</a:t>
+              <a:t>Abrindo e fechando conexões</a:t>
             </a:r>
             <a:endParaRPr lang="pt-BR" dirty="0"/>
           </a:p>
@@ -8616,12 +9584,268 @@
             <p:ph idx="1"/>
           </p:nvPr>
         </p:nvSpPr>
-        <p:spPr/>
+        <p:spPr>
+          <a:xfrm>
+            <a:off x="457200" y="1600200"/>
+            <a:ext cx="8075240" cy="4525963"/>
+          </a:xfrm>
+        </p:spPr>
         <p:txBody>
           <a:bodyPr/>
           <a:lstStyle/>
           <a:p>
-            <a:endParaRPr lang="pt-BR"/>
+            <a:r>
+              <a:rPr lang="pt-BR" sz="2800" dirty="0" smtClean="0"/>
+              <a:t>Carregamento do </a:t>
+            </a:r>
+            <a:r>
+              <a:rPr lang="pt-BR" sz="2800" dirty="0" err="1" smtClean="0"/>
+              <a:t>driver</a:t>
+            </a:r>
+            <a:endParaRPr lang="pt-BR" sz="2800" dirty="0" smtClean="0"/>
+          </a:p>
+          <a:p>
+            <a:pPr indent="-3175">
+              <a:buNone/>
+            </a:pPr>
+            <a:endParaRPr lang="pt-BR" sz="2200" dirty="0" smtClean="0"/>
+          </a:p>
+          <a:p>
+            <a:pPr indent="-3175">
+              <a:buNone/>
+            </a:pPr>
+            <a:r>
+              <a:rPr lang="pt-BR" sz="2200" dirty="0" smtClean="0"/>
+              <a:t>O método </a:t>
+            </a:r>
+            <a:r>
+              <a:rPr lang="pt-BR" sz="2200" dirty="0" err="1" smtClean="0"/>
+              <a:t>forName</a:t>
+            </a:r>
+            <a:r>
+              <a:rPr lang="pt-BR" sz="2200" dirty="0" smtClean="0"/>
+              <a:t>() requer o tratamento da exception </a:t>
+            </a:r>
+            <a:r>
+              <a:rPr lang="pt-BR" sz="2200" u="sng" dirty="0" err="1" smtClean="0"/>
+              <a:t>ClassNotFoundException</a:t>
+            </a:r>
+            <a:r>
+              <a:rPr lang="pt-BR" sz="2200" dirty="0" smtClean="0"/>
+              <a:t> que pode ocorrer na aplicação caso o </a:t>
+            </a:r>
+            <a:r>
+              <a:rPr lang="pt-BR" sz="2200" dirty="0" err="1" smtClean="0"/>
+              <a:t>driver</a:t>
+            </a:r>
+            <a:r>
+              <a:rPr lang="pt-BR" sz="2200" dirty="0" smtClean="0"/>
+              <a:t> não esteja no </a:t>
+            </a:r>
+            <a:r>
+              <a:rPr lang="pt-BR" sz="2200" dirty="0" err="1" smtClean="0"/>
+              <a:t>classpath</a:t>
+            </a:r>
+            <a:r>
+              <a:rPr lang="pt-BR" sz="2200" dirty="0" smtClean="0"/>
+              <a:t>:</a:t>
+            </a:r>
+          </a:p>
+          <a:p>
+            <a:pPr indent="-3175">
+              <a:buNone/>
+            </a:pPr>
+            <a:endParaRPr lang="pt-BR" sz="2200" dirty="0" smtClean="0"/>
+          </a:p>
+          <a:p>
+            <a:pPr indent="-3175">
+              <a:buNone/>
+            </a:pPr>
+            <a:r>
+              <a:rPr lang="pt-BR" sz="2200" dirty="0" err="1" smtClean="0">
+                <a:solidFill>
+                  <a:srgbClr val="FFC000"/>
+                </a:solidFill>
+              </a:rPr>
+              <a:t>try</a:t>
+            </a:r>
+            <a:r>
+              <a:rPr lang="pt-BR" sz="2200" dirty="0" smtClean="0">
+                <a:solidFill>
+                  <a:srgbClr val="FFC000"/>
+                </a:solidFill>
+              </a:rPr>
+              <a:t> {</a:t>
+            </a:r>
+          </a:p>
+          <a:p>
+            <a:pPr indent="-3175">
+              <a:buNone/>
+            </a:pPr>
+            <a:r>
+              <a:rPr lang="pt-BR" sz="2200" dirty="0" smtClean="0">
+                <a:solidFill>
+                  <a:srgbClr val="FFC000"/>
+                </a:solidFill>
+              </a:rPr>
+              <a:t>	</a:t>
+            </a:r>
+            <a:r>
+              <a:rPr lang="pt-BR" sz="2200" dirty="0" smtClean="0">
+                <a:solidFill>
+                  <a:srgbClr val="FFC000"/>
+                </a:solidFill>
+              </a:rPr>
+              <a:t>	</a:t>
+            </a:r>
+            <a:r>
+              <a:rPr lang="pt-BR" sz="2200" dirty="0" err="1" smtClean="0">
+                <a:solidFill>
+                  <a:srgbClr val="FFC000"/>
+                </a:solidFill>
+              </a:rPr>
+              <a:t>Class</a:t>
+            </a:r>
+            <a:r>
+              <a:rPr lang="pt-BR" sz="2200" dirty="0" smtClean="0">
+                <a:solidFill>
+                  <a:srgbClr val="FFC000"/>
+                </a:solidFill>
+              </a:rPr>
+              <a:t>.</a:t>
+            </a:r>
+            <a:r>
+              <a:rPr lang="pt-BR" sz="2200" dirty="0" err="1" smtClean="0">
+                <a:solidFill>
+                  <a:srgbClr val="FFC000"/>
+                </a:solidFill>
+              </a:rPr>
+              <a:t>forName</a:t>
+            </a:r>
+            <a:r>
+              <a:rPr lang="pt-BR" sz="2200" dirty="0" smtClean="0">
+                <a:solidFill>
+                  <a:srgbClr val="FFC000"/>
+                </a:solidFill>
+              </a:rPr>
+              <a:t>(“</a:t>
+            </a:r>
+            <a:r>
+              <a:rPr lang="pt-BR" sz="2200" dirty="0" err="1" smtClean="0">
+                <a:solidFill>
+                  <a:srgbClr val="FFC000"/>
+                </a:solidFill>
+              </a:rPr>
+              <a:t>com.mysql.jdbc.Driver”</a:t>
+            </a:r>
+            <a:r>
+              <a:rPr lang="pt-BR" sz="2200" dirty="0" smtClean="0">
+                <a:solidFill>
+                  <a:srgbClr val="FFC000"/>
+                </a:solidFill>
+              </a:rPr>
+              <a:t>);</a:t>
+            </a:r>
+          </a:p>
+          <a:p>
+            <a:pPr indent="-3175">
+              <a:buNone/>
+            </a:pPr>
+            <a:r>
+              <a:rPr lang="pt-BR" sz="2200" dirty="0" smtClean="0">
+                <a:solidFill>
+                  <a:srgbClr val="FFC000"/>
+                </a:solidFill>
+              </a:rPr>
+              <a:t>} catch (</a:t>
+            </a:r>
+            <a:r>
+              <a:rPr lang="pt-BR" sz="2200" u="sng" dirty="0" err="1" smtClean="0">
+                <a:solidFill>
+                  <a:srgbClr val="FFC000"/>
+                </a:solidFill>
+              </a:rPr>
+              <a:t>ClassNotFoundException</a:t>
+            </a:r>
+            <a:r>
+              <a:rPr lang="pt-BR" sz="2200" dirty="0" smtClean="0">
+                <a:solidFill>
+                  <a:srgbClr val="FFC000"/>
+                </a:solidFill>
+              </a:rPr>
+              <a:t> e) {</a:t>
+            </a:r>
+          </a:p>
+          <a:p>
+            <a:pPr indent="-3175">
+              <a:buNone/>
+            </a:pPr>
+            <a:r>
+              <a:rPr lang="pt-BR" sz="2200" dirty="0" smtClean="0">
+                <a:solidFill>
+                  <a:srgbClr val="FFC000"/>
+                </a:solidFill>
+              </a:rPr>
+              <a:t>	</a:t>
+            </a:r>
+            <a:r>
+              <a:rPr lang="pt-BR" sz="2200" dirty="0" smtClean="0">
+                <a:solidFill>
+                  <a:srgbClr val="FFC000"/>
+                </a:solidFill>
+              </a:rPr>
+              <a:t>	System.</a:t>
+            </a:r>
+            <a:r>
+              <a:rPr lang="pt-BR" sz="2200" dirty="0" err="1" smtClean="0">
+                <a:solidFill>
+                  <a:srgbClr val="FFC000"/>
+                </a:solidFill>
+              </a:rPr>
+              <a:t>out.println</a:t>
+            </a:r>
+            <a:r>
+              <a:rPr lang="pt-BR" sz="2200" dirty="0" smtClean="0">
+                <a:solidFill>
+                  <a:srgbClr val="FFC000"/>
+                </a:solidFill>
+              </a:rPr>
+              <a:t>(“Não foi possível carregar o </a:t>
+            </a:r>
+            <a:r>
+              <a:rPr lang="pt-BR" sz="2200" dirty="0" err="1" smtClean="0">
+                <a:solidFill>
+                  <a:srgbClr val="FFC000"/>
+                </a:solidFill>
+              </a:rPr>
+              <a:t>driver</a:t>
+            </a:r>
+            <a:r>
+              <a:rPr lang="pt-BR" sz="2200" dirty="0" smtClean="0">
+                <a:solidFill>
+                  <a:srgbClr val="FFC000"/>
+                </a:solidFill>
+              </a:rPr>
+              <a:t>.”);</a:t>
+            </a:r>
+          </a:p>
+          <a:p>
+            <a:pPr indent="-3175">
+              <a:buNone/>
+            </a:pPr>
+            <a:r>
+              <a:rPr lang="pt-BR" sz="2200" dirty="0" smtClean="0">
+                <a:solidFill>
+                  <a:srgbClr val="FFC000"/>
+                </a:solidFill>
+              </a:rPr>
+              <a:t>}</a:t>
+            </a:r>
+            <a:endParaRPr lang="pt-BR" sz="2200" dirty="0" smtClean="0">
+              <a:solidFill>
+                <a:srgbClr val="FFC000"/>
+              </a:solidFill>
+            </a:endParaRPr>
           </a:p>
         </p:txBody>
       </p:sp>
@@ -8659,6 +9883,13 @@
   <p:clrMapOvr>
     <a:masterClrMapping/>
   </p:clrMapOvr>
+  <p:timing>
+    <p:tnLst>
+      <p:par>
+        <p:cTn id="1" dur="indefinite" restart="never" nodeType="tmRoot"/>
+      </p:par>
+    </p:tnLst>
+  </p:timing>
 </p:sld>
 </file>
 
@@ -8697,7 +9928,7 @@
             <a:pPr eaLnBrk="1" hangingPunct="1"/>
             <a:r>
               <a:rPr lang="pt-BR" dirty="0" smtClean="0"/>
-              <a:t>Operações parametrizadas</a:t>
+              <a:t>Abrindo e fechando conexões</a:t>
             </a:r>
             <a:endParaRPr lang="pt-BR" dirty="0"/>
           </a:p>
@@ -8713,12 +9944,291 @@
             <p:ph idx="1"/>
           </p:nvPr>
         </p:nvSpPr>
-        <p:spPr/>
+        <p:spPr>
+          <a:xfrm>
+            <a:off x="457200" y="1600200"/>
+            <a:ext cx="8075240" cy="4525963"/>
+          </a:xfrm>
+        </p:spPr>
         <p:txBody>
           <a:bodyPr/>
           <a:lstStyle/>
           <a:p>
-            <a:endParaRPr lang="pt-BR"/>
+            <a:pPr>
+              <a:spcBef>
+                <a:spcPts val="1800"/>
+              </a:spcBef>
+            </a:pPr>
+            <a:r>
+              <a:rPr lang="pt-BR" sz="2800" dirty="0" smtClean="0"/>
+              <a:t>Abrindo a conexão com a base de dados.</a:t>
+            </a:r>
+          </a:p>
+          <a:p>
+            <a:pPr lvl="1">
+              <a:spcBef>
+                <a:spcPts val="1800"/>
+              </a:spcBef>
+            </a:pPr>
+            <a:r>
+              <a:rPr lang="pt-BR" sz="2400" dirty="0" smtClean="0"/>
+              <a:t>A </a:t>
+            </a:r>
+            <a:r>
+              <a:rPr lang="pt-BR" sz="2400" dirty="0" smtClean="0"/>
+              <a:t>interface </a:t>
+            </a:r>
+            <a:r>
+              <a:rPr lang="pt-BR" sz="2400" dirty="0" err="1" smtClean="0">
+                <a:solidFill>
+                  <a:srgbClr val="FFC000"/>
+                </a:solidFill>
+              </a:rPr>
+              <a:t>java</a:t>
+            </a:r>
+            <a:r>
+              <a:rPr lang="pt-BR" sz="2400" dirty="0" smtClean="0">
+                <a:solidFill>
+                  <a:srgbClr val="FFC000"/>
+                </a:solidFill>
+              </a:rPr>
+              <a:t>.</a:t>
+            </a:r>
+            <a:r>
+              <a:rPr lang="pt-BR" sz="2400" dirty="0" err="1" smtClean="0">
+                <a:solidFill>
+                  <a:srgbClr val="FFC000"/>
+                </a:solidFill>
+              </a:rPr>
+              <a:t>sql</a:t>
+            </a:r>
+            <a:r>
+              <a:rPr lang="pt-BR" sz="2400" dirty="0" smtClean="0">
+                <a:solidFill>
+                  <a:srgbClr val="FFC000"/>
+                </a:solidFill>
+              </a:rPr>
+              <a:t>.Connection</a:t>
+            </a:r>
+            <a:r>
+              <a:rPr lang="pt-BR" sz="2400" dirty="0" smtClean="0"/>
+              <a:t> representa uma conexão com a base de dados e é o ponto de partida para realizarmos qualquer tipo de operação com esta.</a:t>
+            </a:r>
+          </a:p>
+          <a:p>
+            <a:pPr lvl="1">
+              <a:spcBef>
+                <a:spcPts val="1800"/>
+              </a:spcBef>
+            </a:pPr>
+            <a:r>
+              <a:rPr lang="pt-BR" sz="2400" dirty="0" smtClean="0"/>
+              <a:t>Podemos </a:t>
+            </a:r>
+            <a:r>
+              <a:rPr lang="pt-BR" sz="2400" dirty="0" err="1" smtClean="0"/>
+              <a:t>obtem</a:t>
+            </a:r>
+            <a:r>
+              <a:rPr lang="pt-BR" sz="2400" dirty="0" smtClean="0"/>
+              <a:t> uma Connection (abrir uma conexão) utilizando a classe </a:t>
+            </a:r>
+            <a:r>
+              <a:rPr lang="pt-BR" sz="2400" dirty="0" err="1" smtClean="0">
+                <a:solidFill>
+                  <a:srgbClr val="FFC000"/>
+                </a:solidFill>
+              </a:rPr>
+              <a:t>java</a:t>
+            </a:r>
+            <a:r>
+              <a:rPr lang="pt-BR" sz="2400" dirty="0" smtClean="0">
+                <a:solidFill>
+                  <a:srgbClr val="FFC000"/>
+                </a:solidFill>
+              </a:rPr>
+              <a:t>.</a:t>
+            </a:r>
+            <a:r>
+              <a:rPr lang="pt-BR" sz="2400" dirty="0" err="1" smtClean="0">
+                <a:solidFill>
+                  <a:srgbClr val="FFC000"/>
+                </a:solidFill>
+              </a:rPr>
+              <a:t>sql</a:t>
+            </a:r>
+            <a:r>
+              <a:rPr lang="pt-BR" sz="2400" dirty="0" smtClean="0">
+                <a:solidFill>
+                  <a:srgbClr val="FFC000"/>
+                </a:solidFill>
+              </a:rPr>
+              <a:t>.</a:t>
+            </a:r>
+            <a:r>
+              <a:rPr lang="pt-BR" sz="2400" dirty="0" err="1" smtClean="0">
+                <a:solidFill>
+                  <a:srgbClr val="FFC000"/>
+                </a:solidFill>
+              </a:rPr>
+              <a:t>DriverManager</a:t>
+            </a:r>
+            <a:r>
+              <a:rPr lang="pt-BR" sz="2400" dirty="0" smtClean="0"/>
+              <a:t>:</a:t>
+            </a:r>
+            <a:endParaRPr lang="pt-BR" sz="2400" dirty="0" smtClean="0">
+              <a:solidFill>
+                <a:srgbClr val="FFC000"/>
+              </a:solidFill>
+            </a:endParaRPr>
+          </a:p>
+          <a:p>
+            <a:pPr lvl="1" indent="-1588">
+              <a:spcBef>
+                <a:spcPts val="1800"/>
+              </a:spcBef>
+              <a:buNone/>
+              <a:tabLst>
+                <a:tab pos="1344613" algn="l"/>
+              </a:tabLst>
+            </a:pPr>
+            <a:r>
+              <a:rPr lang="pt-BR" sz="2000" dirty="0" smtClean="0">
+                <a:solidFill>
+                  <a:srgbClr val="FFC000"/>
+                </a:solidFill>
+              </a:rPr>
+              <a:t>Connection </a:t>
+            </a:r>
+            <a:r>
+              <a:rPr lang="pt-BR" sz="2000" dirty="0" err="1" smtClean="0">
+                <a:solidFill>
+                  <a:srgbClr val="FFC000"/>
+                </a:solidFill>
+              </a:rPr>
+              <a:t>cn</a:t>
+            </a:r>
+            <a:r>
+              <a:rPr lang="pt-BR" sz="2000" dirty="0" smtClean="0">
+                <a:solidFill>
+                  <a:srgbClr val="FFC000"/>
+                </a:solidFill>
+              </a:rPr>
+              <a:t> = </a:t>
+            </a:r>
+            <a:r>
+              <a:rPr lang="pt-BR" sz="2000" dirty="0" err="1" smtClean="0">
+                <a:solidFill>
+                  <a:srgbClr val="FFC000"/>
+                </a:solidFill>
+              </a:rPr>
+              <a:t>DriverManager</a:t>
+            </a:r>
+            <a:r>
+              <a:rPr lang="pt-BR" sz="2000" dirty="0" smtClean="0">
+                <a:solidFill>
+                  <a:srgbClr val="FFC000"/>
+                </a:solidFill>
+              </a:rPr>
+              <a:t>.</a:t>
+            </a:r>
+            <a:r>
+              <a:rPr lang="pt-BR" sz="2000" dirty="0" err="1" smtClean="0">
+                <a:solidFill>
+                  <a:srgbClr val="FFC000"/>
+                </a:solidFill>
+              </a:rPr>
+              <a:t>getConnection</a:t>
+            </a:r>
+            <a:r>
+              <a:rPr lang="pt-BR" sz="2000" dirty="0" smtClean="0">
+                <a:solidFill>
+                  <a:srgbClr val="FFC000"/>
+                </a:solidFill>
+              </a:rPr>
+              <a:t>(</a:t>
+            </a:r>
+            <a:br>
+              <a:rPr lang="pt-BR" sz="2000" dirty="0" smtClean="0">
+                <a:solidFill>
+                  <a:srgbClr val="FFC000"/>
+                </a:solidFill>
+              </a:rPr>
+            </a:br>
+            <a:r>
+              <a:rPr lang="pt-BR" sz="2000" dirty="0" smtClean="0">
+                <a:solidFill>
+                  <a:srgbClr val="FFC000"/>
+                </a:solidFill>
+              </a:rPr>
+              <a:t>	“</a:t>
+            </a:r>
+            <a:r>
+              <a:rPr lang="pt-BR" sz="2000" dirty="0" err="1" smtClean="0"/>
+              <a:t>jdbc</a:t>
+            </a:r>
+            <a:r>
+              <a:rPr lang="pt-BR" sz="2000" dirty="0" smtClean="0"/>
+              <a:t>:</a:t>
+            </a:r>
+            <a:r>
+              <a:rPr lang="pt-BR" sz="2000" dirty="0" err="1" smtClean="0"/>
+              <a:t>mysql</a:t>
+            </a:r>
+            <a:r>
+              <a:rPr lang="pt-BR" sz="2000" dirty="0" smtClean="0"/>
+              <a:t>://sigma.server.com.</a:t>
+            </a:r>
+            <a:r>
+              <a:rPr lang="pt-BR" sz="2000" dirty="0" err="1" smtClean="0"/>
+              <a:t>br</a:t>
+            </a:r>
+            <a:r>
+              <a:rPr lang="pt-BR" sz="2000" dirty="0" smtClean="0"/>
+              <a:t>:3306/</a:t>
+            </a:r>
+            <a:r>
+              <a:rPr lang="pt-BR" sz="2000" dirty="0" err="1" smtClean="0"/>
+              <a:t>dbtest</a:t>
+            </a:r>
+            <a:r>
+              <a:rPr lang="pt-BR" sz="2000" dirty="0" smtClean="0">
+                <a:solidFill>
+                  <a:srgbClr val="FFC000"/>
+                </a:solidFill>
+              </a:rPr>
+              <a:t>”,	“</a:t>
+            </a:r>
+            <a:r>
+              <a:rPr lang="pt-BR" sz="2000" dirty="0" err="1" smtClean="0"/>
+              <a:t>usuario</a:t>
+            </a:r>
+            <a:r>
+              <a:rPr lang="pt-BR" sz="2000" dirty="0" smtClean="0">
+                <a:solidFill>
+                  <a:srgbClr val="FFC000"/>
+                </a:solidFill>
+              </a:rPr>
+              <a:t>”, “</a:t>
+            </a:r>
+            <a:r>
+              <a:rPr lang="pt-BR" sz="2000" dirty="0" smtClean="0"/>
+              <a:t>senha</a:t>
+            </a:r>
+            <a:r>
+              <a:rPr lang="pt-BR" sz="2000" dirty="0" smtClean="0">
+                <a:solidFill>
+                  <a:srgbClr val="FFC000"/>
+                </a:solidFill>
+              </a:rPr>
+              <a:t>”);</a:t>
+            </a:r>
+            <a:endParaRPr lang="pt-BR" sz="2000" dirty="0" smtClean="0">
+              <a:solidFill>
+                <a:srgbClr val="FFC000"/>
+              </a:solidFill>
+            </a:endParaRPr>
           </a:p>
         </p:txBody>
       </p:sp>
@@ -8756,6 +10266,13 @@
   <p:clrMapOvr>
     <a:masterClrMapping/>
   </p:clrMapOvr>
+  <p:timing>
+    <p:tnLst>
+      <p:par>
+        <p:cTn id="1" dur="indefinite" restart="never" nodeType="tmRoot"/>
+      </p:par>
+    </p:tnLst>
+  </p:timing>
 </p:sld>
 </file>
 
@@ -8794,7 +10311,7 @@
             <a:pPr eaLnBrk="1" hangingPunct="1"/>
             <a:r>
               <a:rPr lang="pt-BR" dirty="0" smtClean="0"/>
-              <a:t>Transações</a:t>
+              <a:t>Abrindo e fechando conexões</a:t>
             </a:r>
             <a:endParaRPr lang="pt-BR" dirty="0"/>
           </a:p>
@@ -8810,12 +10327,157 @@
             <p:ph idx="1"/>
           </p:nvPr>
         </p:nvSpPr>
-        <p:spPr/>
+        <p:spPr>
+          <a:xfrm>
+            <a:off x="457200" y="1600200"/>
+            <a:ext cx="8075240" cy="4525963"/>
+          </a:xfrm>
+        </p:spPr>
         <p:txBody>
           <a:bodyPr/>
           <a:lstStyle/>
           <a:p>
-            <a:endParaRPr lang="pt-BR"/>
+            <a:pPr>
+              <a:spcBef>
+                <a:spcPts val="1800"/>
+              </a:spcBef>
+            </a:pPr>
+            <a:r>
+              <a:rPr lang="pt-BR" sz="2800" dirty="0" smtClean="0"/>
+              <a:t>Abrindo a conexão com a base de dados.</a:t>
+            </a:r>
+          </a:p>
+          <a:p>
+            <a:pPr lvl="1">
+              <a:spcBef>
+                <a:spcPts val="1800"/>
+              </a:spcBef>
+            </a:pPr>
+            <a:endParaRPr lang="pt-BR" sz="2400" dirty="0" smtClean="0">
+              <a:solidFill>
+                <a:srgbClr val="FFC000"/>
+              </a:solidFill>
+            </a:endParaRPr>
+          </a:p>
+          <a:p>
+            <a:pPr marL="1588" lvl="1" indent="-1588">
+              <a:spcBef>
+                <a:spcPts val="1800"/>
+              </a:spcBef>
+              <a:buNone/>
+            </a:pPr>
+            <a:r>
+              <a:rPr lang="pt-BR" sz="2000" dirty="0" err="1" smtClean="0">
+                <a:solidFill>
+                  <a:srgbClr val="FFC000"/>
+                </a:solidFill>
+              </a:rPr>
+              <a:t>DriverManager</a:t>
+            </a:r>
+            <a:r>
+              <a:rPr lang="pt-BR" sz="2000" dirty="0" smtClean="0">
+                <a:solidFill>
+                  <a:srgbClr val="FFC000"/>
+                </a:solidFill>
+              </a:rPr>
+              <a:t>.</a:t>
+            </a:r>
+            <a:r>
+              <a:rPr lang="pt-BR" sz="2000" dirty="0" err="1" smtClean="0">
+                <a:solidFill>
+                  <a:srgbClr val="FFC000"/>
+                </a:solidFill>
+              </a:rPr>
+              <a:t>getConnection</a:t>
+            </a:r>
+            <a:r>
+              <a:rPr lang="pt-BR" sz="2000" dirty="0" smtClean="0">
+                <a:solidFill>
+                  <a:srgbClr val="FFC000"/>
+                </a:solidFill>
+              </a:rPr>
+              <a:t>(</a:t>
+            </a:r>
+            <a:br>
+              <a:rPr lang="pt-BR" sz="2000" dirty="0" smtClean="0">
+                <a:solidFill>
+                  <a:srgbClr val="FFC000"/>
+                </a:solidFill>
+              </a:rPr>
+            </a:br>
+            <a:r>
+              <a:rPr lang="pt-BR" sz="2000" dirty="0" smtClean="0">
+                <a:solidFill>
+                  <a:srgbClr val="FFC000"/>
+                </a:solidFill>
+              </a:rPr>
+              <a:t>“</a:t>
+            </a:r>
+            <a:r>
+              <a:rPr lang="pt-BR" sz="2000" dirty="0" err="1" smtClean="0"/>
+              <a:t>jdbc</a:t>
+            </a:r>
+            <a:r>
+              <a:rPr lang="pt-BR" sz="2000" dirty="0" smtClean="0"/>
+              <a:t>:</a:t>
+            </a:r>
+            <a:r>
+              <a:rPr lang="pt-BR" sz="2000" dirty="0" err="1" smtClean="0"/>
+              <a:t>mysql</a:t>
+            </a:r>
+            <a:r>
+              <a:rPr lang="pt-BR" sz="2000" dirty="0" smtClean="0"/>
+              <a:t>://sigma.server.com.</a:t>
+            </a:r>
+            <a:r>
+              <a:rPr lang="pt-BR" sz="2000" dirty="0" err="1" smtClean="0"/>
+              <a:t>br</a:t>
+            </a:r>
+            <a:r>
+              <a:rPr lang="pt-BR" sz="2000" dirty="0" smtClean="0"/>
+              <a:t>:3306/</a:t>
+            </a:r>
+            <a:r>
+              <a:rPr lang="pt-BR" sz="2000" dirty="0" err="1" smtClean="0"/>
+              <a:t>dbtest</a:t>
+            </a:r>
+            <a:r>
+              <a:rPr lang="pt-BR" sz="2000" dirty="0" smtClean="0">
+                <a:solidFill>
+                  <a:srgbClr val="FFC000"/>
+                </a:solidFill>
+              </a:rPr>
+              <a:t>”, “</a:t>
+            </a:r>
+            <a:r>
+              <a:rPr lang="pt-BR" sz="2000" dirty="0" err="1" smtClean="0"/>
+              <a:t>usuario</a:t>
+            </a:r>
+            <a:r>
+              <a:rPr lang="pt-BR" sz="2000" dirty="0" smtClean="0">
+                <a:solidFill>
+                  <a:srgbClr val="FFC000"/>
+                </a:solidFill>
+              </a:rPr>
+              <a:t>”, “</a:t>
+            </a:r>
+            <a:r>
+              <a:rPr lang="pt-BR" sz="2000" dirty="0" smtClean="0"/>
+              <a:t>senha</a:t>
+            </a:r>
+            <a:r>
+              <a:rPr lang="pt-BR" sz="2000" dirty="0" smtClean="0">
+                <a:solidFill>
+                  <a:srgbClr val="FFC000"/>
+                </a:solidFill>
+              </a:rPr>
+              <a:t>”);</a:t>
+            </a:r>
+            <a:endParaRPr lang="pt-BR" sz="2000" dirty="0" smtClean="0">
+              <a:solidFill>
+                <a:srgbClr val="FFC000"/>
+              </a:solidFill>
+            </a:endParaRPr>
           </a:p>
         </p:txBody>
       </p:sp>
@@ -8848,11 +10510,262 @@
           </a:p>
         </p:txBody>
       </p:sp>
+      <p:sp>
+        <p:nvSpPr>
+          <p:cNvPr id="5" name="Chave direita 4"/>
+          <p:cNvSpPr/>
+          <p:nvPr/>
+        </p:nvSpPr>
+        <p:spPr>
+          <a:xfrm rot="5400000">
+            <a:off x="2987824" y="1124744"/>
+            <a:ext cx="360040" cy="5112568"/>
+          </a:xfrm>
+          <a:prstGeom prst="rightBrace">
+            <a:avLst/>
+          </a:prstGeom>
+          <a:ln w="28575">
+            <a:solidFill>
+              <a:schemeClr val="tx1"/>
+            </a:solidFill>
+          </a:ln>
+        </p:spPr>
+        <p:style>
+          <a:lnRef idx="1">
+            <a:schemeClr val="accent1"/>
+          </a:lnRef>
+          <a:fillRef idx="0">
+            <a:schemeClr val="accent1"/>
+          </a:fillRef>
+          <a:effectRef idx="0">
+            <a:schemeClr val="accent1"/>
+          </a:effectRef>
+          <a:fontRef idx="minor">
+            <a:schemeClr val="tx1"/>
+          </a:fontRef>
+        </p:style>
+        <p:txBody>
+          <a:bodyPr rtlCol="0" anchor="ctr"/>
+          <a:lstStyle/>
+          <a:p>
+            <a:pPr algn="ctr"/>
+            <a:endParaRPr lang="pt-BR"/>
+          </a:p>
+        </p:txBody>
+      </p:sp>
+      <p:sp>
+        <p:nvSpPr>
+          <p:cNvPr id="6" name="Chave direita 5"/>
+          <p:cNvSpPr/>
+          <p:nvPr/>
+        </p:nvSpPr>
+        <p:spPr>
+          <a:xfrm rot="5400000">
+            <a:off x="6264188" y="3248980"/>
+            <a:ext cx="360040" cy="864096"/>
+          </a:xfrm>
+          <a:prstGeom prst="rightBrace">
+            <a:avLst/>
+          </a:prstGeom>
+          <a:ln w="28575">
+            <a:solidFill>
+              <a:schemeClr val="tx1"/>
+            </a:solidFill>
+          </a:ln>
+        </p:spPr>
+        <p:style>
+          <a:lnRef idx="1">
+            <a:schemeClr val="accent1"/>
+          </a:lnRef>
+          <a:fillRef idx="0">
+            <a:schemeClr val="accent1"/>
+          </a:fillRef>
+          <a:effectRef idx="0">
+            <a:schemeClr val="accent1"/>
+          </a:effectRef>
+          <a:fontRef idx="minor">
+            <a:schemeClr val="tx1"/>
+          </a:fontRef>
+        </p:style>
+        <p:txBody>
+          <a:bodyPr rtlCol="0" anchor="ctr"/>
+          <a:lstStyle/>
+          <a:p>
+            <a:pPr algn="ctr"/>
+            <a:endParaRPr lang="pt-BR"/>
+          </a:p>
+        </p:txBody>
+      </p:sp>
+      <p:sp>
+        <p:nvSpPr>
+          <p:cNvPr id="8" name="Chave direita 7"/>
+          <p:cNvSpPr/>
+          <p:nvPr/>
+        </p:nvSpPr>
+        <p:spPr>
+          <a:xfrm rot="5400000">
+            <a:off x="7344308" y="3248980"/>
+            <a:ext cx="360040" cy="864096"/>
+          </a:xfrm>
+          <a:prstGeom prst="rightBrace">
+            <a:avLst/>
+          </a:prstGeom>
+          <a:ln w="28575">
+            <a:solidFill>
+              <a:schemeClr val="tx1"/>
+            </a:solidFill>
+          </a:ln>
+        </p:spPr>
+        <p:style>
+          <a:lnRef idx="1">
+            <a:schemeClr val="accent1"/>
+          </a:lnRef>
+          <a:fillRef idx="0">
+            <a:schemeClr val="accent1"/>
+          </a:fillRef>
+          <a:effectRef idx="0">
+            <a:schemeClr val="accent1"/>
+          </a:effectRef>
+          <a:fontRef idx="minor">
+            <a:schemeClr val="tx1"/>
+          </a:fontRef>
+        </p:style>
+        <p:txBody>
+          <a:bodyPr rtlCol="0" anchor="ctr"/>
+          <a:lstStyle/>
+          <a:p>
+            <a:pPr algn="ctr"/>
+            <a:endParaRPr lang="pt-BR"/>
+          </a:p>
+        </p:txBody>
+      </p:sp>
+      <p:sp>
+        <p:nvSpPr>
+          <p:cNvPr id="9" name="CaixaDeTexto 8"/>
+          <p:cNvSpPr txBox="1"/>
+          <p:nvPr/>
+        </p:nvSpPr>
+        <p:spPr>
+          <a:xfrm>
+            <a:off x="1475656" y="4005064"/>
+            <a:ext cx="3342582" cy="584775"/>
+          </a:xfrm>
+          <a:prstGeom prst="rect">
+            <a:avLst/>
+          </a:prstGeom>
+          <a:noFill/>
+          <a:ln>
+            <a:solidFill>
+              <a:schemeClr val="tx1"/>
+            </a:solidFill>
+          </a:ln>
+        </p:spPr>
+        <p:txBody>
+          <a:bodyPr wrap="none" rtlCol="0">
+            <a:spAutoFit/>
+          </a:bodyPr>
+          <a:lstStyle/>
+          <a:p>
+            <a:pPr algn="ctr"/>
+            <a:r>
+              <a:rPr lang="pt-BR" sz="1600" b="1" dirty="0" smtClean="0"/>
+              <a:t>URL de conexão</a:t>
+            </a:r>
+          </a:p>
+          <a:p>
+            <a:pPr algn="ctr"/>
+            <a:r>
+              <a:rPr lang="pt-BR" sz="1600" b="1" dirty="0" smtClean="0"/>
+              <a:t>(Caminho/endereço do servidor)</a:t>
+            </a:r>
+            <a:endParaRPr lang="pt-BR" sz="1600" b="1" dirty="0"/>
+          </a:p>
+        </p:txBody>
+      </p:sp>
+      <p:sp>
+        <p:nvSpPr>
+          <p:cNvPr id="10" name="CaixaDeTexto 9"/>
+          <p:cNvSpPr txBox="1"/>
+          <p:nvPr/>
+        </p:nvSpPr>
+        <p:spPr>
+          <a:xfrm>
+            <a:off x="5868144" y="4077072"/>
+            <a:ext cx="1008112" cy="432048"/>
+          </a:xfrm>
+          <a:prstGeom prst="rect">
+            <a:avLst/>
+          </a:prstGeom>
+          <a:noFill/>
+          <a:ln>
+            <a:solidFill>
+              <a:schemeClr val="tx1"/>
+            </a:solidFill>
+          </a:ln>
+        </p:spPr>
+        <p:txBody>
+          <a:bodyPr wrap="square" rtlCol="0" anchor="ctr">
+            <a:noAutofit/>
+          </a:bodyPr>
+          <a:lstStyle/>
+          <a:p>
+            <a:pPr algn="ctr"/>
+            <a:r>
+              <a:rPr lang="pt-BR" sz="1600" b="1" dirty="0" smtClean="0"/>
+              <a:t>Usuário</a:t>
+            </a:r>
+            <a:endParaRPr lang="pt-BR" sz="1600" b="1" dirty="0"/>
+          </a:p>
+        </p:txBody>
+      </p:sp>
+      <p:sp>
+        <p:nvSpPr>
+          <p:cNvPr id="11" name="CaixaDeTexto 10"/>
+          <p:cNvSpPr txBox="1"/>
+          <p:nvPr/>
+        </p:nvSpPr>
+        <p:spPr>
+          <a:xfrm>
+            <a:off x="7020272" y="4077072"/>
+            <a:ext cx="1008112" cy="432048"/>
+          </a:xfrm>
+          <a:prstGeom prst="rect">
+            <a:avLst/>
+          </a:prstGeom>
+          <a:noFill/>
+          <a:ln>
+            <a:solidFill>
+              <a:schemeClr val="tx1"/>
+            </a:solidFill>
+          </a:ln>
+        </p:spPr>
+        <p:txBody>
+          <a:bodyPr wrap="square" rtlCol="0" anchor="ctr">
+            <a:noAutofit/>
+          </a:bodyPr>
+          <a:lstStyle/>
+          <a:p>
+            <a:pPr algn="ctr"/>
+            <a:r>
+              <a:rPr lang="pt-BR" sz="1600" b="1" dirty="0" smtClean="0"/>
+              <a:t>Senha</a:t>
+            </a:r>
+            <a:endParaRPr lang="pt-BR" sz="1600" b="1" dirty="0"/>
+          </a:p>
+        </p:txBody>
+      </p:sp>
     </p:spTree>
   </p:cSld>
   <p:clrMapOvr>
     <a:masterClrMapping/>
   </p:clrMapOvr>
+  <p:timing>
+    <p:tnLst>
+      <p:par>
+        <p:cTn id="1" dur="indefinite" restart="never" nodeType="tmRoot"/>
+      </p:par>
+    </p:tnLst>
+  </p:timing>
 </p:sld>
 </file>
 
@@ -8891,7 +10804,7 @@
             <a:pPr eaLnBrk="1" hangingPunct="1"/>
             <a:r>
               <a:rPr lang="pt-BR" dirty="0" smtClean="0"/>
-              <a:t>Consultas</a:t>
+              <a:t>Abrindo e fechando conexões</a:t>
             </a:r>
             <a:endParaRPr lang="pt-BR" dirty="0"/>
           </a:p>
@@ -8907,12 +10820,211 @@
             <p:ph idx="1"/>
           </p:nvPr>
         </p:nvSpPr>
-        <p:spPr/>
+        <p:spPr>
+          <a:xfrm>
+            <a:off x="457200" y="1600200"/>
+            <a:ext cx="7931224" cy="4525963"/>
+          </a:xfrm>
+        </p:spPr>
         <p:txBody>
           <a:bodyPr/>
           <a:lstStyle/>
           <a:p>
-            <a:endParaRPr lang="pt-BR"/>
+            <a:r>
+              <a:rPr lang="pt-BR" sz="2800" dirty="0" smtClean="0"/>
+              <a:t>URL de conexão</a:t>
+            </a:r>
+          </a:p>
+          <a:p>
+            <a:pPr indent="-3175">
+              <a:buNone/>
+            </a:pPr>
+            <a:endParaRPr lang="pt-BR" sz="2200" dirty="0" smtClean="0"/>
+          </a:p>
+          <a:p>
+            <a:pPr indent="-3175">
+              <a:buNone/>
+            </a:pPr>
+            <a:r>
+              <a:rPr lang="pt-BR" sz="2200" dirty="0" smtClean="0"/>
+              <a:t>A URL de conexão define o caminho do servidor de dados e é específico para cada </a:t>
+            </a:r>
+            <a:r>
+              <a:rPr lang="pt-BR" sz="2200" dirty="0" err="1" smtClean="0"/>
+              <a:t>driver</a:t>
+            </a:r>
+            <a:r>
+              <a:rPr lang="pt-BR" sz="2200" dirty="0" smtClean="0"/>
+              <a:t> utilizado:</a:t>
+            </a:r>
+          </a:p>
+          <a:p>
+            <a:pPr indent="-3175">
+              <a:buNone/>
+            </a:pPr>
+            <a:endParaRPr lang="pt-BR" sz="2200" dirty="0" smtClean="0"/>
+          </a:p>
+          <a:p>
+            <a:pPr marL="3175" indent="-3175" algn="ctr">
+              <a:buNone/>
+            </a:pPr>
+            <a:r>
+              <a:rPr lang="pt-BR" sz="2000" dirty="0" err="1" smtClean="0">
+                <a:solidFill>
+                  <a:srgbClr val="FFC000"/>
+                </a:solidFill>
+              </a:rPr>
+              <a:t>jdbc</a:t>
+            </a:r>
+            <a:r>
+              <a:rPr lang="pt-BR" sz="2000" dirty="0" smtClean="0">
+                <a:solidFill>
+                  <a:srgbClr val="FFC000"/>
+                </a:solidFill>
+              </a:rPr>
+              <a:t>:</a:t>
+            </a:r>
+            <a:r>
+              <a:rPr lang="pt-BR" sz="2000" dirty="0" err="1" smtClean="0">
+                <a:solidFill>
+                  <a:srgbClr val="FFC000"/>
+                </a:solidFill>
+              </a:rPr>
+              <a:t>mysql</a:t>
+            </a:r>
+            <a:r>
+              <a:rPr lang="pt-BR" sz="2000" dirty="0" smtClean="0">
+                <a:solidFill>
+                  <a:srgbClr val="FFC000"/>
+                </a:solidFill>
+              </a:rPr>
+              <a:t>://servidor:3306/database</a:t>
+            </a:r>
+            <a:endParaRPr lang="pt-BR" sz="2000" dirty="0" smtClean="0">
+              <a:solidFill>
+                <a:srgbClr val="FFC000"/>
+              </a:solidFill>
+            </a:endParaRPr>
+          </a:p>
+          <a:p>
+            <a:pPr marL="3175" indent="-3175" algn="ctr">
+              <a:buNone/>
+            </a:pPr>
+            <a:r>
+              <a:rPr lang="pt-BR" sz="2000" dirty="0" err="1" smtClean="0">
+                <a:solidFill>
+                  <a:srgbClr val="FFC000"/>
+                </a:solidFill>
+              </a:rPr>
+              <a:t>jdbc</a:t>
+            </a:r>
+            <a:r>
+              <a:rPr lang="pt-BR" sz="2000" dirty="0" smtClean="0">
+                <a:solidFill>
+                  <a:srgbClr val="FFC000"/>
+                </a:solidFill>
+              </a:rPr>
+              <a:t>:</a:t>
+            </a:r>
+            <a:r>
+              <a:rPr lang="pt-BR" sz="2000" dirty="0" err="1" smtClean="0">
+                <a:solidFill>
+                  <a:srgbClr val="FFC000"/>
+                </a:solidFill>
+              </a:rPr>
+              <a:t>sqlserver</a:t>
+            </a:r>
+            <a:r>
+              <a:rPr lang="pt-BR" sz="2000" dirty="0" smtClean="0">
+                <a:solidFill>
+                  <a:srgbClr val="FFC000"/>
+                </a:solidFill>
+              </a:rPr>
+              <a:t>://servidor\instancia:1433;</a:t>
+            </a:r>
+            <a:r>
+              <a:rPr lang="pt-BR" sz="2000" dirty="0" err="1" smtClean="0">
+                <a:solidFill>
+                  <a:srgbClr val="FFC000"/>
+                </a:solidFill>
+              </a:rPr>
+              <a:t>databaseName</a:t>
+            </a:r>
+            <a:r>
+              <a:rPr lang="pt-BR" sz="2000" dirty="0" smtClean="0">
+                <a:solidFill>
+                  <a:srgbClr val="FFC000"/>
+                </a:solidFill>
+              </a:rPr>
+              <a:t>=database</a:t>
+            </a:r>
+          </a:p>
+          <a:p>
+            <a:pPr marL="3175" indent="-3175" algn="ctr">
+              <a:buNone/>
+            </a:pPr>
+            <a:r>
+              <a:rPr lang="pt-BR" sz="2000" dirty="0" err="1" smtClean="0">
+                <a:solidFill>
+                  <a:srgbClr val="FFC000"/>
+                </a:solidFill>
+              </a:rPr>
+              <a:t>jdbc</a:t>
+            </a:r>
+            <a:r>
+              <a:rPr lang="pt-BR" sz="2000" dirty="0" smtClean="0">
+                <a:solidFill>
+                  <a:srgbClr val="FFC000"/>
+                </a:solidFill>
+              </a:rPr>
+              <a:t>:</a:t>
+            </a:r>
+            <a:r>
+              <a:rPr lang="pt-BR" sz="2000" dirty="0" err="1" smtClean="0">
+                <a:solidFill>
+                  <a:srgbClr val="FFC000"/>
+                </a:solidFill>
+              </a:rPr>
+              <a:t>oracle</a:t>
+            </a:r>
+            <a:r>
+              <a:rPr lang="pt-BR" sz="2000" dirty="0" smtClean="0">
+                <a:solidFill>
+                  <a:srgbClr val="FFC000"/>
+                </a:solidFill>
+              </a:rPr>
+              <a:t>:</a:t>
+            </a:r>
+            <a:r>
+              <a:rPr lang="pt-BR" sz="2000" dirty="0" err="1" smtClean="0">
+                <a:solidFill>
+                  <a:srgbClr val="FFC000"/>
+                </a:solidFill>
+              </a:rPr>
+              <a:t>thin</a:t>
+            </a:r>
+            <a:r>
+              <a:rPr lang="pt-BR" sz="2000" dirty="0" smtClean="0">
+                <a:solidFill>
+                  <a:srgbClr val="FFC000"/>
+                </a:solidFill>
+              </a:rPr>
+              <a:t>:</a:t>
+            </a:r>
+            <a:r>
+              <a:rPr lang="pt-BR" sz="2000" dirty="0" smtClean="0">
+                <a:solidFill>
+                  <a:srgbClr val="FFC000"/>
+                </a:solidFill>
+              </a:rPr>
+              <a:t>@servidor:1521:instancia</a:t>
+            </a:r>
+          </a:p>
+          <a:p>
+            <a:pPr indent="-3175">
+              <a:buNone/>
+            </a:pPr>
+            <a:endParaRPr lang="pt-BR" sz="2200" dirty="0" smtClean="0"/>
           </a:p>
         </p:txBody>
       </p:sp>
@@ -8950,6 +11062,13 @@
   <p:clrMapOvr>
     <a:masterClrMapping/>
   </p:clrMapOvr>
+  <p:timing>
+    <p:tnLst>
+      <p:par>
+        <p:cTn id="1" dur="indefinite" restart="never" nodeType="tmRoot"/>
+      </p:par>
+    </p:tnLst>
+  </p:timing>
 </p:sld>
 </file>
 
@@ -8987,16 +11106,8 @@
           <a:p>
             <a:pPr eaLnBrk="1" hangingPunct="1"/>
             <a:r>
-              <a:rPr lang="pt-BR" dirty="0" err="1" smtClean="0"/>
-              <a:t>Stored</a:t>
-            </a:r>
-            <a:r>
               <a:rPr lang="pt-BR" dirty="0" smtClean="0"/>
-              <a:t> </a:t>
-            </a:r>
-            <a:r>
-              <a:rPr lang="pt-BR" dirty="0" err="1" smtClean="0"/>
-              <a:t>procedures</a:t>
+              <a:t>Abrindo e fechando conexões</a:t>
             </a:r>
             <a:endParaRPr lang="pt-BR" dirty="0"/>
           </a:p>
@@ -9017,7 +11128,51 @@
           <a:bodyPr/>
           <a:lstStyle/>
           <a:p>
-            <a:endParaRPr lang="pt-BR"/>
+            <a:r>
+              <a:rPr lang="pt-BR" dirty="0" smtClean="0"/>
+              <a:t>Fechando a conexão</a:t>
+            </a:r>
+          </a:p>
+          <a:p>
+            <a:pPr marL="442913" lvl="1" indent="6350">
+              <a:buNone/>
+            </a:pPr>
+            <a:r>
+              <a:rPr lang="pt-BR" dirty="0" smtClean="0"/>
+              <a:t>Após encerrarmos todas as operações com a base de dados devemos fechar a conexão utilizada:</a:t>
+            </a:r>
+          </a:p>
+          <a:p>
+            <a:pPr marL="442913" lvl="1" indent="6350">
+              <a:buNone/>
+            </a:pPr>
+            <a:endParaRPr lang="pt-BR" dirty="0" smtClean="0"/>
+          </a:p>
+          <a:p>
+            <a:pPr marL="442913" lvl="1" indent="6350" algn="ctr">
+              <a:buNone/>
+            </a:pPr>
+            <a:r>
+              <a:rPr lang="pt-BR" dirty="0" err="1" smtClean="0">
+                <a:solidFill>
+                  <a:srgbClr val="FFC000"/>
+                </a:solidFill>
+              </a:rPr>
+              <a:t>cn</a:t>
+            </a:r>
+            <a:r>
+              <a:rPr lang="pt-BR" dirty="0" smtClean="0">
+                <a:solidFill>
+                  <a:srgbClr val="FFC000"/>
+                </a:solidFill>
+              </a:rPr>
+              <a:t>.close();</a:t>
+            </a:r>
+            <a:endParaRPr lang="pt-BR" dirty="0">
+              <a:solidFill>
+                <a:srgbClr val="FFC000"/>
+              </a:solidFill>
+            </a:endParaRPr>
           </a:p>
         </p:txBody>
       </p:sp>
@@ -9050,11 +11205,120 @@
           </a:p>
         </p:txBody>
       </p:sp>
+      <p:sp>
+        <p:nvSpPr>
+          <p:cNvPr id="5" name="Chave direita 4"/>
+          <p:cNvSpPr/>
+          <p:nvPr/>
+        </p:nvSpPr>
+        <p:spPr>
+          <a:xfrm rot="5400000">
+            <a:off x="3712258" y="4144725"/>
+            <a:ext cx="279323" cy="576064"/>
+          </a:xfrm>
+          <a:prstGeom prst="rightBrace">
+            <a:avLst/>
+          </a:prstGeom>
+          <a:ln w="28575">
+            <a:solidFill>
+              <a:schemeClr val="tx1"/>
+            </a:solidFill>
+          </a:ln>
+        </p:spPr>
+        <p:style>
+          <a:lnRef idx="1">
+            <a:schemeClr val="accent1"/>
+          </a:lnRef>
+          <a:fillRef idx="0">
+            <a:schemeClr val="accent1"/>
+          </a:fillRef>
+          <a:effectRef idx="0">
+            <a:schemeClr val="accent1"/>
+          </a:effectRef>
+          <a:fontRef idx="minor">
+            <a:schemeClr val="tx1"/>
+          </a:fontRef>
+        </p:style>
+        <p:txBody>
+          <a:bodyPr rtlCol="0" anchor="ctr"/>
+          <a:lstStyle/>
+          <a:p>
+            <a:pPr algn="ctr"/>
+            <a:endParaRPr lang="pt-BR"/>
+          </a:p>
+        </p:txBody>
+      </p:sp>
+      <p:sp>
+        <p:nvSpPr>
+          <p:cNvPr id="6" name="CaixaDeTexto 5"/>
+          <p:cNvSpPr txBox="1"/>
+          <p:nvPr/>
+        </p:nvSpPr>
+        <p:spPr>
+          <a:xfrm>
+            <a:off x="1985749" y="4716433"/>
+            <a:ext cx="3762569" cy="646331"/>
+          </a:xfrm>
+          <a:prstGeom prst="rect">
+            <a:avLst/>
+          </a:prstGeom>
+          <a:noFill/>
+          <a:ln>
+            <a:solidFill>
+              <a:schemeClr val="tx1"/>
+            </a:solidFill>
+          </a:ln>
+        </p:spPr>
+        <p:txBody>
+          <a:bodyPr wrap="none" rtlCol="0">
+            <a:spAutoFit/>
+          </a:bodyPr>
+          <a:lstStyle/>
+          <a:p>
+            <a:pPr algn="ctr"/>
+            <a:r>
+              <a:rPr lang="pt-BR" b="1" dirty="0" smtClean="0"/>
+              <a:t>Instância de </a:t>
+            </a:r>
+            <a:r>
+              <a:rPr lang="pt-BR" b="1" dirty="0" err="1" smtClean="0"/>
+              <a:t>java</a:t>
+            </a:r>
+            <a:r>
+              <a:rPr lang="pt-BR" b="1" dirty="0" smtClean="0"/>
+              <a:t>.</a:t>
+            </a:r>
+            <a:r>
+              <a:rPr lang="pt-BR" b="1" dirty="0" err="1" smtClean="0"/>
+              <a:t>sql</a:t>
+            </a:r>
+            <a:r>
+              <a:rPr lang="pt-BR" b="1" dirty="0" smtClean="0"/>
+              <a:t>.Connection</a:t>
+            </a:r>
+          </a:p>
+          <a:p>
+            <a:pPr algn="ctr"/>
+            <a:r>
+              <a:rPr lang="pt-BR" b="1" dirty="0" smtClean="0"/>
+              <a:t>utilizada como conexão</a:t>
+            </a:r>
+            <a:endParaRPr lang="pt-BR" b="1" dirty="0"/>
+          </a:p>
+        </p:txBody>
+      </p:sp>
     </p:spTree>
   </p:cSld>
   <p:clrMapOvr>
     <a:masterClrMapping/>
   </p:clrMapOvr>
+  <p:timing>
+    <p:tnLst>
+      <p:par>
+        <p:cTn id="1" dur="indefinite" restart="never" nodeType="tmRoot"/>
+      </p:par>
+    </p:tnLst>
+  </p:timing>
 </p:sld>
 </file>
 
@@ -9093,36 +11357,548 @@
             <a:pPr eaLnBrk="1" hangingPunct="1"/>
             <a:r>
               <a:rPr lang="pt-BR" dirty="0" smtClean="0"/>
-              <a:t>Design </a:t>
-            </a:r>
-            <a:r>
-              <a:rPr lang="pt-BR" dirty="0" err="1" smtClean="0"/>
-              <a:t>pattern</a:t>
-            </a:r>
+              <a:t>Abrindo e fechando conexões</a:t>
+            </a:r>
+            <a:endParaRPr lang="pt-BR" dirty="0"/>
+          </a:p>
+        </p:txBody>
+      </p:sp>
+      <p:sp>
+        <p:nvSpPr>
+          <p:cNvPr id="3" name="Espaço Reservado para Conteúdo 2"/>
+          <p:cNvSpPr>
+            <a:spLocks noGrp="1"/>
+          </p:cNvSpPr>
+          <p:nvPr>
+            <p:ph idx="1"/>
+          </p:nvPr>
+        </p:nvSpPr>
+        <p:spPr>
+          <a:xfrm>
+            <a:off x="457200" y="1600200"/>
+            <a:ext cx="8147248" cy="4525963"/>
+          </a:xfrm>
+        </p:spPr>
+        <p:txBody>
+          <a:bodyPr/>
+          <a:lstStyle/>
+          <a:p>
             <a:r>
               <a:rPr lang="pt-BR" dirty="0" smtClean="0"/>
-              <a:t> DAO/VO</a:t>
-            </a:r>
-            <a:endParaRPr lang="pt-BR" dirty="0"/>
-          </a:p>
-        </p:txBody>
-      </p:sp>
-      <p:sp>
-        <p:nvSpPr>
-          <p:cNvPr id="3" name="Espaço Reservado para Conteúdo 2"/>
-          <p:cNvSpPr>
-            <a:spLocks noGrp="1"/>
-          </p:cNvSpPr>
-          <p:nvPr>
-            <p:ph idx="1"/>
-          </p:nvPr>
-        </p:nvSpPr>
-        <p:spPr/>
-        <p:txBody>
-          <a:bodyPr/>
-          <a:lstStyle/>
-          <a:p>
-            <a:endParaRPr lang="pt-BR"/>
+              <a:t>Fechando a conexão</a:t>
+            </a:r>
+          </a:p>
+          <a:p>
+            <a:pPr marL="442913" lvl="1" indent="6350">
+              <a:buNone/>
+            </a:pPr>
+            <a:r>
+              <a:rPr lang="pt-BR" sz="2200" dirty="0" smtClean="0"/>
+              <a:t>Tanto a abertura quanto o fechamento da conexão requerem o tratamento da exceção </a:t>
+            </a:r>
+            <a:r>
+              <a:rPr lang="pt-BR" sz="2200" dirty="0" err="1" smtClean="0"/>
+              <a:t>SQLException</a:t>
+            </a:r>
+            <a:r>
+              <a:rPr lang="pt-BR" sz="2200" dirty="0" smtClean="0"/>
+              <a:t>:</a:t>
+            </a:r>
+          </a:p>
+          <a:p>
+            <a:pPr marL="442913" lvl="1" indent="6350">
+              <a:spcBef>
+                <a:spcPts val="0"/>
+              </a:spcBef>
+              <a:buNone/>
+            </a:pPr>
+            <a:endParaRPr lang="pt-BR" sz="2000" dirty="0" smtClean="0"/>
+          </a:p>
+          <a:p>
+            <a:pPr marL="442913" lvl="1" indent="6350">
+              <a:spcBef>
+                <a:spcPts val="0"/>
+              </a:spcBef>
+              <a:buNone/>
+            </a:pPr>
+            <a:r>
+              <a:rPr lang="pt-BR" sz="2000" dirty="0" err="1" smtClean="0">
+                <a:solidFill>
+                  <a:srgbClr val="FFC000"/>
+                </a:solidFill>
+              </a:rPr>
+              <a:t>try</a:t>
+            </a:r>
+            <a:r>
+              <a:rPr lang="pt-BR" sz="2000" dirty="0" smtClean="0">
+                <a:solidFill>
+                  <a:srgbClr val="FFC000"/>
+                </a:solidFill>
+              </a:rPr>
+              <a:t> {</a:t>
+            </a:r>
+            <a:endParaRPr lang="pt-BR" sz="2000" dirty="0" smtClean="0">
+              <a:solidFill>
+                <a:srgbClr val="FFC000"/>
+              </a:solidFill>
+            </a:endParaRPr>
+          </a:p>
+          <a:p>
+            <a:pPr marL="442913" lvl="1" indent="6350">
+              <a:spcBef>
+                <a:spcPts val="0"/>
+              </a:spcBef>
+              <a:buNone/>
+            </a:pPr>
+            <a:r>
+              <a:rPr lang="pt-BR" sz="2000" dirty="0" smtClean="0">
+                <a:solidFill>
+                  <a:srgbClr val="FFC000"/>
+                </a:solidFill>
+              </a:rPr>
+              <a:t>	</a:t>
+            </a:r>
+            <a:r>
+              <a:rPr lang="pt-BR" sz="2000" dirty="0" err="1" smtClean="0">
+                <a:solidFill>
+                  <a:srgbClr val="FFC000"/>
+                </a:solidFill>
+              </a:rPr>
+              <a:t>Class</a:t>
+            </a:r>
+            <a:r>
+              <a:rPr lang="pt-BR" sz="2000" dirty="0" smtClean="0">
+                <a:solidFill>
+                  <a:srgbClr val="FFC000"/>
+                </a:solidFill>
+              </a:rPr>
+              <a:t>.</a:t>
+            </a:r>
+            <a:r>
+              <a:rPr lang="pt-BR" sz="2000" dirty="0" err="1" smtClean="0">
+                <a:solidFill>
+                  <a:srgbClr val="FFC000"/>
+                </a:solidFill>
+              </a:rPr>
+              <a:t>forName</a:t>
+            </a:r>
+            <a:r>
+              <a:rPr lang="pt-BR" sz="2000" dirty="0" smtClean="0">
+                <a:solidFill>
+                  <a:srgbClr val="FFC000"/>
+                </a:solidFill>
+              </a:rPr>
+              <a:t>(“</a:t>
+            </a:r>
+            <a:r>
+              <a:rPr lang="pt-BR" sz="2000" dirty="0" err="1" smtClean="0">
+                <a:solidFill>
+                  <a:srgbClr val="FFC000"/>
+                </a:solidFill>
+              </a:rPr>
+              <a:t>com.mysql.jdbc.Driver”</a:t>
+            </a:r>
+            <a:r>
+              <a:rPr lang="pt-BR" sz="2000" dirty="0" smtClean="0">
+                <a:solidFill>
+                  <a:srgbClr val="FFC000"/>
+                </a:solidFill>
+              </a:rPr>
+              <a:t>);</a:t>
+            </a:r>
+          </a:p>
+          <a:p>
+            <a:pPr marL="442913" lvl="1" indent="6350">
+              <a:spcBef>
+                <a:spcPts val="0"/>
+              </a:spcBef>
+              <a:buNone/>
+            </a:pPr>
+            <a:r>
+              <a:rPr lang="pt-BR" sz="2000" dirty="0" smtClean="0">
+                <a:solidFill>
+                  <a:srgbClr val="FFC000"/>
+                </a:solidFill>
+              </a:rPr>
+              <a:t>	Connection </a:t>
+            </a:r>
+            <a:r>
+              <a:rPr lang="pt-BR" sz="2000" dirty="0" err="1" smtClean="0">
+                <a:solidFill>
+                  <a:srgbClr val="FFC000"/>
+                </a:solidFill>
+              </a:rPr>
+              <a:t>cn</a:t>
+            </a:r>
+            <a:r>
+              <a:rPr lang="pt-BR" sz="2000" dirty="0" smtClean="0">
+                <a:solidFill>
+                  <a:srgbClr val="FFC000"/>
+                </a:solidFill>
+              </a:rPr>
+              <a:t> = </a:t>
+            </a:r>
+            <a:r>
+              <a:rPr lang="pt-BR" sz="2000" dirty="0" err="1" smtClean="0">
+                <a:solidFill>
+                  <a:srgbClr val="FFC000"/>
+                </a:solidFill>
+              </a:rPr>
+              <a:t>DriverManager</a:t>
+            </a:r>
+            <a:r>
+              <a:rPr lang="pt-BR" sz="2000" dirty="0" smtClean="0">
+                <a:solidFill>
+                  <a:srgbClr val="FFC000"/>
+                </a:solidFill>
+              </a:rPr>
+              <a:t>.</a:t>
+            </a:r>
+            <a:r>
+              <a:rPr lang="pt-BR" sz="2000" dirty="0" err="1" smtClean="0">
+                <a:solidFill>
+                  <a:srgbClr val="FFC000"/>
+                </a:solidFill>
+              </a:rPr>
+              <a:t>getConnection</a:t>
+            </a:r>
+            <a:r>
+              <a:rPr lang="pt-BR" sz="2000" dirty="0" smtClean="0">
+                <a:solidFill>
+                  <a:srgbClr val="FFC000"/>
+                </a:solidFill>
+              </a:rPr>
+              <a:t>(</a:t>
+            </a:r>
+            <a:br>
+              <a:rPr lang="pt-BR" sz="2000" dirty="0" smtClean="0">
+                <a:solidFill>
+                  <a:srgbClr val="FFC000"/>
+                </a:solidFill>
+              </a:rPr>
+            </a:br>
+            <a:r>
+              <a:rPr lang="pt-BR" sz="2000" dirty="0" smtClean="0">
+                <a:solidFill>
+                  <a:srgbClr val="FFC000"/>
+                </a:solidFill>
+              </a:rPr>
+              <a:t>		“</a:t>
+            </a:r>
+            <a:r>
+              <a:rPr lang="pt-BR" sz="2000" dirty="0" err="1" smtClean="0">
+                <a:solidFill>
+                  <a:srgbClr val="FFC000"/>
+                </a:solidFill>
+              </a:rPr>
+              <a:t>jdbc</a:t>
+            </a:r>
+            <a:r>
+              <a:rPr lang="pt-BR" sz="2000" dirty="0" smtClean="0">
+                <a:solidFill>
+                  <a:srgbClr val="FFC000"/>
+                </a:solidFill>
+              </a:rPr>
+              <a:t>:</a:t>
+            </a:r>
+            <a:r>
+              <a:rPr lang="pt-BR" sz="2000" dirty="0" err="1" smtClean="0">
+                <a:solidFill>
+                  <a:srgbClr val="FFC000"/>
+                </a:solidFill>
+              </a:rPr>
+              <a:t>mysql</a:t>
+            </a:r>
+            <a:r>
+              <a:rPr lang="pt-BR" sz="2000" dirty="0" smtClean="0">
+                <a:solidFill>
+                  <a:srgbClr val="FFC000"/>
+                </a:solidFill>
+              </a:rPr>
+              <a:t>://</a:t>
+            </a:r>
+            <a:r>
+              <a:rPr lang="pt-BR" sz="2000" dirty="0" err="1" smtClean="0">
+                <a:solidFill>
+                  <a:srgbClr val="FFC000"/>
+                </a:solidFill>
+              </a:rPr>
+              <a:t>server</a:t>
+            </a:r>
+            <a:r>
+              <a:rPr lang="pt-BR" sz="2000" dirty="0" smtClean="0">
+                <a:solidFill>
+                  <a:srgbClr val="FFC000"/>
+                </a:solidFill>
+              </a:rPr>
+              <a:t>:3306/</a:t>
+            </a:r>
+            <a:r>
+              <a:rPr lang="pt-BR" sz="2000" dirty="0" err="1" smtClean="0">
+                <a:solidFill>
+                  <a:srgbClr val="FFC000"/>
+                </a:solidFill>
+              </a:rPr>
+              <a:t>db</a:t>
+            </a:r>
+            <a:r>
+              <a:rPr lang="pt-BR" sz="2000" dirty="0" smtClean="0">
+                <a:solidFill>
+                  <a:srgbClr val="FFC000"/>
+                </a:solidFill>
+              </a:rPr>
+              <a:t>”, “</a:t>
+            </a:r>
+            <a:r>
+              <a:rPr lang="pt-BR" sz="2000" dirty="0" err="1" smtClean="0">
+                <a:solidFill>
+                  <a:srgbClr val="FFC000"/>
+                </a:solidFill>
+              </a:rPr>
+              <a:t>usuario</a:t>
+            </a:r>
+            <a:r>
+              <a:rPr lang="pt-BR" sz="2000" dirty="0" smtClean="0">
+                <a:solidFill>
+                  <a:srgbClr val="FFC000"/>
+                </a:solidFill>
+              </a:rPr>
+              <a:t>”, “senha”);</a:t>
+            </a:r>
+          </a:p>
+          <a:p>
+            <a:pPr marL="442913" lvl="1" indent="6350">
+              <a:spcBef>
+                <a:spcPts val="0"/>
+              </a:spcBef>
+              <a:buNone/>
+            </a:pPr>
+            <a:r>
+              <a:rPr lang="pt-BR" sz="2000" dirty="0" smtClean="0">
+                <a:solidFill>
+                  <a:schemeClr val="accent6"/>
+                </a:solidFill>
+              </a:rPr>
+              <a:t>	/* ... operações com a base de dados ... */</a:t>
+            </a:r>
+          </a:p>
+          <a:p>
+            <a:pPr marL="442913" lvl="1" indent="6350">
+              <a:spcBef>
+                <a:spcPts val="0"/>
+              </a:spcBef>
+              <a:buNone/>
+            </a:pPr>
+            <a:r>
+              <a:rPr lang="pt-BR" sz="2000" dirty="0" smtClean="0">
+                <a:solidFill>
+                  <a:srgbClr val="FFC000"/>
+                </a:solidFill>
+              </a:rPr>
+              <a:t>	</a:t>
+            </a:r>
+            <a:r>
+              <a:rPr lang="pt-BR" sz="2000" dirty="0" err="1" smtClean="0">
+                <a:solidFill>
+                  <a:srgbClr val="FFC000"/>
+                </a:solidFill>
+              </a:rPr>
+              <a:t>cn</a:t>
+            </a:r>
+            <a:r>
+              <a:rPr lang="pt-BR" sz="2000" dirty="0" smtClean="0">
+                <a:solidFill>
+                  <a:srgbClr val="FFC000"/>
+                </a:solidFill>
+              </a:rPr>
+              <a:t>.close();</a:t>
+            </a:r>
+          </a:p>
+          <a:p>
+            <a:pPr marL="442913" lvl="1" indent="6350">
+              <a:spcBef>
+                <a:spcPts val="0"/>
+              </a:spcBef>
+              <a:buNone/>
+            </a:pPr>
+            <a:r>
+              <a:rPr lang="pt-BR" sz="2000" dirty="0" smtClean="0">
+                <a:solidFill>
+                  <a:srgbClr val="FFC000"/>
+                </a:solidFill>
+              </a:rPr>
+              <a:t>} catch (</a:t>
+            </a:r>
+            <a:r>
+              <a:rPr lang="pt-BR" sz="2000" dirty="0" err="1" smtClean="0">
+                <a:solidFill>
+                  <a:srgbClr val="FFC000"/>
+                </a:solidFill>
+              </a:rPr>
+              <a:t>ClassNotFoundException</a:t>
+            </a:r>
+            <a:r>
+              <a:rPr lang="pt-BR" sz="2000" dirty="0" smtClean="0">
+                <a:solidFill>
+                  <a:srgbClr val="FFC000"/>
+                </a:solidFill>
+              </a:rPr>
+              <a:t> e) {</a:t>
+            </a:r>
+          </a:p>
+          <a:p>
+            <a:pPr marL="442913" lvl="1" indent="6350">
+              <a:spcBef>
+                <a:spcPts val="0"/>
+              </a:spcBef>
+              <a:buNone/>
+            </a:pPr>
+            <a:r>
+              <a:rPr lang="pt-BR" sz="2000" dirty="0" smtClean="0">
+                <a:solidFill>
+                  <a:srgbClr val="FFC000"/>
+                </a:solidFill>
+              </a:rPr>
+              <a:t>	</a:t>
+            </a:r>
+            <a:r>
+              <a:rPr lang="pt-BR" sz="2000" dirty="0" smtClean="0">
+                <a:solidFill>
+                  <a:srgbClr val="FFC000"/>
+                </a:solidFill>
+              </a:rPr>
+              <a:t>System.</a:t>
+            </a:r>
+            <a:r>
+              <a:rPr lang="pt-BR" sz="2000" dirty="0" err="1" smtClean="0">
+                <a:solidFill>
+                  <a:srgbClr val="FFC000"/>
+                </a:solidFill>
+              </a:rPr>
+              <a:t>out.println</a:t>
+            </a:r>
+            <a:r>
+              <a:rPr lang="pt-BR" sz="2000" dirty="0" smtClean="0">
+                <a:solidFill>
+                  <a:srgbClr val="FFC000"/>
+                </a:solidFill>
+              </a:rPr>
+              <a:t>(“Não foi possível carregar o </a:t>
+            </a:r>
+            <a:r>
+              <a:rPr lang="pt-BR" sz="2000" dirty="0" err="1" smtClean="0">
+                <a:solidFill>
+                  <a:srgbClr val="FFC000"/>
+                </a:solidFill>
+              </a:rPr>
+              <a:t>driver</a:t>
+            </a:r>
+            <a:r>
+              <a:rPr lang="pt-BR" sz="2000" dirty="0" smtClean="0">
+                <a:solidFill>
+                  <a:srgbClr val="FFC000"/>
+                </a:solidFill>
+              </a:rPr>
+              <a:t>.”);</a:t>
+            </a:r>
+            <a:endParaRPr lang="pt-BR" sz="2000" dirty="0" smtClean="0">
+              <a:solidFill>
+                <a:srgbClr val="FFC000"/>
+              </a:solidFill>
+            </a:endParaRPr>
+          </a:p>
+          <a:p>
+            <a:pPr marL="442913" lvl="1" indent="6350">
+              <a:spcBef>
+                <a:spcPts val="0"/>
+              </a:spcBef>
+              <a:buNone/>
+            </a:pPr>
+            <a:r>
+              <a:rPr lang="pt-BR" sz="2000" dirty="0" smtClean="0">
+                <a:solidFill>
+                  <a:srgbClr val="FFC000"/>
+                </a:solidFill>
+              </a:rPr>
+              <a:t>} catch (</a:t>
+            </a:r>
+            <a:r>
+              <a:rPr lang="pt-BR" sz="2000" dirty="0" err="1" smtClean="0">
+                <a:solidFill>
+                  <a:srgbClr val="FFC000"/>
+                </a:solidFill>
+              </a:rPr>
+              <a:t>SQLException</a:t>
+            </a:r>
+            <a:r>
+              <a:rPr lang="pt-BR" sz="2000" dirty="0" smtClean="0">
+                <a:solidFill>
+                  <a:srgbClr val="FFC000"/>
+                </a:solidFill>
+              </a:rPr>
+              <a:t> e) {</a:t>
+            </a:r>
+          </a:p>
+          <a:p>
+            <a:pPr marL="442913" lvl="1" indent="6350">
+              <a:spcBef>
+                <a:spcPts val="0"/>
+              </a:spcBef>
+              <a:buNone/>
+            </a:pPr>
+            <a:r>
+              <a:rPr lang="pt-BR" sz="2000" dirty="0" smtClean="0">
+                <a:solidFill>
+                  <a:srgbClr val="FFC000"/>
+                </a:solidFill>
+              </a:rPr>
+              <a:t>	</a:t>
+            </a:r>
+            <a:r>
+              <a:rPr lang="pt-BR" sz="2000" dirty="0" smtClean="0">
+                <a:solidFill>
+                  <a:srgbClr val="FFC000"/>
+                </a:solidFill>
+              </a:rPr>
+              <a:t>System.</a:t>
+            </a:r>
+            <a:r>
+              <a:rPr lang="pt-BR" sz="2000" dirty="0" err="1" smtClean="0">
+                <a:solidFill>
+                  <a:srgbClr val="FFC000"/>
+                </a:solidFill>
+              </a:rPr>
+              <a:t>out.println</a:t>
+            </a:r>
+            <a:r>
+              <a:rPr lang="pt-BR" sz="2000" dirty="0" smtClean="0">
+                <a:solidFill>
+                  <a:srgbClr val="FFC000"/>
+                </a:solidFill>
+              </a:rPr>
+              <a:t>(“Falha ao conectar à base de dados.”);</a:t>
+            </a:r>
+          </a:p>
+          <a:p>
+            <a:pPr marL="442913" lvl="1" indent="6350">
+              <a:spcBef>
+                <a:spcPts val="0"/>
+              </a:spcBef>
+              <a:buNone/>
+            </a:pPr>
+            <a:r>
+              <a:rPr lang="pt-BR" sz="2000" dirty="0" smtClean="0">
+                <a:solidFill>
+                  <a:srgbClr val="FFC000"/>
+                </a:solidFill>
+              </a:rPr>
+              <a:t>}</a:t>
+            </a:r>
+            <a:endParaRPr lang="pt-BR" sz="2000" dirty="0">
+              <a:solidFill>
+                <a:srgbClr val="FFC000"/>
+              </a:solidFill>
+            </a:endParaRPr>
           </a:p>
         </p:txBody>
       </p:sp>
@@ -9160,6 +11936,13 @@
   <p:clrMapOvr>
     <a:masterClrMapping/>
   </p:clrMapOvr>
+  <p:timing>
+    <p:tnLst>
+      <p:par>
+        <p:cTn id="1" dur="indefinite" restart="never" nodeType="tmRoot"/>
+      </p:par>
+    </p:tnLst>
+  </p:timing>
 </p:sld>
 </file>
 
@@ -9261,13 +12044,8 @@
           <a:p>
             <a:r>
               <a:rPr lang="pt-BR" dirty="0" smtClean="0"/>
-              <a:t>Operações </a:t>
-            </a:r>
-            <a:r>
-              <a:rPr lang="pt-BR" dirty="0" smtClean="0"/>
-              <a:t>parametrizadas</a:t>
-            </a:r>
-            <a:endParaRPr lang="pt-BR" dirty="0" smtClean="0"/>
+              <a:t>Operações parametrizadas</a:t>
+            </a:r>
           </a:p>
         </p:txBody>
       </p:sp>
@@ -9325,7 +12103,6 @@
               <a:rPr lang="pt-BR" dirty="0" smtClean="0"/>
               <a:t> DAO e VO</a:t>
             </a:r>
-            <a:endParaRPr lang="pt-BR" dirty="0" smtClean="0"/>
           </a:p>
           <a:p>
             <a:r>
@@ -9412,10 +12189,9 @@
           <a:bodyPr/>
           <a:lstStyle/>
           <a:p>
-            <a:pPr eaLnBrk="1" hangingPunct="1"/>
             <a:r>
               <a:rPr lang="pt-BR" dirty="0" smtClean="0"/>
-              <a:t>Projeto Final</a:t>
+              <a:t>Operações na base de dados</a:t>
             </a:r>
             <a:endParaRPr lang="pt-BR" dirty="0"/>
           </a:p>
@@ -9436,7 +12212,7 @@
           <a:bodyPr/>
           <a:lstStyle/>
           <a:p>
-            <a:endParaRPr lang="pt-BR"/>
+            <a:endParaRPr lang="pt-BR" dirty="0"/>
           </a:p>
         </p:txBody>
       </p:sp>
@@ -9464,6 +12240,632 @@
                 <a:defRPr/>
               </a:pPr>
               <a:t>20</a:t>
+            </a:fld>
+            <a:endParaRPr lang="pt-BR"/>
+          </a:p>
+        </p:txBody>
+      </p:sp>
+    </p:spTree>
+  </p:cSld>
+  <p:clrMapOvr>
+    <a:masterClrMapping/>
+  </p:clrMapOvr>
+  <p:timing>
+    <p:tnLst>
+      <p:par>
+        <p:cTn id="1" dur="indefinite" restart="never" nodeType="tmRoot"/>
+      </p:par>
+    </p:tnLst>
+  </p:timing>
+</p:sld>
+</file>
+
+<file path=ppt/slides/slide21.xml><?xml version="1.0" encoding="utf-8"?>
+<p:sld xmlns:a="http://schemas.openxmlformats.org/drawingml/2006/main" xmlns:r="http://schemas.openxmlformats.org/officeDocument/2006/relationships" xmlns:p="http://schemas.openxmlformats.org/presentationml/2006/main">
+  <p:cSld>
+    <p:spTree>
+      <p:nvGrpSpPr>
+        <p:cNvPr id="1" name=""/>
+        <p:cNvGrpSpPr/>
+        <p:nvPr/>
+      </p:nvGrpSpPr>
+      <p:grpSpPr>
+        <a:xfrm>
+          <a:off x="0" y="0"/>
+          <a:ext cx="0" cy="0"/>
+          <a:chOff x="0" y="0"/>
+          <a:chExt cx="0" cy="0"/>
+        </a:xfrm>
+      </p:grpSpPr>
+      <p:sp>
+        <p:nvSpPr>
+          <p:cNvPr id="2" name="Título 1"/>
+          <p:cNvSpPr>
+            <a:spLocks noGrp="1"/>
+          </p:cNvSpPr>
+          <p:nvPr>
+            <p:ph type="title"/>
+          </p:nvPr>
+        </p:nvSpPr>
+        <p:spPr/>
+        <p:txBody>
+          <a:bodyPr/>
+          <a:lstStyle/>
+          <a:p>
+            <a:pPr eaLnBrk="1" hangingPunct="1"/>
+            <a:r>
+              <a:rPr lang="pt-BR" dirty="0" smtClean="0"/>
+              <a:t>Operações parametrizadas</a:t>
+            </a:r>
+            <a:endParaRPr lang="pt-BR" dirty="0"/>
+          </a:p>
+        </p:txBody>
+      </p:sp>
+      <p:sp>
+        <p:nvSpPr>
+          <p:cNvPr id="3" name="Espaço Reservado para Conteúdo 2"/>
+          <p:cNvSpPr>
+            <a:spLocks noGrp="1"/>
+          </p:cNvSpPr>
+          <p:nvPr>
+            <p:ph idx="1"/>
+          </p:nvPr>
+        </p:nvSpPr>
+        <p:spPr/>
+        <p:txBody>
+          <a:bodyPr/>
+          <a:lstStyle/>
+          <a:p>
+            <a:endParaRPr lang="pt-BR"/>
+          </a:p>
+        </p:txBody>
+      </p:sp>
+      <p:sp>
+        <p:nvSpPr>
+          <p:cNvPr id="4" name="Espaço Reservado para Número de Slide 3"/>
+          <p:cNvSpPr>
+            <a:spLocks noGrp="1"/>
+          </p:cNvSpPr>
+          <p:nvPr>
+            <p:ph type="sldNum" sz="quarter" idx="12"/>
+          </p:nvPr>
+        </p:nvSpPr>
+        <p:spPr/>
+        <p:txBody>
+          <a:bodyPr/>
+          <a:lstStyle/>
+          <a:p>
+            <a:pPr>
+              <a:defRPr/>
+            </a:pPr>
+            <a:fld id="{EF19A0F5-F849-4C78-8624-C3A50979DE44}" type="slidenum">
+              <a:rPr lang="pt-BR" smtClean="0"/>
+              <a:pPr>
+                <a:defRPr/>
+              </a:pPr>
+              <a:t>21</a:t>
+            </a:fld>
+            <a:endParaRPr lang="pt-BR"/>
+          </a:p>
+        </p:txBody>
+      </p:sp>
+    </p:spTree>
+  </p:cSld>
+  <p:clrMapOvr>
+    <a:masterClrMapping/>
+  </p:clrMapOvr>
+  <p:timing>
+    <p:tnLst>
+      <p:par>
+        <p:cTn id="1" dur="indefinite" restart="never" nodeType="tmRoot"/>
+      </p:par>
+    </p:tnLst>
+  </p:timing>
+</p:sld>
+</file>
+
+<file path=ppt/slides/slide22.xml><?xml version="1.0" encoding="utf-8"?>
+<p:sld xmlns:a="http://schemas.openxmlformats.org/drawingml/2006/main" xmlns:r="http://schemas.openxmlformats.org/officeDocument/2006/relationships" xmlns:p="http://schemas.openxmlformats.org/presentationml/2006/main">
+  <p:cSld>
+    <p:spTree>
+      <p:nvGrpSpPr>
+        <p:cNvPr id="1" name=""/>
+        <p:cNvGrpSpPr/>
+        <p:nvPr/>
+      </p:nvGrpSpPr>
+      <p:grpSpPr>
+        <a:xfrm>
+          <a:off x="0" y="0"/>
+          <a:ext cx="0" cy="0"/>
+          <a:chOff x="0" y="0"/>
+          <a:chExt cx="0" cy="0"/>
+        </a:xfrm>
+      </p:grpSpPr>
+      <p:sp>
+        <p:nvSpPr>
+          <p:cNvPr id="2" name="Título 1"/>
+          <p:cNvSpPr>
+            <a:spLocks noGrp="1"/>
+          </p:cNvSpPr>
+          <p:nvPr>
+            <p:ph type="title"/>
+          </p:nvPr>
+        </p:nvSpPr>
+        <p:spPr/>
+        <p:txBody>
+          <a:bodyPr/>
+          <a:lstStyle/>
+          <a:p>
+            <a:pPr eaLnBrk="1" hangingPunct="1"/>
+            <a:r>
+              <a:rPr lang="pt-BR" dirty="0" smtClean="0"/>
+              <a:t>Transações</a:t>
+            </a:r>
+            <a:endParaRPr lang="pt-BR" dirty="0"/>
+          </a:p>
+        </p:txBody>
+      </p:sp>
+      <p:sp>
+        <p:nvSpPr>
+          <p:cNvPr id="3" name="Espaço Reservado para Conteúdo 2"/>
+          <p:cNvSpPr>
+            <a:spLocks noGrp="1"/>
+          </p:cNvSpPr>
+          <p:nvPr>
+            <p:ph idx="1"/>
+          </p:nvPr>
+        </p:nvSpPr>
+        <p:spPr/>
+        <p:txBody>
+          <a:bodyPr/>
+          <a:lstStyle/>
+          <a:p>
+            <a:endParaRPr lang="pt-BR"/>
+          </a:p>
+        </p:txBody>
+      </p:sp>
+      <p:sp>
+        <p:nvSpPr>
+          <p:cNvPr id="4" name="Espaço Reservado para Número de Slide 3"/>
+          <p:cNvSpPr>
+            <a:spLocks noGrp="1"/>
+          </p:cNvSpPr>
+          <p:nvPr>
+            <p:ph type="sldNum" sz="quarter" idx="12"/>
+          </p:nvPr>
+        </p:nvSpPr>
+        <p:spPr/>
+        <p:txBody>
+          <a:bodyPr/>
+          <a:lstStyle/>
+          <a:p>
+            <a:pPr>
+              <a:defRPr/>
+            </a:pPr>
+            <a:fld id="{EF19A0F5-F849-4C78-8624-C3A50979DE44}" type="slidenum">
+              <a:rPr lang="pt-BR" smtClean="0"/>
+              <a:pPr>
+                <a:defRPr/>
+              </a:pPr>
+              <a:t>22</a:t>
+            </a:fld>
+            <a:endParaRPr lang="pt-BR"/>
+          </a:p>
+        </p:txBody>
+      </p:sp>
+    </p:spTree>
+  </p:cSld>
+  <p:clrMapOvr>
+    <a:masterClrMapping/>
+  </p:clrMapOvr>
+  <p:timing>
+    <p:tnLst>
+      <p:par>
+        <p:cTn id="1" dur="indefinite" restart="never" nodeType="tmRoot"/>
+      </p:par>
+    </p:tnLst>
+  </p:timing>
+</p:sld>
+</file>
+
+<file path=ppt/slides/slide23.xml><?xml version="1.0" encoding="utf-8"?>
+<p:sld xmlns:a="http://schemas.openxmlformats.org/drawingml/2006/main" xmlns:r="http://schemas.openxmlformats.org/officeDocument/2006/relationships" xmlns:p="http://schemas.openxmlformats.org/presentationml/2006/main">
+  <p:cSld>
+    <p:spTree>
+      <p:nvGrpSpPr>
+        <p:cNvPr id="1" name=""/>
+        <p:cNvGrpSpPr/>
+        <p:nvPr/>
+      </p:nvGrpSpPr>
+      <p:grpSpPr>
+        <a:xfrm>
+          <a:off x="0" y="0"/>
+          <a:ext cx="0" cy="0"/>
+          <a:chOff x="0" y="0"/>
+          <a:chExt cx="0" cy="0"/>
+        </a:xfrm>
+      </p:grpSpPr>
+      <p:sp>
+        <p:nvSpPr>
+          <p:cNvPr id="2" name="Título 1"/>
+          <p:cNvSpPr>
+            <a:spLocks noGrp="1"/>
+          </p:cNvSpPr>
+          <p:nvPr>
+            <p:ph type="title"/>
+          </p:nvPr>
+        </p:nvSpPr>
+        <p:spPr/>
+        <p:txBody>
+          <a:bodyPr/>
+          <a:lstStyle/>
+          <a:p>
+            <a:pPr eaLnBrk="1" hangingPunct="1"/>
+            <a:r>
+              <a:rPr lang="pt-BR" dirty="0" smtClean="0"/>
+              <a:t>Consultas</a:t>
+            </a:r>
+            <a:endParaRPr lang="pt-BR" dirty="0"/>
+          </a:p>
+        </p:txBody>
+      </p:sp>
+      <p:sp>
+        <p:nvSpPr>
+          <p:cNvPr id="3" name="Espaço Reservado para Conteúdo 2"/>
+          <p:cNvSpPr>
+            <a:spLocks noGrp="1"/>
+          </p:cNvSpPr>
+          <p:nvPr>
+            <p:ph idx="1"/>
+          </p:nvPr>
+        </p:nvSpPr>
+        <p:spPr/>
+        <p:txBody>
+          <a:bodyPr/>
+          <a:lstStyle/>
+          <a:p>
+            <a:endParaRPr lang="pt-BR"/>
+          </a:p>
+        </p:txBody>
+      </p:sp>
+      <p:sp>
+        <p:nvSpPr>
+          <p:cNvPr id="4" name="Espaço Reservado para Número de Slide 3"/>
+          <p:cNvSpPr>
+            <a:spLocks noGrp="1"/>
+          </p:cNvSpPr>
+          <p:nvPr>
+            <p:ph type="sldNum" sz="quarter" idx="12"/>
+          </p:nvPr>
+        </p:nvSpPr>
+        <p:spPr/>
+        <p:txBody>
+          <a:bodyPr/>
+          <a:lstStyle/>
+          <a:p>
+            <a:pPr>
+              <a:defRPr/>
+            </a:pPr>
+            <a:fld id="{EF19A0F5-F849-4C78-8624-C3A50979DE44}" type="slidenum">
+              <a:rPr lang="pt-BR" smtClean="0"/>
+              <a:pPr>
+                <a:defRPr/>
+              </a:pPr>
+              <a:t>23</a:t>
+            </a:fld>
+            <a:endParaRPr lang="pt-BR"/>
+          </a:p>
+        </p:txBody>
+      </p:sp>
+    </p:spTree>
+  </p:cSld>
+  <p:clrMapOvr>
+    <a:masterClrMapping/>
+  </p:clrMapOvr>
+  <p:timing>
+    <p:tnLst>
+      <p:par>
+        <p:cTn id="1" dur="indefinite" restart="never" nodeType="tmRoot"/>
+      </p:par>
+    </p:tnLst>
+  </p:timing>
+</p:sld>
+</file>
+
+<file path=ppt/slides/slide24.xml><?xml version="1.0" encoding="utf-8"?>
+<p:sld xmlns:a="http://schemas.openxmlformats.org/drawingml/2006/main" xmlns:r="http://schemas.openxmlformats.org/officeDocument/2006/relationships" xmlns:p="http://schemas.openxmlformats.org/presentationml/2006/main">
+  <p:cSld>
+    <p:spTree>
+      <p:nvGrpSpPr>
+        <p:cNvPr id="1" name=""/>
+        <p:cNvGrpSpPr/>
+        <p:nvPr/>
+      </p:nvGrpSpPr>
+      <p:grpSpPr>
+        <a:xfrm>
+          <a:off x="0" y="0"/>
+          <a:ext cx="0" cy="0"/>
+          <a:chOff x="0" y="0"/>
+          <a:chExt cx="0" cy="0"/>
+        </a:xfrm>
+      </p:grpSpPr>
+      <p:sp>
+        <p:nvSpPr>
+          <p:cNvPr id="2" name="Título 1"/>
+          <p:cNvSpPr>
+            <a:spLocks noGrp="1"/>
+          </p:cNvSpPr>
+          <p:nvPr>
+            <p:ph type="title"/>
+          </p:nvPr>
+        </p:nvSpPr>
+        <p:spPr/>
+        <p:txBody>
+          <a:bodyPr/>
+          <a:lstStyle/>
+          <a:p>
+            <a:pPr eaLnBrk="1" hangingPunct="1"/>
+            <a:r>
+              <a:rPr lang="pt-BR" dirty="0" err="1" smtClean="0"/>
+              <a:t>Stored</a:t>
+            </a:r>
+            <a:r>
+              <a:rPr lang="pt-BR" dirty="0" smtClean="0"/>
+              <a:t> </a:t>
+            </a:r>
+            <a:r>
+              <a:rPr lang="pt-BR" dirty="0" err="1" smtClean="0"/>
+              <a:t>procedures</a:t>
+            </a:r>
+            <a:endParaRPr lang="pt-BR" dirty="0"/>
+          </a:p>
+        </p:txBody>
+      </p:sp>
+      <p:sp>
+        <p:nvSpPr>
+          <p:cNvPr id="3" name="Espaço Reservado para Conteúdo 2"/>
+          <p:cNvSpPr>
+            <a:spLocks noGrp="1"/>
+          </p:cNvSpPr>
+          <p:nvPr>
+            <p:ph idx="1"/>
+          </p:nvPr>
+        </p:nvSpPr>
+        <p:spPr/>
+        <p:txBody>
+          <a:bodyPr/>
+          <a:lstStyle/>
+          <a:p>
+            <a:endParaRPr lang="pt-BR"/>
+          </a:p>
+        </p:txBody>
+      </p:sp>
+      <p:sp>
+        <p:nvSpPr>
+          <p:cNvPr id="4" name="Espaço Reservado para Número de Slide 3"/>
+          <p:cNvSpPr>
+            <a:spLocks noGrp="1"/>
+          </p:cNvSpPr>
+          <p:nvPr>
+            <p:ph type="sldNum" sz="quarter" idx="12"/>
+          </p:nvPr>
+        </p:nvSpPr>
+        <p:spPr/>
+        <p:txBody>
+          <a:bodyPr/>
+          <a:lstStyle/>
+          <a:p>
+            <a:pPr>
+              <a:defRPr/>
+            </a:pPr>
+            <a:fld id="{EF19A0F5-F849-4C78-8624-C3A50979DE44}" type="slidenum">
+              <a:rPr lang="pt-BR" smtClean="0"/>
+              <a:pPr>
+                <a:defRPr/>
+              </a:pPr>
+              <a:t>24</a:t>
+            </a:fld>
+            <a:endParaRPr lang="pt-BR"/>
+          </a:p>
+        </p:txBody>
+      </p:sp>
+    </p:spTree>
+  </p:cSld>
+  <p:clrMapOvr>
+    <a:masterClrMapping/>
+  </p:clrMapOvr>
+</p:sld>
+</file>
+
+<file path=ppt/slides/slide25.xml><?xml version="1.0" encoding="utf-8"?>
+<p:sld xmlns:a="http://schemas.openxmlformats.org/drawingml/2006/main" xmlns:r="http://schemas.openxmlformats.org/officeDocument/2006/relationships" xmlns:p="http://schemas.openxmlformats.org/presentationml/2006/main">
+  <p:cSld>
+    <p:spTree>
+      <p:nvGrpSpPr>
+        <p:cNvPr id="1" name=""/>
+        <p:cNvGrpSpPr/>
+        <p:nvPr/>
+      </p:nvGrpSpPr>
+      <p:grpSpPr>
+        <a:xfrm>
+          <a:off x="0" y="0"/>
+          <a:ext cx="0" cy="0"/>
+          <a:chOff x="0" y="0"/>
+          <a:chExt cx="0" cy="0"/>
+        </a:xfrm>
+      </p:grpSpPr>
+      <p:sp>
+        <p:nvSpPr>
+          <p:cNvPr id="2" name="Título 1"/>
+          <p:cNvSpPr>
+            <a:spLocks noGrp="1"/>
+          </p:cNvSpPr>
+          <p:nvPr>
+            <p:ph type="title"/>
+          </p:nvPr>
+        </p:nvSpPr>
+        <p:spPr/>
+        <p:txBody>
+          <a:bodyPr/>
+          <a:lstStyle/>
+          <a:p>
+            <a:pPr eaLnBrk="1" hangingPunct="1"/>
+            <a:r>
+              <a:rPr lang="pt-BR" dirty="0" smtClean="0"/>
+              <a:t>Design </a:t>
+            </a:r>
+            <a:r>
+              <a:rPr lang="pt-BR" dirty="0" err="1" smtClean="0"/>
+              <a:t>pattern</a:t>
+            </a:r>
+            <a:r>
+              <a:rPr lang="pt-BR" dirty="0" smtClean="0"/>
+              <a:t> DAO/VO</a:t>
+            </a:r>
+            <a:endParaRPr lang="pt-BR" dirty="0"/>
+          </a:p>
+        </p:txBody>
+      </p:sp>
+      <p:sp>
+        <p:nvSpPr>
+          <p:cNvPr id="3" name="Espaço Reservado para Conteúdo 2"/>
+          <p:cNvSpPr>
+            <a:spLocks noGrp="1"/>
+          </p:cNvSpPr>
+          <p:nvPr>
+            <p:ph idx="1"/>
+          </p:nvPr>
+        </p:nvSpPr>
+        <p:spPr/>
+        <p:txBody>
+          <a:bodyPr/>
+          <a:lstStyle/>
+          <a:p>
+            <a:endParaRPr lang="pt-BR"/>
+          </a:p>
+        </p:txBody>
+      </p:sp>
+      <p:sp>
+        <p:nvSpPr>
+          <p:cNvPr id="4" name="Espaço Reservado para Número de Slide 3"/>
+          <p:cNvSpPr>
+            <a:spLocks noGrp="1"/>
+          </p:cNvSpPr>
+          <p:nvPr>
+            <p:ph type="sldNum" sz="quarter" idx="12"/>
+          </p:nvPr>
+        </p:nvSpPr>
+        <p:spPr/>
+        <p:txBody>
+          <a:bodyPr/>
+          <a:lstStyle/>
+          <a:p>
+            <a:pPr>
+              <a:defRPr/>
+            </a:pPr>
+            <a:fld id="{EF19A0F5-F849-4C78-8624-C3A50979DE44}" type="slidenum">
+              <a:rPr lang="pt-BR" smtClean="0"/>
+              <a:pPr>
+                <a:defRPr/>
+              </a:pPr>
+              <a:t>25</a:t>
+            </a:fld>
+            <a:endParaRPr lang="pt-BR"/>
+          </a:p>
+        </p:txBody>
+      </p:sp>
+    </p:spTree>
+  </p:cSld>
+  <p:clrMapOvr>
+    <a:masterClrMapping/>
+  </p:clrMapOvr>
+</p:sld>
+</file>
+
+<file path=ppt/slides/slide26.xml><?xml version="1.0" encoding="utf-8"?>
+<p:sld xmlns:a="http://schemas.openxmlformats.org/drawingml/2006/main" xmlns:r="http://schemas.openxmlformats.org/officeDocument/2006/relationships" xmlns:p="http://schemas.openxmlformats.org/presentationml/2006/main">
+  <p:cSld>
+    <p:spTree>
+      <p:nvGrpSpPr>
+        <p:cNvPr id="1" name=""/>
+        <p:cNvGrpSpPr/>
+        <p:nvPr/>
+      </p:nvGrpSpPr>
+      <p:grpSpPr>
+        <a:xfrm>
+          <a:off x="0" y="0"/>
+          <a:ext cx="0" cy="0"/>
+          <a:chOff x="0" y="0"/>
+          <a:chExt cx="0" cy="0"/>
+        </a:xfrm>
+      </p:grpSpPr>
+      <p:sp>
+        <p:nvSpPr>
+          <p:cNvPr id="2" name="Título 1"/>
+          <p:cNvSpPr>
+            <a:spLocks noGrp="1"/>
+          </p:cNvSpPr>
+          <p:nvPr>
+            <p:ph type="title"/>
+          </p:nvPr>
+        </p:nvSpPr>
+        <p:spPr/>
+        <p:txBody>
+          <a:bodyPr/>
+          <a:lstStyle/>
+          <a:p>
+            <a:pPr eaLnBrk="1" hangingPunct="1"/>
+            <a:r>
+              <a:rPr lang="pt-BR" dirty="0" smtClean="0"/>
+              <a:t>Projeto Final</a:t>
+            </a:r>
+            <a:endParaRPr lang="pt-BR" dirty="0"/>
+          </a:p>
+        </p:txBody>
+      </p:sp>
+      <p:sp>
+        <p:nvSpPr>
+          <p:cNvPr id="3" name="Espaço Reservado para Conteúdo 2"/>
+          <p:cNvSpPr>
+            <a:spLocks noGrp="1"/>
+          </p:cNvSpPr>
+          <p:nvPr>
+            <p:ph idx="1"/>
+          </p:nvPr>
+        </p:nvSpPr>
+        <p:spPr/>
+        <p:txBody>
+          <a:bodyPr/>
+          <a:lstStyle/>
+          <a:p>
+            <a:endParaRPr lang="pt-BR"/>
+          </a:p>
+        </p:txBody>
+      </p:sp>
+      <p:sp>
+        <p:nvSpPr>
+          <p:cNvPr id="4" name="Espaço Reservado para Número de Slide 3"/>
+          <p:cNvSpPr>
+            <a:spLocks noGrp="1"/>
+          </p:cNvSpPr>
+          <p:nvPr>
+            <p:ph type="sldNum" sz="quarter" idx="12"/>
+          </p:nvPr>
+        </p:nvSpPr>
+        <p:spPr/>
+        <p:txBody>
+          <a:bodyPr/>
+          <a:lstStyle/>
+          <a:p>
+            <a:pPr>
+              <a:defRPr/>
+            </a:pPr>
+            <a:fld id="{EF19A0F5-F849-4C78-8624-C3A50979DE44}" type="slidenum">
+              <a:rPr lang="pt-BR" smtClean="0"/>
+              <a:pPr>
+                <a:defRPr/>
+              </a:pPr>
+              <a:t>26</a:t>
             </a:fld>
             <a:endParaRPr lang="pt-BR"/>
           </a:p>
@@ -10352,7 +13754,6 @@
               <a:rPr lang="pt-BR" dirty="0" smtClean="0"/>
               <a:t>Introdução</a:t>
             </a:r>
-            <a:endParaRPr lang="pt-BR" dirty="0" smtClean="0"/>
           </a:p>
         </p:txBody>
       </p:sp>
@@ -10397,27 +13798,7 @@
             </a:r>
             <a:r>
               <a:rPr lang="pt-BR" sz="2400" dirty="0" smtClean="0"/>
-              <a:t>) é uma especificação </a:t>
-            </a:r>
-            <a:r>
-              <a:rPr lang="pt-BR" sz="2400" dirty="0" smtClean="0"/>
-              <a:t>elaborada pela </a:t>
-            </a:r>
-            <a:r>
-              <a:rPr lang="pt-BR" sz="2400" dirty="0" smtClean="0"/>
-              <a:t>antiga Sun para </a:t>
-            </a:r>
-            <a:r>
-              <a:rPr lang="pt-BR" sz="2400" dirty="0" smtClean="0"/>
-              <a:t>prover </a:t>
-            </a:r>
-            <a:r>
-              <a:rPr lang="pt-BR" sz="2400" dirty="0" smtClean="0"/>
-              <a:t>a acessibilidade </a:t>
-            </a:r>
-            <a:r>
-              <a:rPr lang="pt-BR" sz="2400" dirty="0" smtClean="0"/>
-              <a:t>de aplicações Java com bancos de dados.</a:t>
+              <a:t>) é uma especificação elaborada pela antiga Sun para prover a acessibilidade de aplicações Java com bancos de dados.</a:t>
             </a:r>
           </a:p>
           <a:p>
@@ -10428,11 +13809,7 @@
             </a:pPr>
             <a:r>
               <a:rPr lang="pt-BR" sz="2400" dirty="0" smtClean="0"/>
-              <a:t>Trata-se de um padrão de </a:t>
-            </a:r>
-            <a:r>
-              <a:rPr lang="pt-BR" sz="2400" dirty="0" smtClean="0"/>
-              <a:t>acesso a dados obedecido pela indústria de bancos de dados.</a:t>
+              <a:t>Trata-se de um padrão de acesso a dados obedecido pela indústria de bancos de dados.</a:t>
             </a:r>
           </a:p>
           <a:p>
@@ -10453,7 +13830,6 @@
               <a:rPr lang="pt-BR" sz="2400" dirty="0" smtClean="0"/>
               <a:t> JDBC aos desenvolvedores Java.</a:t>
             </a:r>
-            <a:endParaRPr lang="pt-BR" sz="2400" dirty="0" smtClean="0"/>
           </a:p>
         </p:txBody>
       </p:sp>
@@ -11600,11 +14976,7 @@
             </a:pPr>
             <a:r>
               <a:rPr lang="pt-BR" sz="2400" u="sng" dirty="0" smtClean="0"/>
-              <a:t>Tipo </a:t>
-            </a:r>
-            <a:r>
-              <a:rPr lang="pt-BR" sz="2400" u="sng" dirty="0" smtClean="0"/>
-              <a:t>1</a:t>
+              <a:t>Tipo 1</a:t>
             </a:r>
           </a:p>
           <a:p>
@@ -11620,15 +14992,7 @@
             </a:r>
             <a:r>
               <a:rPr lang="pt-BR" sz="2400" dirty="0" smtClean="0"/>
-              <a:t> JDBC que usa a ponte </a:t>
-            </a:r>
-            <a:r>
-              <a:rPr lang="pt-BR" sz="2400" dirty="0" smtClean="0"/>
-              <a:t>de comunicação ODBC-JDBC para acessar a base pelo antigo padrão ODBC criado pela Microsoft</a:t>
-            </a:r>
-            <a:r>
-              <a:rPr lang="pt-BR" sz="2400" dirty="0" smtClean="0"/>
-              <a:t>.</a:t>
+              <a:t> JDBC que usa a ponte de comunicação ODBC-JDBC para acessar a base pelo antigo padrão ODBC criado pela Microsoft.</a:t>
             </a:r>
           </a:p>
           <a:p>
@@ -11650,7 +15014,6 @@
               <a:rPr lang="pt-BR" sz="2400" dirty="0" smtClean="0"/>
               <a:t>, Clipper, Access, etc.</a:t>
             </a:r>
-            <a:endParaRPr lang="pt-BR" sz="2400" dirty="0" smtClean="0"/>
           </a:p>
         </p:txBody>
       </p:sp>
@@ -11773,7 +15136,6 @@
               <a:rPr lang="pt-BR" sz="2400" u="sng" dirty="0" smtClean="0"/>
               <a:t>Tipo 2</a:t>
             </a:r>
-            <a:endParaRPr lang="pt-BR" sz="2400" u="sng" dirty="0" smtClean="0"/>
           </a:p>
           <a:p>
             <a:pPr lvl="1" indent="-1588">
@@ -11812,21 +15174,8 @@
             </a:r>
             <a:r>
               <a:rPr lang="pt-BR" sz="2400" dirty="0" smtClean="0"/>
-              <a:t> </a:t>
-            </a:r>
-            <a:r>
-              <a:rPr lang="pt-BR" sz="2400" dirty="0" smtClean="0"/>
-              <a:t>auxiliares e requerem </a:t>
-            </a:r>
-            <a:r>
-              <a:rPr lang="pt-BR" sz="2400" dirty="0" smtClean="0"/>
-              <a:t>a instalação de algum componente adicional nativo ao </a:t>
-            </a:r>
-            <a:r>
-              <a:rPr lang="pt-BR" sz="2400" dirty="0" smtClean="0"/>
-              <a:t>Sistema Operacional.</a:t>
-            </a:r>
-            <a:endParaRPr lang="pt-BR" sz="2400" dirty="0" smtClean="0"/>
+              <a:t> auxiliares e requerem a instalação de algum componente adicional nativo ao Sistema Operacional.</a:t>
+            </a:r>
           </a:p>
         </p:txBody>
       </p:sp>
@@ -11967,11 +15316,7 @@
             </a:r>
             <a:r>
               <a:rPr lang="pt-BR" sz="2400" dirty="0" smtClean="0"/>
-              <a:t> que necessita de </a:t>
-            </a:r>
-            <a:r>
-              <a:rPr lang="pt-BR" sz="2400" dirty="0" smtClean="0"/>
-              <a:t>uma API de rede via </a:t>
+              <a:t> que necessita de uma API de rede via </a:t>
             </a:r>
             <a:r>
               <a:rPr lang="pt-BR" sz="2400" dirty="0" err="1" smtClean="0"/>
@@ -11979,19 +15324,7 @@
             </a:r>
             <a:r>
               <a:rPr lang="pt-BR" sz="2400" dirty="0" smtClean="0"/>
-              <a:t> </a:t>
-            </a:r>
-            <a:r>
-              <a:rPr lang="pt-BR" sz="2400" dirty="0" smtClean="0"/>
-              <a:t>geralmente instalado no próprio servidor de dados para traduzir </a:t>
-            </a:r>
-            <a:r>
-              <a:rPr lang="pt-BR" sz="2400" dirty="0" smtClean="0"/>
-              <a:t>requisições para </a:t>
-            </a:r>
-            <a:r>
-              <a:rPr lang="pt-BR" sz="2400" dirty="0" smtClean="0"/>
-              <a:t>o </a:t>
+              <a:t> geralmente instalado no próprio servidor de dados para traduzir requisições para o </a:t>
             </a:r>
             <a:r>
               <a:rPr lang="pt-BR" sz="2400" dirty="0" err="1" smtClean="0"/>
@@ -11999,11 +15332,7 @@
             </a:r>
             <a:r>
               <a:rPr lang="pt-BR" sz="2400" dirty="0" smtClean="0"/>
-              <a:t> </a:t>
-            </a:r>
-            <a:r>
-              <a:rPr lang="pt-BR" sz="2400" dirty="0" smtClean="0"/>
-              <a:t>desejado.</a:t>
+              <a:t> desejado.</a:t>
             </a:r>
           </a:p>
           <a:p>
@@ -12015,15 +15344,7 @@
             </a:pPr>
             <a:r>
               <a:rPr lang="pt-BR" sz="2400" dirty="0" smtClean="0"/>
-              <a:t>Não </a:t>
-            </a:r>
-            <a:r>
-              <a:rPr lang="pt-BR" sz="2400" dirty="0" smtClean="0"/>
-              <a:t>requer </a:t>
-            </a:r>
-            <a:r>
-              <a:rPr lang="pt-BR" sz="2400" dirty="0" smtClean="0"/>
-              <a:t>nenhum software adicional no cliente além do </a:t>
+              <a:t>Não requer nenhum software adicional no cliente além do </a:t>
             </a:r>
             <a:r>
               <a:rPr lang="pt-BR" sz="2400" dirty="0" err="1" smtClean="0"/>
@@ -12033,7 +15354,6 @@
               <a:rPr lang="pt-BR" sz="2400" dirty="0" smtClean="0"/>
               <a:t> JDBC.</a:t>
             </a:r>
-            <a:endParaRPr lang="pt-BR" sz="2400" dirty="0" smtClean="0"/>
           </a:p>
         </p:txBody>
       </p:sp>
@@ -12175,31 +15495,7 @@
             </a:r>
             <a:r>
               <a:rPr lang="pt-BR" sz="2400" dirty="0" smtClean="0"/>
-              <a:t> </a:t>
-            </a:r>
-            <a:r>
-              <a:rPr lang="pt-BR" sz="2400" dirty="0" smtClean="0"/>
-              <a:t>que se </a:t>
-            </a:r>
-            <a:r>
-              <a:rPr lang="pt-BR" sz="2400" dirty="0" smtClean="0"/>
-              <a:t>comunica </a:t>
-            </a:r>
-            <a:r>
-              <a:rPr lang="pt-BR" sz="2400" dirty="0" smtClean="0"/>
-              <a:t>diretamente com o banco de dados usando </a:t>
-            </a:r>
-            <a:r>
-              <a:rPr lang="pt-BR" sz="2400" dirty="0" smtClean="0"/>
-              <a:t>puramente soquetes </a:t>
-            </a:r>
-            <a:r>
-              <a:rPr lang="pt-BR" sz="2400" dirty="0" smtClean="0"/>
-              <a:t>de </a:t>
-            </a:r>
-            <a:r>
-              <a:rPr lang="pt-BR" sz="2400" dirty="0" smtClean="0"/>
-              <a:t>rede.</a:t>
+              <a:t> que se comunica diretamente com o banco de dados usando puramente soquetes de rede.</a:t>
             </a:r>
           </a:p>
           <a:p>
@@ -12223,37 +15519,8 @@
             </a:pPr>
             <a:r>
               <a:rPr lang="pt-BR" sz="2400" dirty="0" smtClean="0"/>
-              <a:t>Não </a:t>
-            </a:r>
-            <a:r>
-              <a:rPr lang="pt-BR" sz="2400" dirty="0" smtClean="0"/>
-              <a:t>requer </a:t>
-            </a:r>
-            <a:r>
-              <a:rPr lang="pt-BR" sz="2400" dirty="0" smtClean="0"/>
-              <a:t>código </a:t>
-            </a:r>
-            <a:r>
-              <a:rPr lang="pt-BR" sz="2400" dirty="0" smtClean="0"/>
-              <a:t>adicional do lado do </a:t>
-            </a:r>
-            <a:r>
-              <a:rPr lang="pt-BR" sz="2400" dirty="0" smtClean="0"/>
-              <a:t>cliente nem no servidor. É simples </a:t>
-            </a:r>
-            <a:r>
-              <a:rPr lang="pt-BR" sz="2400" dirty="0" smtClean="0"/>
-              <a:t>de </a:t>
-            </a:r>
-            <a:r>
-              <a:rPr lang="pt-BR" sz="2400" dirty="0" smtClean="0"/>
-              <a:t>usar e possui </a:t>
-            </a:r>
-            <a:r>
-              <a:rPr lang="pt-BR" sz="2400" dirty="0" smtClean="0"/>
-              <a:t>melhor performance que os demais tipos.</a:t>
-            </a:r>
-            <a:endParaRPr lang="pt-BR" sz="2400" dirty="0" smtClean="0"/>
+              <a:t>Não requer código adicional do lado do cliente nem no servidor. É simples de usar e possui melhor performance que os demais tipos.</a:t>
+            </a:r>
           </a:p>
           <a:p>
             <a:pPr lvl="1" indent="-1588">

</xml_diff>

<commit_message>
JDBC: Merge com alterações anteriores.
</commit_message>
<xml_diff>
--- a/2-Java-Programmer-Modulo-II/19.Capitulo11.pptx
+++ b/2-Java-Programmer-Modulo-II/19.Capitulo11.pptx
@@ -12,14 +12,14 @@
     <p:sldId id="315" r:id="rId3"/>
     <p:sldId id="316" r:id="rId4"/>
     <p:sldId id="305" r:id="rId5"/>
-    <p:sldId id="317" r:id="rId6"/>
+    <p:sldId id="339" r:id="rId6"/>
     <p:sldId id="318" r:id="rId7"/>
     <p:sldId id="320" r:id="rId8"/>
     <p:sldId id="321" r:id="rId9"/>
     <p:sldId id="319" r:id="rId10"/>
     <p:sldId id="322" r:id="rId11"/>
     <p:sldId id="306" r:id="rId12"/>
-    <p:sldId id="324" r:id="rId13"/>
+    <p:sldId id="340" r:id="rId13"/>
     <p:sldId id="307" r:id="rId14"/>
     <p:sldId id="326" r:id="rId15"/>
     <p:sldId id="328" r:id="rId16"/>
@@ -27,7 +27,7 @@
     <p:sldId id="327" r:id="rId18"/>
     <p:sldId id="308" r:id="rId19"/>
     <p:sldId id="330" r:id="rId20"/>
-    <p:sldId id="332" r:id="rId21"/>
+    <p:sldId id="341" r:id="rId21"/>
     <p:sldId id="333" r:id="rId22"/>
     <p:sldId id="331" r:id="rId23"/>
     <p:sldId id="334" r:id="rId24"/>
@@ -280,7 +280,7 @@
               <a:pPr>
                 <a:defRPr/>
               </a:pPr>
-              <a:t>07/06/2012</a:t>
+              <a:t>08/06/2012</a:t>
             </a:fld>
             <a:endParaRPr lang="pt-BR"/>
           </a:p>
@@ -468,7 +468,7 @@
               <a:pPr>
                 <a:defRPr/>
               </a:pPr>
-              <a:t>‹nº›</a:t>
+              <a:t>‹#›</a:t>
             </a:fld>
             <a:endParaRPr lang="pt-BR"/>
           </a:p>
@@ -3873,7 +3873,7 @@
               <a:pPr>
                 <a:defRPr/>
               </a:pPr>
-              <a:t>07/06/2012</a:t>
+              <a:t>08/06/2012</a:t>
             </a:fld>
             <a:endParaRPr lang="pt-BR"/>
           </a:p>
@@ -3932,7 +3932,7 @@
               <a:pPr>
                 <a:defRPr/>
               </a:pPr>
-              <a:t>‹nº›</a:t>
+              <a:t>‹#›</a:t>
             </a:fld>
             <a:endParaRPr lang="pt-BR"/>
           </a:p>
@@ -4065,7 +4065,7 @@
               <a:pPr>
                 <a:defRPr/>
               </a:pPr>
-              <a:t>07/06/2012</a:t>
+              <a:t>08/06/2012</a:t>
             </a:fld>
             <a:endParaRPr lang="pt-BR"/>
           </a:p>
@@ -4124,7 +4124,7 @@
               <a:pPr>
                 <a:defRPr/>
               </a:pPr>
-              <a:t>‹nº›</a:t>
+              <a:t>‹#›</a:t>
             </a:fld>
             <a:endParaRPr lang="pt-BR"/>
           </a:p>
@@ -4267,7 +4267,7 @@
               <a:pPr>
                 <a:defRPr/>
               </a:pPr>
-              <a:t>07/06/2012</a:t>
+              <a:t>08/06/2012</a:t>
             </a:fld>
             <a:endParaRPr lang="pt-BR"/>
           </a:p>
@@ -4326,7 +4326,7 @@
               <a:pPr>
                 <a:defRPr/>
               </a:pPr>
-              <a:t>‹nº›</a:t>
+              <a:t>‹#›</a:t>
             </a:fld>
             <a:endParaRPr lang="pt-BR"/>
           </a:p>
@@ -4463,7 +4463,7 @@
               <a:pPr>
                 <a:defRPr/>
               </a:pPr>
-              <a:t>07/06/2012</a:t>
+              <a:t>08/06/2012</a:t>
             </a:fld>
             <a:endParaRPr lang="pt-BR"/>
           </a:p>
@@ -4522,7 +4522,7 @@
               <a:pPr>
                 <a:defRPr/>
               </a:pPr>
-              <a:t>‹nº›</a:t>
+              <a:t>‹#›</a:t>
             </a:fld>
             <a:endParaRPr lang="pt-BR"/>
           </a:p>
@@ -4969,7 +4969,7 @@
               <a:pPr>
                 <a:defRPr/>
               </a:pPr>
-              <a:t>07/06/2012</a:t>
+              <a:t>08/06/2012</a:t>
             </a:fld>
             <a:endParaRPr lang="pt-BR"/>
           </a:p>
@@ -5028,7 +5028,7 @@
               <a:pPr>
                 <a:defRPr/>
               </a:pPr>
-              <a:t>‹nº›</a:t>
+              <a:t>‹#›</a:t>
             </a:fld>
             <a:endParaRPr lang="pt-BR"/>
           </a:p>
@@ -5260,7 +5260,7 @@
               <a:pPr>
                 <a:defRPr/>
               </a:pPr>
-              <a:t>07/06/2012</a:t>
+              <a:t>08/06/2012</a:t>
             </a:fld>
             <a:endParaRPr lang="pt-BR"/>
           </a:p>
@@ -5319,7 +5319,7 @@
               <a:pPr>
                 <a:defRPr/>
               </a:pPr>
-              <a:t>‹nº›</a:t>
+              <a:t>‹#›</a:t>
             </a:fld>
             <a:endParaRPr lang="pt-BR"/>
           </a:p>
@@ -5661,7 +5661,7 @@
               <a:pPr>
                 <a:defRPr/>
               </a:pPr>
-              <a:t>07/06/2012</a:t>
+              <a:t>08/06/2012</a:t>
             </a:fld>
             <a:endParaRPr lang="pt-BR"/>
           </a:p>
@@ -5720,7 +5720,7 @@
               <a:pPr>
                 <a:defRPr/>
               </a:pPr>
-              <a:t>‹nº›</a:t>
+              <a:t>‹#›</a:t>
             </a:fld>
             <a:endParaRPr lang="pt-BR"/>
           </a:p>
@@ -5810,7 +5810,7 @@
               <a:pPr>
                 <a:defRPr/>
               </a:pPr>
-              <a:t>07/06/2012</a:t>
+              <a:t>08/06/2012</a:t>
             </a:fld>
             <a:endParaRPr lang="pt-BR"/>
           </a:p>
@@ -5869,7 +5869,7 @@
               <a:pPr>
                 <a:defRPr/>
               </a:pPr>
-              <a:t>‹nº›</a:t>
+              <a:t>‹#›</a:t>
             </a:fld>
             <a:endParaRPr lang="pt-BR"/>
           </a:p>
@@ -5927,7 +5927,7 @@
               <a:pPr>
                 <a:defRPr/>
               </a:pPr>
-              <a:t>07/06/2012</a:t>
+              <a:t>08/06/2012</a:t>
             </a:fld>
             <a:endParaRPr lang="pt-BR"/>
           </a:p>
@@ -5986,7 +5986,7 @@
               <a:pPr>
                 <a:defRPr/>
               </a:pPr>
-              <a:t>‹nº›</a:t>
+              <a:t>‹#›</a:t>
             </a:fld>
             <a:endParaRPr lang="pt-BR"/>
           </a:p>
@@ -6203,7 +6203,7 @@
               <a:pPr>
                 <a:defRPr/>
               </a:pPr>
-              <a:t>07/06/2012</a:t>
+              <a:t>08/06/2012</a:t>
             </a:fld>
             <a:endParaRPr lang="pt-BR"/>
           </a:p>
@@ -6267,7 +6267,7 @@
               <a:pPr>
                 <a:defRPr/>
               </a:pPr>
-              <a:t>‹nº›</a:t>
+              <a:t>‹#›</a:t>
             </a:fld>
             <a:endParaRPr lang="pt-BR"/>
           </a:p>
@@ -6487,7 +6487,7 @@
               <a:pPr>
                 <a:defRPr/>
               </a:pPr>
-              <a:t>07/06/2012</a:t>
+              <a:t>08/06/2012</a:t>
             </a:fld>
             <a:endParaRPr lang="pt-BR"/>
           </a:p>
@@ -6546,7 +6546,7 @@
               <a:pPr>
                 <a:defRPr/>
               </a:pPr>
-              <a:t>‹nº›</a:t>
+              <a:t>‹#›</a:t>
             </a:fld>
             <a:endParaRPr lang="pt-BR"/>
           </a:p>
@@ -6965,7 +6965,7 @@
               <a:pPr>
                 <a:defRPr/>
               </a:pPr>
-              <a:t>07/06/2012</a:t>
+              <a:t>08/06/2012</a:t>
             </a:fld>
             <a:endParaRPr lang="pt-BR"/>
           </a:p>
@@ -7068,7 +7068,7 @@
               <a:pPr>
                 <a:defRPr/>
               </a:pPr>
-              <a:t>‹nº›</a:t>
+              <a:t>‹#›</a:t>
             </a:fld>
             <a:endParaRPr lang="pt-BR"/>
           </a:p>
@@ -7766,11 +7766,15 @@
             </a:pPr>
             <a:r>
               <a:rPr lang="pt-BR" sz="2200" dirty="0" smtClean="0"/>
-              <a:t>ojdbc6.</a:t>
-            </a:r>
-            <a:r>
-              <a:rPr lang="pt-BR" sz="2200" dirty="0" err="1" smtClean="0"/>
-              <a:t>jar</a:t>
+              <a:t>ojdbc6.jar (antigo </a:t>
+            </a:r>
+            <a:r>
+              <a:rPr lang="pt-BR" sz="2200" i="1" dirty="0" smtClean="0"/>
+              <a:t>classes12.jar</a:t>
+            </a:r>
+            <a:r>
+              <a:rPr lang="pt-BR" sz="2200" dirty="0" smtClean="0"/>
+              <a:t>)</a:t>
             </a:r>
             <a:endParaRPr lang="pt-BR" sz="2200" dirty="0" smtClean="0"/>
           </a:p>
@@ -8032,8 +8036,8 @@
           </p:nvPr>
         </p:nvGraphicFramePr>
         <p:xfrm>
-          <a:off x="755576" y="3429000"/>
-          <a:ext cx="1944216" cy="936104"/>
+          <a:off x="755576" y="3571876"/>
+          <a:ext cx="1944216" cy="642942"/>
         </p:xfrm>
         <a:graphic>
           <a:graphicData uri="http://schemas.openxmlformats.org/drawingml/2006/table">
@@ -8113,7 +8117,7 @@
                   </a:tcPr>
                 </a:tc>
               </a:tr>
-              <a:tr h="661784">
+              <a:tr h="368622">
                 <a:tc>
                   <a:txBody>
                     <a:bodyPr/>
@@ -8183,7 +8187,7 @@
         </p:nvGraphicFramePr>
         <p:xfrm>
           <a:off x="3635896" y="1844824"/>
-          <a:ext cx="1944216" cy="936104"/>
+          <a:ext cx="1944216" cy="726920"/>
         </p:xfrm>
         <a:graphic>
           <a:graphicData uri="http://schemas.openxmlformats.org/drawingml/2006/table">
@@ -8263,7 +8267,7 @@
                   </a:tcPr>
                 </a:tc>
               </a:tr>
-              <a:tr h="661784">
+              <a:tr h="452600">
                 <a:tc>
                   <a:txBody>
                     <a:bodyPr/>
@@ -8333,7 +8337,7 @@
         </p:nvGraphicFramePr>
         <p:xfrm>
           <a:off x="6516216" y="5013176"/>
-          <a:ext cx="1944216" cy="956005"/>
+          <a:ext cx="1944216" cy="701840"/>
         </p:xfrm>
         <a:graphic>
           <a:graphicData uri="http://schemas.openxmlformats.org/drawingml/2006/table">
@@ -8467,7 +8471,7 @@
                   </a:tcPr>
                 </a:tc>
               </a:tr>
-              <a:tr h="564845">
+              <a:tr h="310680">
                 <a:tc>
                   <a:txBody>
                     <a:bodyPr/>
@@ -8537,7 +8541,7 @@
         </p:nvGraphicFramePr>
         <p:xfrm>
           <a:off x="755576" y="1844825"/>
-          <a:ext cx="1944216" cy="954334"/>
+          <a:ext cx="1944216" cy="726919"/>
         </p:xfrm>
         <a:graphic>
           <a:graphicData uri="http://schemas.openxmlformats.org/drawingml/2006/table">
@@ -8671,7 +8675,7 @@
                   </a:tcPr>
                 </a:tc>
               </a:tr>
-              <a:tr h="563174">
+              <a:tr h="335759">
                 <a:tc>
                   <a:txBody>
                     <a:bodyPr/>
@@ -8738,8 +8742,8 @@
           <p:nvPr/>
         </p:nvGraphicFramePr>
         <p:xfrm>
-          <a:off x="3635896" y="3429000"/>
-          <a:ext cx="1944216" cy="936104"/>
+          <a:off x="3643306" y="3571876"/>
+          <a:ext cx="1944216" cy="739318"/>
         </p:xfrm>
         <a:graphic>
           <a:graphicData uri="http://schemas.openxmlformats.org/drawingml/2006/table">
@@ -8750,7 +8754,7 @@
               <a:tblGrid>
                 <a:gridCol w="1944216"/>
               </a:tblGrid>
-              <a:tr h="144016">
+              <a:tr h="249382">
                 <a:tc>
                   <a:txBody>
                     <a:bodyPr/>
@@ -8813,7 +8817,7 @@
                   </a:tcPr>
                 </a:tc>
               </a:tr>
-              <a:tr h="661784">
+              <a:tr h="464998">
                 <a:tc>
                   <a:txBody>
                     <a:bodyPr/>
@@ -8883,8 +8887,8 @@
           <p:nvPr/>
         </p:nvGraphicFramePr>
         <p:xfrm>
-          <a:off x="3635896" y="5013176"/>
-          <a:ext cx="1944216" cy="936104"/>
+          <a:off x="3643306" y="5118574"/>
+          <a:ext cx="1944216" cy="739318"/>
         </p:xfrm>
         <a:graphic>
           <a:graphicData uri="http://schemas.openxmlformats.org/drawingml/2006/table">
@@ -8895,7 +8899,7 @@
               <a:tblGrid>
                 <a:gridCol w="1944216"/>
               </a:tblGrid>
-              <a:tr h="216024">
+              <a:tr h="249382">
                 <a:tc>
                   <a:txBody>
                     <a:bodyPr/>
@@ -8964,7 +8968,7 @@
                   </a:tcPr>
                 </a:tc>
               </a:tr>
-              <a:tr h="661784">
+              <a:tr h="464998">
                 <a:tc>
                   <a:txBody>
                     <a:bodyPr/>
@@ -9024,14 +9028,14 @@
       </p:graphicFrame>
       <p:grpSp>
         <p:nvGrpSpPr>
-          <p:cNvPr id="11" name="Group 62"/>
+          <p:cNvPr id="2" name="Group 62"/>
           <p:cNvGrpSpPr/>
           <p:nvPr/>
         </p:nvGrpSpPr>
         <p:grpSpPr>
           <a:xfrm rot="16200000" flipH="1">
-            <a:off x="2555777" y="4437111"/>
-            <a:ext cx="1296145" cy="864099"/>
+            <a:off x="2516923" y="4398257"/>
+            <a:ext cx="1373853" cy="864099"/>
             <a:chOff x="2857487" y="3286125"/>
             <a:chExt cx="214317" cy="1347797"/>
           </a:xfrm>
@@ -9130,9 +9134,9 @@
           <p:nvPr/>
         </p:nvCxnSpPr>
         <p:spPr bwMode="auto">
-          <a:xfrm flipV="1">
-            <a:off x="1763688" y="2852936"/>
-            <a:ext cx="0" cy="576064"/>
+          <a:xfrm rot="5400000" flipH="1" flipV="1">
+            <a:off x="1321968" y="3107926"/>
+            <a:ext cx="927900" cy="1588"/>
           </a:xfrm>
           <a:prstGeom prst="straightConnector1">
             <a:avLst/>
@@ -9158,8 +9162,8 @@
           <p:nvPr/>
         </p:nvGraphicFramePr>
         <p:xfrm>
-          <a:off x="6516216" y="3429000"/>
-          <a:ext cx="1944216" cy="936104"/>
+          <a:off x="6516216" y="3557405"/>
+          <a:ext cx="1944216" cy="728851"/>
         </p:xfrm>
         <a:graphic>
           <a:graphicData uri="http://schemas.openxmlformats.org/drawingml/2006/table">
@@ -9170,7 +9174,7 @@
               <a:tblGrid>
                 <a:gridCol w="1944216"/>
               </a:tblGrid>
-              <a:tr h="200238">
+              <a:tr h="188411">
                 <a:tc>
                   <a:txBody>
                     <a:bodyPr/>
@@ -9239,7 +9243,7 @@
                   </a:tcPr>
                 </a:tc>
               </a:tr>
-              <a:tr h="661784">
+              <a:tr h="454531">
                 <a:tc>
                   <a:txBody>
                     <a:bodyPr/>
@@ -9306,9 +9310,9 @@
           <p:nvPr/>
         </p:nvCxnSpPr>
         <p:spPr bwMode="auto">
-          <a:xfrm flipV="1">
-            <a:off x="4644008" y="2780928"/>
-            <a:ext cx="0" cy="648072"/>
+          <a:xfrm rot="5400000" flipH="1" flipV="1">
+            <a:off x="4143372" y="3071810"/>
+            <a:ext cx="1000132" cy="1588"/>
           </a:xfrm>
           <a:prstGeom prst="straightConnector1">
             <a:avLst/>
@@ -9334,9 +9338,9 @@
           <p:nvPr/>
         </p:nvCxnSpPr>
         <p:spPr bwMode="auto">
-          <a:xfrm flipV="1">
-            <a:off x="4644008" y="4365104"/>
-            <a:ext cx="0" cy="648072"/>
+          <a:xfrm rot="5400000" flipH="1" flipV="1">
+            <a:off x="4215604" y="4714884"/>
+            <a:ext cx="856462" cy="794"/>
           </a:xfrm>
           <a:prstGeom prst="straightConnector1">
             <a:avLst/>
@@ -9383,14 +9387,14 @@
       </p:cxnSp>
       <p:grpSp>
         <p:nvGrpSpPr>
-          <p:cNvPr id="41" name="Group 62"/>
+          <p:cNvPr id="3" name="Group 62"/>
           <p:cNvGrpSpPr/>
           <p:nvPr/>
         </p:nvGrpSpPr>
         <p:grpSpPr>
           <a:xfrm rot="16200000">
-            <a:off x="2555779" y="2564905"/>
-            <a:ext cx="1296144" cy="864096"/>
+            <a:off x="2520915" y="2599768"/>
+            <a:ext cx="1365871" cy="864096"/>
             <a:chOff x="2857487" y="3286125"/>
             <a:chExt cx="214317" cy="1347797"/>
           </a:xfrm>
@@ -9482,7 +9486,7 @@
       </p:grpSp>
       <p:grpSp>
         <p:nvGrpSpPr>
-          <p:cNvPr id="47" name="Group 62"/>
+          <p:cNvPr id="4" name="Group 62"/>
           <p:cNvGrpSpPr/>
           <p:nvPr/>
         </p:nvGrpSpPr>
@@ -9609,14 +9613,14 @@
       </p:cxnSp>
       <p:grpSp>
         <p:nvGrpSpPr>
-          <p:cNvPr id="52" name="Group 62"/>
+          <p:cNvPr id="9" name="Group 62"/>
           <p:cNvGrpSpPr/>
           <p:nvPr/>
         </p:nvGrpSpPr>
         <p:grpSpPr>
           <a:xfrm rot="16200000" flipV="1">
-            <a:off x="5436096" y="2564904"/>
-            <a:ext cx="1296144" cy="864096"/>
+            <a:off x="5368933" y="2497741"/>
+            <a:ext cx="1430470" cy="864096"/>
             <a:chOff x="2857487" y="3286125"/>
             <a:chExt cx="214317" cy="1347797"/>
           </a:xfrm>
@@ -9714,7 +9718,7 @@
         </p:nvSpPr>
         <p:spPr>
           <a:xfrm>
-            <a:off x="5652120" y="1988840"/>
+            <a:off x="5652120" y="1928802"/>
             <a:ext cx="482824" cy="307777"/>
           </a:xfrm>
           <a:prstGeom prst="rect">
@@ -12836,24 +12840,145 @@
             <p:ph idx="1"/>
           </p:nvPr>
         </p:nvSpPr>
-        <p:spPr/>
+        <p:spPr>
+          <a:xfrm>
+            <a:off x="457200" y="1600200"/>
+            <a:ext cx="8115328" cy="4525963"/>
+          </a:xfrm>
+        </p:spPr>
         <p:txBody>
           <a:bodyPr/>
           <a:lstStyle/>
           <a:p>
-            <a:r>
-              <a:rPr lang="pt-BR" dirty="0" smtClean="0"/>
-              <a:t>TODO: “</a:t>
-            </a:r>
-            <a:r>
-              <a:rPr lang="pt-BR" dirty="0" err="1" smtClean="0"/>
-              <a:t>statements</a:t>
-            </a:r>
-            <a:r>
-              <a:rPr lang="pt-BR" dirty="0" smtClean="0"/>
-              <a:t>” / declarações SQL</a:t>
-            </a:r>
-            <a:endParaRPr lang="pt-BR" dirty="0"/>
+            <a:pPr>
+              <a:spcBef>
+                <a:spcPts val="1800"/>
+              </a:spcBef>
+            </a:pPr>
+            <a:r>
+              <a:rPr lang="pt-BR" sz="2400" dirty="0" smtClean="0"/>
+              <a:t>Com a conexão aberta podemos realizar operações na base de dados, como inclusão, exclusão, alteração e outros.</a:t>
+            </a:r>
+          </a:p>
+          <a:p>
+            <a:pPr>
+              <a:spcBef>
+                <a:spcPts val="1800"/>
+              </a:spcBef>
+            </a:pPr>
+            <a:r>
+              <a:rPr lang="pt-BR" sz="2400" dirty="0" smtClean="0"/>
+              <a:t>Cada operação na base de dados é definida por uma instrução na linguagem SQL, chamada de “</a:t>
+            </a:r>
+            <a:r>
+              <a:rPr lang="pt-BR" sz="2400" i="1" dirty="0" smtClean="0"/>
+              <a:t>statement</a:t>
+            </a:r>
+            <a:r>
+              <a:rPr lang="pt-BR" sz="2400" dirty="0" smtClean="0"/>
+              <a:t>”:</a:t>
+            </a:r>
+          </a:p>
+          <a:p>
+            <a:pPr marL="0" indent="0">
+              <a:spcBef>
+                <a:spcPts val="0"/>
+              </a:spcBef>
+              <a:buNone/>
+            </a:pPr>
+            <a:endParaRPr lang="pt-BR" sz="2000" dirty="0" smtClean="0"/>
+          </a:p>
+          <a:p>
+            <a:pPr marL="446088" indent="0">
+              <a:spcBef>
+                <a:spcPts val="0"/>
+              </a:spcBef>
+              <a:buNone/>
+            </a:pPr>
+            <a:endParaRPr lang="pt-BR" sz="2000" dirty="0" smtClean="0">
+              <a:solidFill>
+                <a:srgbClr val="FFC000"/>
+              </a:solidFill>
+            </a:endParaRPr>
+          </a:p>
+          <a:p>
+            <a:pPr marL="446088" indent="0">
+              <a:spcBef>
+                <a:spcPts val="0"/>
+              </a:spcBef>
+              <a:buNone/>
+            </a:pPr>
+            <a:r>
+              <a:rPr lang="pt-BR" sz="2000" dirty="0" smtClean="0">
+                <a:solidFill>
+                  <a:srgbClr val="FFC000"/>
+                </a:solidFill>
+              </a:rPr>
+              <a:t>UPDATE tab_funcionario SET salario = 5000 WHERE matr = 34</a:t>
+            </a:r>
+          </a:p>
+          <a:p>
+            <a:pPr marL="446088" indent="0">
+              <a:spcBef>
+                <a:spcPts val="0"/>
+              </a:spcBef>
+              <a:buNone/>
+            </a:pPr>
+            <a:endParaRPr lang="pt-BR" sz="2000" dirty="0" smtClean="0">
+              <a:solidFill>
+                <a:srgbClr val="FFC000"/>
+              </a:solidFill>
+            </a:endParaRPr>
+          </a:p>
+          <a:p>
+            <a:pPr marL="446088" indent="0">
+              <a:spcBef>
+                <a:spcPts val="0"/>
+              </a:spcBef>
+              <a:buNone/>
+            </a:pPr>
+            <a:r>
+              <a:rPr lang="pt-BR" sz="2000" dirty="0" smtClean="0">
+                <a:solidFill>
+                  <a:srgbClr val="FFC000"/>
+                </a:solidFill>
+              </a:rPr>
+              <a:t>INSERT INTO tab_setor (codigo, nome) VALUES (34, ‘RH’)</a:t>
+            </a:r>
+          </a:p>
+          <a:p>
+            <a:pPr marL="446088" indent="0">
+              <a:spcBef>
+                <a:spcPts val="0"/>
+              </a:spcBef>
+              <a:buNone/>
+            </a:pPr>
+            <a:endParaRPr lang="pt-BR" sz="2000" dirty="0" smtClean="0">
+              <a:solidFill>
+                <a:srgbClr val="FFC000"/>
+              </a:solidFill>
+            </a:endParaRPr>
+          </a:p>
+          <a:p>
+            <a:pPr marL="446088" indent="0">
+              <a:spcBef>
+                <a:spcPts val="0"/>
+              </a:spcBef>
+              <a:buNone/>
+            </a:pPr>
+            <a:r>
+              <a:rPr lang="pt-BR" sz="2000" dirty="0" smtClean="0">
+                <a:solidFill>
+                  <a:srgbClr val="FFC000"/>
+                </a:solidFill>
+              </a:rPr>
+              <a:t>DELETE FROM tab_produto WHERE codigo = 4983</a:t>
+            </a:r>
+            <a:endParaRPr lang="pt-BR" sz="2000" dirty="0">
+              <a:solidFill>
+                <a:srgbClr val="FFC000"/>
+              </a:solidFill>
+            </a:endParaRPr>
           </a:p>
         </p:txBody>
       </p:sp>
@@ -14933,7 +15058,6 @@
               <a:rPr lang="pt-BR" dirty="0" smtClean="0"/>
               <a:t>Exemplo 1</a:t>
             </a:r>
-            <a:endParaRPr lang="pt-BR" dirty="0" smtClean="0"/>
           </a:p>
           <a:p>
             <a:pPr marL="0" lvl="1" indent="0">
@@ -14994,15 +15118,7 @@
                   <a:srgbClr val="FFC000"/>
                 </a:solidFill>
               </a:rPr>
-              <a:t> </a:t>
-            </a:r>
-            <a:r>
-              <a:rPr lang="pt-BR" sz="2000" dirty="0" smtClean="0">
-                <a:solidFill>
-                  <a:srgbClr val="FFC000"/>
-                </a:solidFill>
-              </a:rPr>
-              <a:t>= </a:t>
+              <a:t> = </a:t>
             </a:r>
             <a:r>
               <a:rPr lang="pt-BR" sz="2000" dirty="0" err="1" smtClean="0">
@@ -15070,15 +15186,7 @@
             </a:r>
             <a:r>
               <a:rPr lang="pt-BR" sz="2000" dirty="0" smtClean="0"/>
-              <a:t>) </a:t>
-            </a:r>
-            <a:r>
-              <a:rPr lang="pt-BR" sz="2000" dirty="0" smtClean="0"/>
-              <a:t>VALUES </a:t>
-            </a:r>
-            <a:r>
-              <a:rPr lang="pt-BR" sz="2000" dirty="0" smtClean="0"/>
-              <a:t>(?, ?, ?)</a:t>
+              <a:t>) VALUES (?, ?, ?)</a:t>
             </a:r>
             <a:r>
               <a:rPr lang="pt-BR" sz="2000" dirty="0" smtClean="0">
@@ -15088,6 +15196,14 @@
               </a:rPr>
               <a:t>”);</a:t>
             </a:r>
+          </a:p>
+          <a:p>
+            <a:pPr marL="0" lvl="1" indent="0">
+              <a:spcBef>
+                <a:spcPts val="0"/>
+              </a:spcBef>
+              <a:buNone/>
+            </a:pPr>
             <a:endParaRPr lang="pt-BR" sz="2000" dirty="0" smtClean="0">
               <a:solidFill>
                 <a:srgbClr val="FFC000"/>
@@ -15101,6 +15217,174 @@
               </a:spcBef>
               <a:buNone/>
             </a:pPr>
+            <a:r>
+              <a:rPr lang="pt-BR" sz="2000" dirty="0" err="1" smtClean="0">
+                <a:solidFill>
+                  <a:srgbClr val="FFC000"/>
+                </a:solidFill>
+              </a:rPr>
+              <a:t>ps.</a:t>
+            </a:r>
+            <a:r>
+              <a:rPr lang="pt-BR" sz="2000" u="sng" dirty="0" err="1" smtClean="0">
+                <a:solidFill>
+                  <a:srgbClr val="FFC000"/>
+                </a:solidFill>
+              </a:rPr>
+              <a:t>setInt</a:t>
+            </a:r>
+            <a:r>
+              <a:rPr lang="pt-BR" sz="2000" dirty="0" smtClean="0">
+                <a:solidFill>
+                  <a:srgbClr val="FFC000"/>
+                </a:solidFill>
+              </a:rPr>
+              <a:t>(</a:t>
+            </a:r>
+            <a:r>
+              <a:rPr lang="pt-BR" sz="2000" dirty="0" smtClean="0"/>
+              <a:t>1</a:t>
+            </a:r>
+            <a:r>
+              <a:rPr lang="pt-BR" sz="2000" dirty="0" smtClean="0">
+                <a:solidFill>
+                  <a:srgbClr val="FFC000"/>
+                </a:solidFill>
+              </a:rPr>
+              <a:t>,</a:t>
+            </a:r>
+            <a:r>
+              <a:rPr lang="pt-BR" sz="2000" dirty="0" smtClean="0"/>
+              <a:t> 1001</a:t>
+            </a:r>
+            <a:r>
+              <a:rPr lang="pt-BR" sz="2000" dirty="0" smtClean="0">
+                <a:solidFill>
+                  <a:srgbClr val="FFC000"/>
+                </a:solidFill>
+              </a:rPr>
+              <a:t>);</a:t>
+            </a:r>
+          </a:p>
+          <a:p>
+            <a:pPr marL="0" lvl="1" indent="0">
+              <a:spcBef>
+                <a:spcPts val="0"/>
+              </a:spcBef>
+              <a:buNone/>
+            </a:pPr>
+            <a:r>
+              <a:rPr lang="pt-BR" sz="2000" dirty="0" err="1" smtClean="0">
+                <a:solidFill>
+                  <a:srgbClr val="FFC000"/>
+                </a:solidFill>
+              </a:rPr>
+              <a:t>ps.</a:t>
+            </a:r>
+            <a:r>
+              <a:rPr lang="pt-BR" sz="2000" u="sng" dirty="0" err="1" smtClean="0">
+                <a:solidFill>
+                  <a:srgbClr val="FFC000"/>
+                </a:solidFill>
+              </a:rPr>
+              <a:t>setString</a:t>
+            </a:r>
+            <a:r>
+              <a:rPr lang="pt-BR" sz="2000" dirty="0" smtClean="0">
+                <a:solidFill>
+                  <a:srgbClr val="FFC000"/>
+                </a:solidFill>
+              </a:rPr>
+              <a:t>(</a:t>
+            </a:r>
+            <a:r>
+              <a:rPr lang="pt-BR" sz="2000" dirty="0" smtClean="0"/>
+              <a:t>2</a:t>
+            </a:r>
+            <a:r>
+              <a:rPr lang="pt-BR" sz="2000" dirty="0" smtClean="0">
+                <a:solidFill>
+                  <a:srgbClr val="FFC000"/>
+                </a:solidFill>
+              </a:rPr>
+              <a:t>,</a:t>
+            </a:r>
+            <a:r>
+              <a:rPr lang="pt-BR" sz="2000" dirty="0" smtClean="0"/>
+              <a:t> “José Souza”</a:t>
+            </a:r>
+            <a:r>
+              <a:rPr lang="pt-BR" sz="2000" dirty="0" smtClean="0">
+                <a:solidFill>
+                  <a:srgbClr val="FFC000"/>
+                </a:solidFill>
+              </a:rPr>
+              <a:t>);</a:t>
+            </a:r>
+          </a:p>
+          <a:p>
+            <a:pPr marL="0" lvl="1" indent="0">
+              <a:spcBef>
+                <a:spcPts val="0"/>
+              </a:spcBef>
+              <a:buNone/>
+            </a:pPr>
+            <a:r>
+              <a:rPr lang="pt-BR" sz="2000" dirty="0" err="1" smtClean="0">
+                <a:solidFill>
+                  <a:srgbClr val="FFC000"/>
+                </a:solidFill>
+              </a:rPr>
+              <a:t>ps.</a:t>
+            </a:r>
+            <a:r>
+              <a:rPr lang="pt-BR" sz="2000" u="sng" dirty="0" err="1" smtClean="0">
+                <a:solidFill>
+                  <a:srgbClr val="FFC000"/>
+                </a:solidFill>
+              </a:rPr>
+              <a:t>setDouble</a:t>
+            </a:r>
+            <a:r>
+              <a:rPr lang="pt-BR" sz="2000" dirty="0" smtClean="0">
+                <a:solidFill>
+                  <a:srgbClr val="FFC000"/>
+                </a:solidFill>
+              </a:rPr>
+              <a:t>(</a:t>
+            </a:r>
+            <a:r>
+              <a:rPr lang="pt-BR" sz="2000" dirty="0" smtClean="0"/>
+              <a:t>3</a:t>
+            </a:r>
+            <a:r>
+              <a:rPr lang="pt-BR" sz="2000" dirty="0" smtClean="0">
+                <a:solidFill>
+                  <a:srgbClr val="FFC000"/>
+                </a:solidFill>
+              </a:rPr>
+              <a:t>,</a:t>
+            </a:r>
+            <a:r>
+              <a:rPr lang="pt-BR" sz="2000" dirty="0" smtClean="0"/>
+              <a:t> 3200.45</a:t>
+            </a:r>
+            <a:r>
+              <a:rPr lang="pt-BR" sz="2000" dirty="0" smtClean="0">
+                <a:solidFill>
+                  <a:srgbClr val="FFC000"/>
+                </a:solidFill>
+              </a:rPr>
+              <a:t>);</a:t>
+            </a:r>
+          </a:p>
+          <a:p>
+            <a:pPr marL="0" lvl="1" indent="0">
+              <a:spcBef>
+                <a:spcPts val="0"/>
+              </a:spcBef>
+              <a:buNone/>
+            </a:pPr>
             <a:endParaRPr lang="pt-BR" sz="2000" dirty="0" smtClean="0">
               <a:solidFill>
                 <a:srgbClr val="FFC000"/>
@@ -15128,7 +15412,7 @@
                   <a:srgbClr val="FFC000"/>
                 </a:solidFill>
               </a:rPr>
-              <a:t>setInt</a:t>
+              <a:t>executeUpdate</a:t>
             </a:r>
             <a:r>
               <a:rPr lang="pt-BR" sz="2000" dirty="0" smtClean="0">
@@ -15136,207 +15420,8 @@
                   <a:srgbClr val="FFC000"/>
                 </a:solidFill>
               </a:rPr>
-              <a:t>(</a:t>
-            </a:r>
-            <a:r>
-              <a:rPr lang="pt-BR" sz="2000" dirty="0" smtClean="0"/>
-              <a:t>1</a:t>
-            </a:r>
-            <a:r>
-              <a:rPr lang="pt-BR" sz="2000" dirty="0" smtClean="0">
-                <a:solidFill>
-                  <a:srgbClr val="FFC000"/>
-                </a:solidFill>
-              </a:rPr>
-              <a:t>,</a:t>
-            </a:r>
-            <a:r>
-              <a:rPr lang="pt-BR" sz="2000" dirty="0" smtClean="0"/>
-              <a:t> </a:t>
-            </a:r>
-            <a:r>
-              <a:rPr lang="pt-BR" sz="2000" dirty="0" smtClean="0"/>
-              <a:t>1001</a:t>
-            </a:r>
-            <a:r>
-              <a:rPr lang="pt-BR" sz="2000" dirty="0" smtClean="0">
-                <a:solidFill>
-                  <a:srgbClr val="FFC000"/>
-                </a:solidFill>
-              </a:rPr>
-              <a:t>);</a:t>
-            </a:r>
-          </a:p>
-          <a:p>
-            <a:pPr marL="0" lvl="1" indent="0">
-              <a:spcBef>
-                <a:spcPts val="0"/>
-              </a:spcBef>
-              <a:buNone/>
-            </a:pPr>
-            <a:r>
-              <a:rPr lang="pt-BR" sz="2000" dirty="0" err="1" smtClean="0">
-                <a:solidFill>
-                  <a:srgbClr val="FFC000"/>
-                </a:solidFill>
-              </a:rPr>
-              <a:t>ps.</a:t>
-            </a:r>
-            <a:r>
-              <a:rPr lang="pt-BR" sz="2000" u="sng" dirty="0" err="1" smtClean="0">
-                <a:solidFill>
-                  <a:srgbClr val="FFC000"/>
-                </a:solidFill>
-              </a:rPr>
-              <a:t>setString</a:t>
-            </a:r>
-            <a:r>
-              <a:rPr lang="pt-BR" sz="2000" dirty="0" smtClean="0">
-                <a:solidFill>
-                  <a:srgbClr val="FFC000"/>
-                </a:solidFill>
-              </a:rPr>
-              <a:t>(</a:t>
-            </a:r>
-            <a:r>
-              <a:rPr lang="pt-BR" sz="2000" dirty="0" smtClean="0"/>
-              <a:t>2</a:t>
-            </a:r>
-            <a:r>
-              <a:rPr lang="pt-BR" sz="2000" dirty="0" smtClean="0">
-                <a:solidFill>
-                  <a:srgbClr val="FFC000"/>
-                </a:solidFill>
-              </a:rPr>
-              <a:t>,</a:t>
-            </a:r>
-            <a:r>
-              <a:rPr lang="pt-BR" sz="2000" dirty="0" smtClean="0"/>
-              <a:t> “José Souza”</a:t>
-            </a:r>
-            <a:r>
-              <a:rPr lang="pt-BR" sz="2000" dirty="0" smtClean="0">
-                <a:solidFill>
-                  <a:srgbClr val="FFC000"/>
-                </a:solidFill>
-              </a:rPr>
-              <a:t>);</a:t>
-            </a:r>
-            <a:endParaRPr lang="pt-BR" sz="2000" dirty="0" smtClean="0">
-              <a:solidFill>
-                <a:srgbClr val="FFC000"/>
-              </a:solidFill>
-            </a:endParaRPr>
-          </a:p>
-          <a:p>
-            <a:pPr marL="0" lvl="1" indent="0">
-              <a:spcBef>
-                <a:spcPts val="0"/>
-              </a:spcBef>
-              <a:buNone/>
-            </a:pPr>
-            <a:r>
-              <a:rPr lang="pt-BR" sz="2000" dirty="0" err="1" smtClean="0">
-                <a:solidFill>
-                  <a:srgbClr val="FFC000"/>
-                </a:solidFill>
-              </a:rPr>
-              <a:t>ps.</a:t>
-            </a:r>
-            <a:r>
-              <a:rPr lang="pt-BR" sz="2000" u="sng" dirty="0" err="1" smtClean="0">
-                <a:solidFill>
-                  <a:srgbClr val="FFC000"/>
-                </a:solidFill>
-              </a:rPr>
-              <a:t>setDouble</a:t>
-            </a:r>
-            <a:r>
-              <a:rPr lang="pt-BR" sz="2000" dirty="0" smtClean="0">
-                <a:solidFill>
-                  <a:srgbClr val="FFC000"/>
-                </a:solidFill>
-              </a:rPr>
-              <a:t>(</a:t>
-            </a:r>
-            <a:r>
-              <a:rPr lang="pt-BR" sz="2000" dirty="0" smtClean="0"/>
-              <a:t>3</a:t>
-            </a:r>
-            <a:r>
-              <a:rPr lang="pt-BR" sz="2000" dirty="0" smtClean="0">
-                <a:solidFill>
-                  <a:srgbClr val="FFC000"/>
-                </a:solidFill>
-              </a:rPr>
-              <a:t>,</a:t>
-            </a:r>
-            <a:r>
-              <a:rPr lang="pt-BR" sz="2000" dirty="0" smtClean="0"/>
-              <a:t> </a:t>
-            </a:r>
-            <a:r>
-              <a:rPr lang="pt-BR" sz="2000" dirty="0" smtClean="0"/>
-              <a:t>3200.45</a:t>
-            </a:r>
-            <a:r>
-              <a:rPr lang="pt-BR" sz="2000" dirty="0" smtClean="0">
-                <a:solidFill>
-                  <a:srgbClr val="FFC000"/>
-                </a:solidFill>
-              </a:rPr>
-              <a:t>);</a:t>
-            </a:r>
-          </a:p>
-          <a:p>
-            <a:pPr marL="0" lvl="1" indent="0">
-              <a:spcBef>
-                <a:spcPts val="0"/>
-              </a:spcBef>
-              <a:buNone/>
-            </a:pPr>
-            <a:endParaRPr lang="pt-BR" sz="2000" dirty="0" smtClean="0">
-              <a:solidFill>
-                <a:srgbClr val="FFC000"/>
-              </a:solidFill>
-            </a:endParaRPr>
-          </a:p>
-          <a:p>
-            <a:pPr marL="0" lvl="1" indent="0">
-              <a:spcBef>
-                <a:spcPts val="0"/>
-              </a:spcBef>
-              <a:buNone/>
-            </a:pPr>
-            <a:r>
-              <a:rPr lang="pt-BR" sz="2000" dirty="0" err="1" smtClean="0">
-                <a:solidFill>
-                  <a:srgbClr val="FFC000"/>
-                </a:solidFill>
-              </a:rPr>
-              <a:t>ps.</a:t>
-            </a:r>
-            <a:r>
-              <a:rPr lang="pt-BR" sz="2000" u="sng" dirty="0" err="1" smtClean="0">
-                <a:solidFill>
-                  <a:srgbClr val="FFC000"/>
-                </a:solidFill>
-              </a:rPr>
-              <a:t>executeUpdate</a:t>
-            </a:r>
-            <a:r>
-              <a:rPr lang="pt-BR" sz="2000" dirty="0" smtClean="0">
-                <a:solidFill>
-                  <a:srgbClr val="FFC000"/>
-                </a:solidFill>
-              </a:rPr>
               <a:t>();</a:t>
             </a:r>
-            <a:endParaRPr lang="pt-BR" sz="2000" dirty="0" smtClean="0">
-              <a:solidFill>
-                <a:srgbClr val="FFC000"/>
-              </a:solidFill>
-            </a:endParaRPr>
           </a:p>
           <a:p>
             <a:pPr marL="0" lvl="1" indent="0">
@@ -16499,7 +16584,7 @@
                                 </p:cTn>
                               </p:par>
                               <p:par>
-                                <p:cTn id="35" presetID="2" presetClass="entr" presetSubtype="8" fill="hold" grpId="0" nodeType="withEffect">
+                                <p:cTn id="35" presetID="2" presetClass="entr" presetSubtype="8" fill="hold" nodeType="withEffect">
                                   <p:stCondLst>
                                     <p:cond delay="0"/>
                                   </p:stCondLst>
@@ -16682,7 +16767,6 @@
               <a:rPr lang="pt-BR" dirty="0" smtClean="0"/>
               <a:t>Exemplo 2</a:t>
             </a:r>
-            <a:endParaRPr lang="pt-BR" dirty="0" smtClean="0"/>
           </a:p>
           <a:p>
             <a:pPr marL="0" lvl="1" indent="0">
@@ -16743,15 +16827,7 @@
                   <a:srgbClr val="FFC000"/>
                 </a:solidFill>
               </a:rPr>
-              <a:t> </a:t>
-            </a:r>
-            <a:r>
-              <a:rPr lang="pt-BR" sz="2000" dirty="0" smtClean="0">
-                <a:solidFill>
-                  <a:srgbClr val="FFC000"/>
-                </a:solidFill>
-              </a:rPr>
-              <a:t>= </a:t>
+              <a:t> = </a:t>
             </a:r>
             <a:r>
               <a:rPr lang="pt-BR" sz="2000" dirty="0" err="1" smtClean="0">
@@ -16837,6 +16913,14 @@
               </a:rPr>
               <a:t>”);</a:t>
             </a:r>
+          </a:p>
+          <a:p>
+            <a:pPr marL="0" lvl="1" indent="0">
+              <a:spcBef>
+                <a:spcPts val="0"/>
+              </a:spcBef>
+              <a:buNone/>
+            </a:pPr>
             <a:endParaRPr lang="pt-BR" sz="2000" dirty="0" smtClean="0">
               <a:solidFill>
                 <a:srgbClr val="FFC000"/>
@@ -16850,11 +16934,54 @@
               </a:spcBef>
               <a:buNone/>
             </a:pPr>
-            <a:endParaRPr lang="pt-BR" sz="2000" dirty="0" smtClean="0">
-              <a:solidFill>
-                <a:srgbClr val="FFC000"/>
-              </a:solidFill>
-            </a:endParaRPr>
+            <a:r>
+              <a:rPr lang="pt-BR" sz="2000" dirty="0" err="1" smtClean="0">
+                <a:solidFill>
+                  <a:srgbClr val="FFC000"/>
+                </a:solidFill>
+              </a:rPr>
+              <a:t>ps.</a:t>
+            </a:r>
+            <a:r>
+              <a:rPr lang="pt-BR" sz="2000" u="sng" dirty="0" err="1" smtClean="0">
+                <a:solidFill>
+                  <a:srgbClr val="FFC000"/>
+                </a:solidFill>
+              </a:rPr>
+              <a:t>setDouble</a:t>
+            </a:r>
+            <a:r>
+              <a:rPr lang="pt-BR" sz="2000" dirty="0" smtClean="0">
+                <a:solidFill>
+                  <a:srgbClr val="FFC000"/>
+                </a:solidFill>
+              </a:rPr>
+              <a:t>(</a:t>
+            </a:r>
+            <a:r>
+              <a:rPr lang="pt-BR" sz="2000" dirty="0" smtClean="0"/>
+              <a:t>1</a:t>
+            </a:r>
+            <a:r>
+              <a:rPr lang="pt-BR" sz="2000" dirty="0" smtClean="0">
+                <a:solidFill>
+                  <a:srgbClr val="FFC000"/>
+                </a:solidFill>
+              </a:rPr>
+              <a:t>,</a:t>
+            </a:r>
+            <a:r>
+              <a:rPr lang="pt-BR" sz="2000" dirty="0" smtClean="0"/>
+              <a:t> 3200.45</a:t>
+            </a:r>
+            <a:r>
+              <a:rPr lang="pt-BR" sz="2000" dirty="0" smtClean="0">
+                <a:solidFill>
+                  <a:srgbClr val="FFC000"/>
+                </a:solidFill>
+              </a:rPr>
+              <a:t>);</a:t>
+            </a:r>
           </a:p>
           <a:p>
             <a:pPr marL="0" lvl="1" indent="0">
@@ -16877,7 +17004,7 @@
                   <a:srgbClr val="FFC000"/>
                 </a:solidFill>
               </a:rPr>
-              <a:t>setDouble</a:t>
+              <a:t>setInt</a:t>
             </a:r>
             <a:r>
               <a:rPr lang="pt-BR" sz="2000" dirty="0" smtClean="0">
@@ -16889,7 +17016,7 @@
             </a:r>
             <a:r>
               <a:rPr lang="pt-BR" sz="2000" dirty="0" smtClean="0"/>
-              <a:t>1</a:t>
+              <a:t>2</a:t>
             </a:r>
             <a:r>
               <a:rPr lang="pt-BR" sz="2000" dirty="0" smtClean="0">
@@ -16901,7 +17028,7 @@
             </a:r>
             <a:r>
               <a:rPr lang="pt-BR" sz="2000" dirty="0" smtClean="0"/>
-              <a:t> 3200.45</a:t>
+              <a:t> 1001</a:t>
             </a:r>
             <a:r>
               <a:rPr lang="pt-BR" sz="2000" dirty="0" smtClean="0">
@@ -16911,11 +17038,6 @@
               </a:rPr>
               <a:t>);</a:t>
             </a:r>
-            <a:endParaRPr lang="pt-BR" sz="2000" dirty="0" smtClean="0">
-              <a:solidFill>
-                <a:srgbClr val="FFC000"/>
-              </a:solidFill>
-            </a:endParaRPr>
           </a:p>
           <a:p>
             <a:pPr marL="0" lvl="1" indent="0">
@@ -16938,7 +17060,7 @@
                   <a:srgbClr val="FFC000"/>
                 </a:solidFill>
               </a:rPr>
-              <a:t>setInt</a:t>
+              <a:t>executeUpdate</a:t>
             </a:r>
             <a:r>
               <a:rPr lang="pt-BR" sz="2000" dirty="0" smtClean="0">
@@ -16946,74 +17068,8 @@
                   <a:srgbClr val="FFC000"/>
                 </a:solidFill>
               </a:rPr>
-              <a:t>(</a:t>
-            </a:r>
-            <a:r>
-              <a:rPr lang="pt-BR" sz="2000" dirty="0" smtClean="0"/>
-              <a:t>2</a:t>
-            </a:r>
-            <a:r>
-              <a:rPr lang="pt-BR" sz="2000" dirty="0" smtClean="0">
-                <a:solidFill>
-                  <a:srgbClr val="FFC000"/>
-                </a:solidFill>
-              </a:rPr>
-              <a:t>,</a:t>
-            </a:r>
-            <a:r>
-              <a:rPr lang="pt-BR" sz="2000" dirty="0" smtClean="0"/>
-              <a:t> 1001</a:t>
-            </a:r>
-            <a:r>
-              <a:rPr lang="pt-BR" sz="2000" dirty="0" smtClean="0">
-                <a:solidFill>
-                  <a:srgbClr val="FFC000"/>
-                </a:solidFill>
-              </a:rPr>
-              <a:t>);</a:t>
-            </a:r>
-            <a:endParaRPr lang="pt-BR" sz="2000" dirty="0" smtClean="0">
-              <a:solidFill>
-                <a:srgbClr val="FFC000"/>
-              </a:solidFill>
-            </a:endParaRPr>
-          </a:p>
-          <a:p>
-            <a:pPr marL="0" lvl="1" indent="0">
-              <a:spcBef>
-                <a:spcPts val="0"/>
-              </a:spcBef>
-              <a:buNone/>
-            </a:pPr>
-            <a:r>
-              <a:rPr lang="pt-BR" sz="2000" dirty="0" err="1" smtClean="0">
-                <a:solidFill>
-                  <a:srgbClr val="FFC000"/>
-                </a:solidFill>
-              </a:rPr>
-              <a:t>ps.</a:t>
-            </a:r>
-            <a:r>
-              <a:rPr lang="pt-BR" sz="2000" u="sng" dirty="0" err="1" smtClean="0">
-                <a:solidFill>
-                  <a:srgbClr val="FFC000"/>
-                </a:solidFill>
-              </a:rPr>
-              <a:t>executeUpdate</a:t>
-            </a:r>
-            <a:r>
-              <a:rPr lang="pt-BR" sz="2000" dirty="0" smtClean="0">
-                <a:solidFill>
-                  <a:srgbClr val="FFC000"/>
-                </a:solidFill>
-              </a:rPr>
               <a:t>();</a:t>
             </a:r>
-            <a:endParaRPr lang="pt-BR" sz="2000" dirty="0" smtClean="0">
-              <a:solidFill>
-                <a:srgbClr val="FFC000"/>
-              </a:solidFill>
-            </a:endParaRPr>
           </a:p>
           <a:p>
             <a:pPr marL="0" lvl="1" indent="0">
@@ -19665,7 +19721,7 @@
             <a:avLst/>
           </a:prstGeom>
           <a:noFill/>
-          <a:ln w="9525">
+          <a:ln w="28575">
             <a:solidFill>
               <a:schemeClr val="tx1"/>
             </a:solidFill>
@@ -19776,7 +19832,7 @@
             <a:avLst/>
           </a:prstGeom>
           <a:noFill/>
-          <a:ln w="9525">
+          <a:ln w="28575">
             <a:solidFill>
               <a:schemeClr val="tx1"/>
             </a:solidFill>
@@ -19834,7 +19890,7 @@
             <a:avLst/>
           </a:prstGeom>
           <a:noFill/>
-          <a:ln w="9525">
+          <a:ln w="28575">
             <a:solidFill>
               <a:schemeClr val="tx1"/>
             </a:solidFill>
@@ -19892,7 +19948,7 @@
             <a:avLst/>
           </a:prstGeom>
           <a:noFill/>
-          <a:ln w="9525">
+          <a:ln w="28575">
             <a:solidFill>
               <a:schemeClr val="tx1"/>
             </a:solidFill>
@@ -19950,7 +20006,7 @@
             <a:avLst/>
           </a:prstGeom>
           <a:noFill/>
-          <a:ln w="9525">
+          <a:ln w="28575">
             <a:solidFill>
               <a:schemeClr val="tx1"/>
             </a:solidFill>
@@ -20010,7 +20066,7 @@
             </a:avLst>
           </a:prstGeom>
           <a:noFill/>
-          <a:ln w="9525">
+          <a:ln w="28575">
             <a:solidFill>
               <a:schemeClr val="tx1"/>
             </a:solidFill>
@@ -20064,7 +20120,7 @@
             </a:avLst>
           </a:prstGeom>
           <a:noFill/>
-          <a:ln w="9525">
+          <a:ln w="28575">
             <a:solidFill>
               <a:schemeClr val="tx1"/>
             </a:solidFill>
@@ -20118,7 +20174,7 @@
             </a:avLst>
           </a:prstGeom>
           <a:noFill/>
-          <a:ln w="9525">
+          <a:ln w="28575">
             <a:solidFill>
               <a:schemeClr val="tx1"/>
             </a:solidFill>
@@ -20172,7 +20228,7 @@
             </a:avLst>
           </a:prstGeom>
           <a:noFill/>
-          <a:ln w="9525">
+          <a:ln w="28575">
             <a:solidFill>
               <a:srgbClr val="FFC000"/>
             </a:solidFill>
@@ -20224,7 +20280,7 @@
             <a:avLst/>
           </a:prstGeom>
           <a:noFill/>
-          <a:ln w="38100">
+          <a:ln w="28575">
             <a:solidFill>
               <a:schemeClr val="tx1"/>
             </a:solidFill>
@@ -20259,7 +20315,7 @@
             <a:avLst/>
           </a:prstGeom>
           <a:noFill/>
-          <a:ln w="38100">
+          <a:ln w="28575">
             <a:solidFill>
               <a:schemeClr val="tx1"/>
             </a:solidFill>
@@ -20294,7 +20350,7 @@
             <a:avLst/>
           </a:prstGeom>
           <a:noFill/>
-          <a:ln w="38100">
+          <a:ln w="28575">
             <a:solidFill>
               <a:schemeClr val="tx1"/>
             </a:solidFill>
@@ -20329,7 +20385,7 @@
             <a:avLst/>
           </a:prstGeom>
           <a:noFill/>
-          <a:ln w="38100">
+          <a:ln w="28575">
             <a:solidFill>
               <a:schemeClr val="tx1"/>
             </a:solidFill>
@@ -20364,7 +20420,7 @@
             <a:avLst/>
           </a:prstGeom>
           <a:noFill/>
-          <a:ln w="38100">
+          <a:ln w="28575">
             <a:solidFill>
               <a:schemeClr val="tx1"/>
             </a:solidFill>
@@ -20399,7 +20455,7 @@
             <a:avLst/>
           </a:prstGeom>
           <a:noFill/>
-          <a:ln w="38100">
+          <a:ln w="28575">
             <a:solidFill>
               <a:schemeClr val="tx1"/>
             </a:solidFill>
@@ -20434,7 +20490,7 @@
             <a:avLst/>
           </a:prstGeom>
           <a:noFill/>
-          <a:ln w="38100">
+          <a:ln w="28575">
             <a:solidFill>
               <a:schemeClr val="tx1"/>
             </a:solidFill>
@@ -20469,7 +20525,7 @@
             <a:avLst/>
           </a:prstGeom>
           <a:noFill/>
-          <a:ln w="38100">
+          <a:ln w="28575">
             <a:solidFill>
               <a:schemeClr val="tx1"/>
             </a:solidFill>
@@ -20504,7 +20560,7 @@
             <a:avLst/>
           </a:prstGeom>
           <a:noFill/>
-          <a:ln w="9525">
+          <a:ln w="28575">
             <a:solidFill>
               <a:srgbClr val="FFC000"/>
             </a:solidFill>
@@ -20553,7 +20609,7 @@
             <a:avLst/>
           </a:prstGeom>
           <a:noFill/>
-          <a:ln w="9525">
+          <a:ln w="28575">
             <a:solidFill>
               <a:srgbClr val="FFC000"/>
             </a:solidFill>

</xml_diff>

<commit_message>
Separação de uma nova apresentação para o projeto final. Inclusão da aplicação do projeto final.
</commit_message>
<xml_diff>
--- a/2-Java-Programmer-Modulo-II/19.Capitulo11.pptx
+++ b/2-Java-Programmer-Modulo-II/19.Capitulo11.pptx
@@ -5,7 +5,7 @@
     <p:sldMasterId id="2147483660" r:id="rId1"/>
   </p:sldMasterIdLst>
   <p:notesMasterIdLst>
-    <p:notesMasterId r:id="rId60"/>
+    <p:notesMasterId r:id="rId58"/>
   </p:notesMasterIdLst>
   <p:sldIdLst>
     <p:sldId id="256" r:id="rId2"/>
@@ -64,8 +64,6 @@
     <p:sldId id="365" r:id="rId55"/>
     <p:sldId id="366" r:id="rId56"/>
     <p:sldId id="367" r:id="rId57"/>
-    <p:sldId id="313" r:id="rId58"/>
-    <p:sldId id="314" r:id="rId59"/>
   </p:sldIdLst>
   <p:sldSz cx="9144000" cy="6858000" type="screen4x3"/>
   <p:notesSz cx="6858000" cy="9144000"/>
@@ -306,7 +304,7 @@
               <a:pPr>
                 <a:defRPr/>
               </a:pPr>
-              <a:t>11/06/2012</a:t>
+              <a:t>14/06/2012</a:t>
             </a:fld>
             <a:endParaRPr lang="pt-BR"/>
           </a:p>
@@ -5221,180 +5219,6 @@
 </p:notes>
 </file>
 
-<file path=ppt/notesSlides/notesSlide57.xml><?xml version="1.0" encoding="utf-8"?>
-<p:notes xmlns:a="http://schemas.openxmlformats.org/drawingml/2006/main" xmlns:r="http://schemas.openxmlformats.org/officeDocument/2006/relationships" xmlns:p="http://schemas.openxmlformats.org/presentationml/2006/main">
-  <p:cSld>
-    <p:spTree>
-      <p:nvGrpSpPr>
-        <p:cNvPr id="1" name=""/>
-        <p:cNvGrpSpPr/>
-        <p:nvPr/>
-      </p:nvGrpSpPr>
-      <p:grpSpPr>
-        <a:xfrm>
-          <a:off x="0" y="0"/>
-          <a:ext cx="0" cy="0"/>
-          <a:chOff x="0" y="0"/>
-          <a:chExt cx="0" cy="0"/>
-        </a:xfrm>
-      </p:grpSpPr>
-      <p:sp>
-        <p:nvSpPr>
-          <p:cNvPr id="2" name="Espaço Reservado para Imagem de Slide 1"/>
-          <p:cNvSpPr>
-            <a:spLocks noGrp="1" noRot="1" noChangeAspect="1"/>
-          </p:cNvSpPr>
-          <p:nvPr>
-            <p:ph type="sldImg"/>
-          </p:nvPr>
-        </p:nvSpPr>
-        <p:spPr/>
-      </p:sp>
-      <p:sp>
-        <p:nvSpPr>
-          <p:cNvPr id="3" name="Espaço Reservado para Anotações 2"/>
-          <p:cNvSpPr>
-            <a:spLocks noGrp="1"/>
-          </p:cNvSpPr>
-          <p:nvPr>
-            <p:ph type="body" idx="1"/>
-          </p:nvPr>
-        </p:nvSpPr>
-        <p:spPr/>
-        <p:txBody>
-          <a:bodyPr>
-            <a:normAutofit/>
-          </a:bodyPr>
-          <a:lstStyle/>
-          <a:p>
-            <a:endParaRPr lang="pt-BR"/>
-          </a:p>
-        </p:txBody>
-      </p:sp>
-      <p:sp>
-        <p:nvSpPr>
-          <p:cNvPr id="4" name="Espaço Reservado para Número de Slide 3"/>
-          <p:cNvSpPr>
-            <a:spLocks noGrp="1"/>
-          </p:cNvSpPr>
-          <p:nvPr>
-            <p:ph type="sldNum" sz="quarter" idx="10"/>
-          </p:nvPr>
-        </p:nvSpPr>
-        <p:spPr/>
-        <p:txBody>
-          <a:bodyPr/>
-          <a:lstStyle/>
-          <a:p>
-            <a:pPr>
-              <a:defRPr/>
-            </a:pPr>
-            <a:fld id="{8E95BD27-5466-443F-B42B-02049F05E6C9}" type="slidenum">
-              <a:rPr lang="pt-BR" smtClean="0"/>
-              <a:pPr>
-                <a:defRPr/>
-              </a:pPr>
-              <a:t>57</a:t>
-            </a:fld>
-            <a:endParaRPr lang="pt-BR"/>
-          </a:p>
-        </p:txBody>
-      </p:sp>
-    </p:spTree>
-  </p:cSld>
-  <p:clrMapOvr>
-    <a:masterClrMapping/>
-  </p:clrMapOvr>
-</p:notes>
-</file>
-
-<file path=ppt/notesSlides/notesSlide58.xml><?xml version="1.0" encoding="utf-8"?>
-<p:notes xmlns:a="http://schemas.openxmlformats.org/drawingml/2006/main" xmlns:r="http://schemas.openxmlformats.org/officeDocument/2006/relationships" xmlns:p="http://schemas.openxmlformats.org/presentationml/2006/main">
-  <p:cSld>
-    <p:spTree>
-      <p:nvGrpSpPr>
-        <p:cNvPr id="1" name=""/>
-        <p:cNvGrpSpPr/>
-        <p:nvPr/>
-      </p:nvGrpSpPr>
-      <p:grpSpPr>
-        <a:xfrm>
-          <a:off x="0" y="0"/>
-          <a:ext cx="0" cy="0"/>
-          <a:chOff x="0" y="0"/>
-          <a:chExt cx="0" cy="0"/>
-        </a:xfrm>
-      </p:grpSpPr>
-      <p:sp>
-        <p:nvSpPr>
-          <p:cNvPr id="2" name="Espaço Reservado para Imagem de Slide 1"/>
-          <p:cNvSpPr>
-            <a:spLocks noGrp="1" noRot="1" noChangeAspect="1"/>
-          </p:cNvSpPr>
-          <p:nvPr>
-            <p:ph type="sldImg"/>
-          </p:nvPr>
-        </p:nvSpPr>
-        <p:spPr/>
-      </p:sp>
-      <p:sp>
-        <p:nvSpPr>
-          <p:cNvPr id="3" name="Espaço Reservado para Anotações 2"/>
-          <p:cNvSpPr>
-            <a:spLocks noGrp="1"/>
-          </p:cNvSpPr>
-          <p:nvPr>
-            <p:ph type="body" idx="1"/>
-          </p:nvPr>
-        </p:nvSpPr>
-        <p:spPr/>
-        <p:txBody>
-          <a:bodyPr>
-            <a:normAutofit/>
-          </a:bodyPr>
-          <a:lstStyle/>
-          <a:p>
-            <a:endParaRPr lang="pt-BR"/>
-          </a:p>
-        </p:txBody>
-      </p:sp>
-      <p:sp>
-        <p:nvSpPr>
-          <p:cNvPr id="4" name="Espaço Reservado para Número de Slide 3"/>
-          <p:cNvSpPr>
-            <a:spLocks noGrp="1"/>
-          </p:cNvSpPr>
-          <p:nvPr>
-            <p:ph type="sldNum" sz="quarter" idx="10"/>
-          </p:nvPr>
-        </p:nvSpPr>
-        <p:spPr/>
-        <p:txBody>
-          <a:bodyPr/>
-          <a:lstStyle/>
-          <a:p>
-            <a:pPr>
-              <a:defRPr/>
-            </a:pPr>
-            <a:fld id="{8E95BD27-5466-443F-B42B-02049F05E6C9}" type="slidenum">
-              <a:rPr lang="pt-BR" smtClean="0"/>
-              <a:pPr>
-                <a:defRPr/>
-              </a:pPr>
-              <a:t>58</a:t>
-            </a:fld>
-            <a:endParaRPr lang="pt-BR"/>
-          </a:p>
-        </p:txBody>
-      </p:sp>
-    </p:spTree>
-  </p:cSld>
-  <p:clrMapOvr>
-    <a:masterClrMapping/>
-  </p:clrMapOvr>
-</p:notes>
-</file>
-
 <file path=ppt/notesSlides/notesSlide6.xml><?xml version="1.0" encoding="utf-8"?>
 <p:notes xmlns:a="http://schemas.openxmlformats.org/drawingml/2006/main" xmlns:r="http://schemas.openxmlformats.org/officeDocument/2006/relationships" xmlns:p="http://schemas.openxmlformats.org/presentationml/2006/main">
   <p:cSld>
@@ -6161,7 +5985,7 @@
               <a:pPr>
                 <a:defRPr/>
               </a:pPr>
-              <a:t>11/06/2012</a:t>
+              <a:t>14/06/2012</a:t>
             </a:fld>
             <a:endParaRPr lang="pt-BR"/>
           </a:p>
@@ -6353,7 +6177,7 @@
               <a:pPr>
                 <a:defRPr/>
               </a:pPr>
-              <a:t>11/06/2012</a:t>
+              <a:t>14/06/2012</a:t>
             </a:fld>
             <a:endParaRPr lang="pt-BR"/>
           </a:p>
@@ -6555,7 +6379,7 @@
               <a:pPr>
                 <a:defRPr/>
               </a:pPr>
-              <a:t>11/06/2012</a:t>
+              <a:t>14/06/2012</a:t>
             </a:fld>
             <a:endParaRPr lang="pt-BR"/>
           </a:p>
@@ -6751,7 +6575,7 @@
               <a:pPr>
                 <a:defRPr/>
               </a:pPr>
-              <a:t>11/06/2012</a:t>
+              <a:t>14/06/2012</a:t>
             </a:fld>
             <a:endParaRPr lang="pt-BR"/>
           </a:p>
@@ -7257,7 +7081,7 @@
               <a:pPr>
                 <a:defRPr/>
               </a:pPr>
-              <a:t>11/06/2012</a:t>
+              <a:t>14/06/2012</a:t>
             </a:fld>
             <a:endParaRPr lang="pt-BR"/>
           </a:p>
@@ -7548,7 +7372,7 @@
               <a:pPr>
                 <a:defRPr/>
               </a:pPr>
-              <a:t>11/06/2012</a:t>
+              <a:t>14/06/2012</a:t>
             </a:fld>
             <a:endParaRPr lang="pt-BR"/>
           </a:p>
@@ -7949,7 +7773,7 @@
               <a:pPr>
                 <a:defRPr/>
               </a:pPr>
-              <a:t>11/06/2012</a:t>
+              <a:t>14/06/2012</a:t>
             </a:fld>
             <a:endParaRPr lang="pt-BR"/>
           </a:p>
@@ -8098,7 +7922,7 @@
               <a:pPr>
                 <a:defRPr/>
               </a:pPr>
-              <a:t>11/06/2012</a:t>
+              <a:t>14/06/2012</a:t>
             </a:fld>
             <a:endParaRPr lang="pt-BR"/>
           </a:p>
@@ -8215,7 +8039,7 @@
               <a:pPr>
                 <a:defRPr/>
               </a:pPr>
-              <a:t>11/06/2012</a:t>
+              <a:t>14/06/2012</a:t>
             </a:fld>
             <a:endParaRPr lang="pt-BR"/>
           </a:p>
@@ -8491,7 +8315,7 @@
               <a:pPr>
                 <a:defRPr/>
               </a:pPr>
-              <a:t>11/06/2012</a:t>
+              <a:t>14/06/2012</a:t>
             </a:fld>
             <a:endParaRPr lang="pt-BR"/>
           </a:p>
@@ -8775,7 +8599,7 @@
               <a:pPr>
                 <a:defRPr/>
               </a:pPr>
-              <a:t>11/06/2012</a:t>
+              <a:t>14/06/2012</a:t>
             </a:fld>
             <a:endParaRPr lang="pt-BR"/>
           </a:p>
@@ -9253,7 +9077,7 @@
               <a:pPr>
                 <a:defRPr/>
               </a:pPr>
-              <a:t>11/06/2012</a:t>
+              <a:t>14/06/2012</a:t>
             </a:fld>
             <a:endParaRPr lang="pt-BR"/>
           </a:p>
@@ -14941,7 +14765,7 @@
             <a:spLocks noGrp="1"/>
           </p:cNvSpPr>
           <p:nvPr>
-            <p:ph sz="half" idx="1"/>
+            <p:ph idx="1"/>
           </p:nvPr>
         </p:nvSpPr>
         <p:spPr/>
@@ -14982,7 +14806,11 @@
           <a:p>
             <a:r>
               <a:rPr lang="pt-BR" dirty="0" smtClean="0"/>
-              <a:t>Operações na base de dados</a:t>
+              <a:t>Operações na base de </a:t>
+            </a:r>
+            <a:r>
+              <a:rPr lang="pt-BR" dirty="0" smtClean="0"/>
+              <a:t>dados</a:t>
             </a:r>
           </a:p>
           <a:p>
@@ -14991,22 +14819,6 @@
               <a:t>Operações parametrizadas</a:t>
             </a:r>
           </a:p>
-        </p:txBody>
-      </p:sp>
-      <p:sp>
-        <p:nvSpPr>
-          <p:cNvPr id="4" name="Espaço Reservado para Conteúdo 3"/>
-          <p:cNvSpPr>
-            <a:spLocks noGrp="1"/>
-          </p:cNvSpPr>
-          <p:nvPr>
-            <p:ph sz="half" idx="2"/>
-          </p:nvPr>
-        </p:nvSpPr>
-        <p:spPr/>
-        <p:txBody>
-          <a:bodyPr/>
-          <a:lstStyle/>
           <a:p>
             <a:r>
               <a:rPr lang="pt-BR" dirty="0" smtClean="0"/>
@@ -15035,25 +14847,7 @@
             <a:endParaRPr lang="pt-BR" dirty="0" smtClean="0"/>
           </a:p>
           <a:p>
-            <a:r>
-              <a:rPr lang="pt-BR" dirty="0" smtClean="0"/>
-              <a:t>Design </a:t>
-            </a:r>
-            <a:r>
-              <a:rPr lang="pt-BR" dirty="0" err="1" smtClean="0"/>
-              <a:t>patterns</a:t>
-            </a:r>
-            <a:r>
-              <a:rPr lang="pt-BR" dirty="0" smtClean="0"/>
-              <a:t> DAO e VO</a:t>
-            </a:r>
-          </a:p>
-          <a:p>
-            <a:r>
-              <a:rPr lang="pt-BR" dirty="0" smtClean="0"/>
-              <a:t>Projeto Final</a:t>
-            </a:r>
-            <a:endParaRPr lang="pt-BR" dirty="0"/>
+            <a:endParaRPr lang="pt-BR" dirty="0" smtClean="0"/>
           </a:p>
         </p:txBody>
       </p:sp>
@@ -37401,13 +37195,8 @@
             </a:r>
             <a:r>
               <a:rPr lang="pt-BR" sz="2400" dirty="0" smtClean="0"/>
-              <a:t> e </a:t>
-            </a:r>
-            <a:r>
-              <a:rPr lang="pt-BR" sz="2400" dirty="0" smtClean="0"/>
-              <a:t>outros permitem este tipo de recurso.</a:t>
-            </a:r>
-            <a:endParaRPr lang="pt-BR" sz="2400" dirty="0" smtClean="0"/>
+              <a:t> e outros permitem este tipo de recurso.</a:t>
+            </a:r>
           </a:p>
           <a:p>
             <a:pPr>
@@ -37433,23 +37222,7 @@
             </a:r>
             <a:r>
               <a:rPr lang="pt-BR" sz="2400" dirty="0" smtClean="0"/>
-              <a:t> pode </a:t>
-            </a:r>
-            <a:r>
-              <a:rPr lang="pt-BR" sz="2400" dirty="0" smtClean="0"/>
-              <a:t>reduzir o tráfego na rede, melhorar a </a:t>
-            </a:r>
-            <a:r>
-              <a:rPr lang="pt-BR" sz="2400" dirty="0" smtClean="0"/>
-              <a:t>performance ou </a:t>
-            </a:r>
-            <a:r>
-              <a:rPr lang="pt-BR" sz="2400" dirty="0" smtClean="0"/>
-              <a:t>criar mecanismos de </a:t>
-            </a:r>
-            <a:r>
-              <a:rPr lang="pt-BR" sz="2400" dirty="0" smtClean="0"/>
-              <a:t>segurança ao realizar alguma operação na base de dados.</a:t>
+              <a:t> pode reduzir o tráfego na rede, melhorar a performance ou criar mecanismos de segurança ao realizar alguma operação na base de dados.</a:t>
             </a:r>
           </a:p>
         </p:txBody>
@@ -37624,15 +37397,7 @@
                   <a:srgbClr val="FFC000"/>
                 </a:solidFill>
               </a:rPr>
-              <a:t>CREATE </a:t>
-            </a:r>
-            <a:r>
-              <a:rPr lang="pt-BR" sz="1800" dirty="0" smtClean="0">
-                <a:solidFill>
-                  <a:srgbClr val="FFC000"/>
-                </a:solidFill>
-              </a:rPr>
-              <a:t>PROCEDURE </a:t>
+              <a:t>CREATE PROCEDURE </a:t>
             </a:r>
             <a:r>
               <a:rPr lang="pt-BR" sz="1800" dirty="0" err="1" smtClean="0">
@@ -37685,23 +37450,7 @@
                   <a:srgbClr val="FFC000"/>
                 </a:solidFill>
               </a:rPr>
-              <a:t>	</a:t>
-            </a:r>
-            <a:r>
-              <a:rPr lang="pt-BR" sz="1800" dirty="0" smtClean="0">
-                <a:solidFill>
-                  <a:srgbClr val="FFC000"/>
-                </a:solidFill>
-              </a:rPr>
-              <a:t>DECIMAL(10,2</a:t>
-            </a:r>
-            <a:r>
-              <a:rPr lang="pt-BR" sz="1800" dirty="0" smtClean="0">
-                <a:solidFill>
-                  <a:srgbClr val="FFC000"/>
-                </a:solidFill>
-              </a:rPr>
-              <a:t>),</a:t>
+              <a:t>	DECIMAL(10,2),</a:t>
             </a:r>
           </a:p>
           <a:p>
@@ -37738,23 +37487,7 @@
                   <a:srgbClr val="FFC000"/>
                 </a:solidFill>
               </a:rPr>
-              <a:t>	</a:t>
-            </a:r>
-            <a:r>
-              <a:rPr lang="pt-BR" sz="1800" dirty="0" smtClean="0">
-                <a:solidFill>
-                  <a:srgbClr val="FFC000"/>
-                </a:solidFill>
-              </a:rPr>
-              <a:t>DOUBLE</a:t>
-            </a:r>
-            <a:r>
-              <a:rPr lang="pt-BR" sz="1800" dirty="0" smtClean="0">
-                <a:solidFill>
-                  <a:srgbClr val="FFC000"/>
-                </a:solidFill>
-              </a:rPr>
-              <a:t>,</a:t>
+              <a:t>	DOUBLE,</a:t>
             </a:r>
           </a:p>
           <a:p>
@@ -37791,23 +37524,7 @@
                   <a:srgbClr val="FFC000"/>
                 </a:solidFill>
               </a:rPr>
-              <a:t>	</a:t>
-            </a:r>
-            <a:r>
-              <a:rPr lang="pt-BR" sz="1800" dirty="0" smtClean="0">
-                <a:solidFill>
-                  <a:srgbClr val="FFC000"/>
-                </a:solidFill>
-              </a:rPr>
-              <a:t>INTEGER</a:t>
-            </a:r>
-            <a:r>
-              <a:rPr lang="pt-BR" sz="1800" dirty="0" smtClean="0">
-                <a:solidFill>
-                  <a:srgbClr val="FFC000"/>
-                </a:solidFill>
-              </a:rPr>
-              <a:t>,</a:t>
+              <a:t>	INTEGER,</a:t>
             </a:r>
           </a:p>
           <a:p>
@@ -37844,23 +37561,7 @@
                   <a:srgbClr val="FFC000"/>
                 </a:solidFill>
               </a:rPr>
-              <a:t>	</a:t>
-            </a:r>
-            <a:r>
-              <a:rPr lang="pt-BR" sz="1800" dirty="0" smtClean="0">
-                <a:solidFill>
-                  <a:srgbClr val="FFC000"/>
-                </a:solidFill>
-              </a:rPr>
-              <a:t>DECIMAL(10,2</a:t>
-            </a:r>
-            <a:r>
-              <a:rPr lang="pt-BR" sz="1800" dirty="0" smtClean="0">
-                <a:solidFill>
-                  <a:srgbClr val="FFC000"/>
-                </a:solidFill>
-              </a:rPr>
-              <a:t>))</a:t>
+              <a:t>	DECIMAL(10,2))</a:t>
             </a:r>
           </a:p>
           <a:p>
@@ -37902,15 +37603,7 @@
                   <a:srgbClr val="FFC000"/>
                 </a:solidFill>
               </a:rPr>
-              <a:t>	... </a:t>
-            </a:r>
-            <a:r>
-              <a:rPr lang="pt-BR" sz="1800" dirty="0" smtClean="0">
-                <a:solidFill>
-                  <a:srgbClr val="FFC000"/>
-                </a:solidFill>
-              </a:rPr>
-              <a:t>...</a:t>
+              <a:t>	... ...</a:t>
             </a:r>
           </a:p>
           <a:p>
@@ -37952,15 +37645,7 @@
                   <a:srgbClr val="FFC000"/>
                 </a:solidFill>
               </a:rPr>
-              <a:t>	...</a:t>
-            </a:r>
-            <a:r>
-              <a:rPr lang="pt-BR" sz="1800" dirty="0" smtClean="0">
-                <a:solidFill>
-                  <a:srgbClr val="FFC000"/>
-                </a:solidFill>
-              </a:rPr>
-              <a:t> ...</a:t>
+              <a:t>	... ...</a:t>
             </a:r>
           </a:p>
           <a:p>
@@ -37983,11 +37668,6 @@
               </a:rPr>
               <a:t>END;</a:t>
             </a:r>
-            <a:endParaRPr lang="pt-BR" sz="1800" dirty="0" smtClean="0">
-              <a:solidFill>
-                <a:srgbClr val="FFC000"/>
-              </a:solidFill>
-            </a:endParaRPr>
           </a:p>
         </p:txBody>
       </p:sp>
@@ -39732,11 +39412,7 @@
             </a:r>
             <a:r>
               <a:rPr lang="pt-BR" sz="2200" dirty="0" smtClean="0"/>
-              <a:t> </a:t>
-            </a:r>
-            <a:r>
-              <a:rPr lang="pt-BR" sz="2200" dirty="0" smtClean="0"/>
-              <a:t>utilizamos o método </a:t>
+              <a:t> utilizamos o método </a:t>
             </a:r>
             <a:r>
               <a:rPr lang="pt-BR" sz="2200" i="1" u="sng" dirty="0" err="1" smtClean="0"/>
@@ -39777,7 +39453,6 @@
               <a:rPr lang="pt-BR" sz="2200" dirty="0" smtClean="0"/>
               <a:t> desejada:</a:t>
             </a:r>
-            <a:endParaRPr lang="pt-BR" sz="2200" dirty="0" smtClean="0"/>
           </a:p>
           <a:p>
             <a:pPr marL="442913" indent="0">
@@ -40067,11 +39742,7 @@
             <a:pPr algn="ctr"/>
             <a:r>
               <a:rPr lang="pt-BR" sz="1600" b="1" dirty="0" smtClean="0"/>
-              <a:t>Par</a:t>
-            </a:r>
-            <a:r>
-              <a:rPr lang="pt-BR" sz="1600" b="1" dirty="0" smtClean="0"/>
-              <a:t>âmetros</a:t>
+              <a:t>Parâmetros</a:t>
             </a:r>
             <a:endParaRPr lang="pt-BR" sz="1600" b="1" dirty="0"/>
           </a:p>
@@ -40273,7 +39944,6 @@
               <a:rPr lang="pt-BR" sz="2200" dirty="0" smtClean="0"/>
               <a:t> conforme seu tipo, inserindo os valores desejados:</a:t>
             </a:r>
-            <a:endParaRPr lang="pt-BR" sz="2200" dirty="0" smtClean="0"/>
           </a:p>
           <a:p>
             <a:pPr marL="442913" indent="0">
@@ -40342,11 +40012,6 @@
               </a:rPr>
               <a:t>/* Parâmetro 1 */</a:t>
             </a:r>
-            <a:endParaRPr lang="pt-BR" sz="2200" dirty="0" smtClean="0">
-              <a:solidFill>
-                <a:schemeClr val="accent6"/>
-              </a:solidFill>
-            </a:endParaRPr>
           </a:p>
           <a:p>
             <a:pPr marL="1620838" indent="0">
@@ -40406,11 +40071,6 @@
               </a:rPr>
               <a:t>/* Parâmetro 2 */</a:t>
             </a:r>
-            <a:endParaRPr lang="pt-BR" sz="2200" dirty="0" smtClean="0">
-              <a:solidFill>
-                <a:schemeClr val="accent6"/>
-              </a:solidFill>
-            </a:endParaRPr>
           </a:p>
           <a:p>
             <a:pPr marL="1620838" indent="0">
@@ -40448,11 +40108,7 @@
             </a:r>
             <a:r>
               <a:rPr lang="pt-BR" sz="2200" dirty="0" smtClean="0"/>
-              <a:t>3, 2</a:t>
-            </a:r>
-            <a:r>
-              <a:rPr lang="pt-BR" sz="2200" dirty="0" smtClean="0"/>
-              <a:t>);	</a:t>
+              <a:t>3, 2);	</a:t>
             </a:r>
             <a:r>
               <a:rPr lang="pt-BR" sz="2200" dirty="0" smtClean="0">
@@ -40462,11 +40118,6 @@
               </a:rPr>
               <a:t>/* Parâmetro 3 */</a:t>
             </a:r>
-            <a:endParaRPr lang="pt-BR" sz="2200" dirty="0" smtClean="0">
-              <a:solidFill>
-                <a:schemeClr val="accent6"/>
-              </a:solidFill>
-            </a:endParaRPr>
           </a:p>
         </p:txBody>
       </p:sp>
@@ -40659,7 +40310,6 @@
               <a:rPr lang="pt-BR" sz="2200" dirty="0" smtClean="0"/>
               <a:t>:</a:t>
             </a:r>
-            <a:endParaRPr lang="pt-BR" sz="2200" dirty="0" smtClean="0"/>
           </a:p>
           <a:p>
             <a:pPr marL="442913" indent="0">
@@ -40740,29 +40390,8 @@
                   <a:schemeClr val="accent6"/>
                 </a:solidFill>
               </a:rPr>
-              <a:t>/* Parâmetro </a:t>
-            </a:r>
-            <a:r>
-              <a:rPr lang="pt-BR" sz="2200" dirty="0" smtClean="0">
-                <a:solidFill>
-                  <a:schemeClr val="accent6"/>
-                </a:solidFill>
-              </a:rPr>
-              <a:t>4</a:t>
-            </a:r>
-            <a:r>
-              <a:rPr lang="pt-BR" sz="2200" dirty="0" smtClean="0">
-                <a:solidFill>
-                  <a:schemeClr val="accent6"/>
-                </a:solidFill>
-              </a:rPr>
-              <a:t> */</a:t>
-            </a:r>
-            <a:endParaRPr lang="pt-BR" sz="2200" dirty="0" smtClean="0">
-              <a:solidFill>
-                <a:schemeClr val="accent6"/>
-              </a:solidFill>
-            </a:endParaRPr>
+              <a:t>/* Parâmetro 4 */</a:t>
+            </a:r>
           </a:p>
         </p:txBody>
       </p:sp>
@@ -40939,7 +40568,6 @@
               <a:rPr lang="pt-BR" sz="2200" dirty="0" smtClean="0"/>
               <a:t>, podemos recolher os valores de retorno provenientes dos parâmetros de saída</a:t>
             </a:r>
-            <a:endParaRPr lang="pt-BR" sz="2200" dirty="0" smtClean="0"/>
           </a:p>
           <a:p>
             <a:pPr marL="442913" indent="0">
@@ -41373,11 +41001,7 @@
             </a:pPr>
             <a:r>
               <a:rPr lang="it-IT" sz="2000" dirty="0" smtClean="0"/>
-              <a:t>CREATE </a:t>
-            </a:r>
-            <a:r>
-              <a:rPr lang="it-IT" sz="2000" dirty="0" smtClean="0"/>
-              <a:t>PROCEDURE </a:t>
+              <a:t>CREATE PROCEDURE </a:t>
             </a:r>
             <a:r>
               <a:rPr lang="it-IT" sz="2000" dirty="0" smtClean="0">
@@ -41406,11 +41030,7 @@
             </a:pPr>
             <a:r>
               <a:rPr lang="it-IT" sz="2000" dirty="0" smtClean="0"/>
-              <a:t>	</a:t>
-            </a:r>
-            <a:r>
-              <a:rPr lang="it-IT" sz="2000" dirty="0" smtClean="0"/>
-              <a:t>IN	</a:t>
+              <a:t>	IN	</a:t>
             </a:r>
             <a:r>
               <a:rPr lang="it-IT" sz="2000" dirty="0" smtClean="0">
@@ -41439,27 +41059,19 @@
             </a:pPr>
             <a:r>
               <a:rPr lang="it-IT" sz="2000" dirty="0" smtClean="0"/>
-              <a:t>	</a:t>
+              <a:t>	OUT	</a:t>
+            </a:r>
+            <a:r>
+              <a:rPr lang="it-IT" sz="2000" dirty="0" smtClean="0">
+                <a:solidFill>
+                  <a:srgbClr val="FFC000"/>
+                </a:solidFill>
+              </a:rPr>
+              <a:t>p_descricao</a:t>
             </a:r>
             <a:r>
               <a:rPr lang="it-IT" sz="2000" dirty="0" smtClean="0"/>
-              <a:t>OUT	</a:t>
-            </a:r>
-            <a:r>
-              <a:rPr lang="it-IT" sz="2000" dirty="0" smtClean="0">
-                <a:solidFill>
-                  <a:srgbClr val="FFC000"/>
-                </a:solidFill>
-              </a:rPr>
-              <a:t>p_descricao</a:t>
-            </a:r>
-            <a:r>
-              <a:rPr lang="it-IT" sz="2000" dirty="0" smtClean="0"/>
-              <a:t>	VARCHAR(100</a:t>
-            </a:r>
-            <a:r>
-              <a:rPr lang="it-IT" sz="2000" dirty="0" smtClean="0"/>
-              <a:t>))</a:t>
+              <a:t>	VARCHAR(100))</a:t>
             </a:r>
             <a:endParaRPr lang="pt-BR" sz="2000" dirty="0" smtClean="0"/>
           </a:p>
@@ -41719,222 +41331,6 @@
                 <a:defRPr/>
               </a:pPr>
               <a:t>56</a:t>
-            </a:fld>
-            <a:endParaRPr lang="pt-BR"/>
-          </a:p>
-        </p:txBody>
-      </p:sp>
-    </p:spTree>
-  </p:cSld>
-  <p:clrMapOvr>
-    <a:masterClrMapping/>
-  </p:clrMapOvr>
-  <p:timing>
-    <p:tnLst>
-      <p:par>
-        <p:cTn id="1" dur="indefinite" restart="never" nodeType="tmRoot"/>
-      </p:par>
-    </p:tnLst>
-  </p:timing>
-</p:sld>
-</file>
-
-<file path=ppt/slides/slide57.xml><?xml version="1.0" encoding="utf-8"?>
-<p:sld xmlns:a="http://schemas.openxmlformats.org/drawingml/2006/main" xmlns:r="http://schemas.openxmlformats.org/officeDocument/2006/relationships" xmlns:p="http://schemas.openxmlformats.org/presentationml/2006/main">
-  <p:cSld>
-    <p:spTree>
-      <p:nvGrpSpPr>
-        <p:cNvPr id="1" name=""/>
-        <p:cNvGrpSpPr/>
-        <p:nvPr/>
-      </p:nvGrpSpPr>
-      <p:grpSpPr>
-        <a:xfrm>
-          <a:off x="0" y="0"/>
-          <a:ext cx="0" cy="0"/>
-          <a:chOff x="0" y="0"/>
-          <a:chExt cx="0" cy="0"/>
-        </a:xfrm>
-      </p:grpSpPr>
-      <p:sp>
-        <p:nvSpPr>
-          <p:cNvPr id="2" name="Título 1"/>
-          <p:cNvSpPr>
-            <a:spLocks noGrp="1"/>
-          </p:cNvSpPr>
-          <p:nvPr>
-            <p:ph type="title"/>
-          </p:nvPr>
-        </p:nvSpPr>
-        <p:spPr/>
-        <p:txBody>
-          <a:bodyPr/>
-          <a:lstStyle/>
-          <a:p>
-            <a:pPr eaLnBrk="1" hangingPunct="1"/>
-            <a:r>
-              <a:rPr lang="pt-BR" dirty="0" smtClean="0"/>
-              <a:t>Design </a:t>
-            </a:r>
-            <a:r>
-              <a:rPr lang="pt-BR" dirty="0" err="1" smtClean="0"/>
-              <a:t>pattern</a:t>
-            </a:r>
-            <a:r>
-              <a:rPr lang="pt-BR" dirty="0" smtClean="0"/>
-              <a:t> DAO/VO</a:t>
-            </a:r>
-            <a:endParaRPr lang="pt-BR" dirty="0"/>
-          </a:p>
-        </p:txBody>
-      </p:sp>
-      <p:sp>
-        <p:nvSpPr>
-          <p:cNvPr id="3" name="Espaço Reservado para Conteúdo 2"/>
-          <p:cNvSpPr>
-            <a:spLocks noGrp="1"/>
-          </p:cNvSpPr>
-          <p:nvPr>
-            <p:ph idx="1"/>
-          </p:nvPr>
-        </p:nvSpPr>
-        <p:spPr/>
-        <p:txBody>
-          <a:bodyPr/>
-          <a:lstStyle/>
-          <a:p>
-            <a:endParaRPr lang="pt-BR"/>
-          </a:p>
-        </p:txBody>
-      </p:sp>
-      <p:sp>
-        <p:nvSpPr>
-          <p:cNvPr id="4" name="Espaço Reservado para Número de Slide 3"/>
-          <p:cNvSpPr>
-            <a:spLocks noGrp="1"/>
-          </p:cNvSpPr>
-          <p:nvPr>
-            <p:ph type="sldNum" sz="quarter" idx="12"/>
-          </p:nvPr>
-        </p:nvSpPr>
-        <p:spPr/>
-        <p:txBody>
-          <a:bodyPr/>
-          <a:lstStyle/>
-          <a:p>
-            <a:pPr>
-              <a:defRPr/>
-            </a:pPr>
-            <a:fld id="{EF19A0F5-F849-4C78-8624-C3A50979DE44}" type="slidenum">
-              <a:rPr lang="pt-BR" smtClean="0"/>
-              <a:pPr>
-                <a:defRPr/>
-              </a:pPr>
-              <a:t>57</a:t>
-            </a:fld>
-            <a:endParaRPr lang="pt-BR"/>
-          </a:p>
-        </p:txBody>
-      </p:sp>
-    </p:spTree>
-  </p:cSld>
-  <p:clrMapOvr>
-    <a:masterClrMapping/>
-  </p:clrMapOvr>
-  <p:timing>
-    <p:tnLst>
-      <p:par>
-        <p:cTn id="1" dur="indefinite" restart="never" nodeType="tmRoot"/>
-      </p:par>
-    </p:tnLst>
-  </p:timing>
-</p:sld>
-</file>
-
-<file path=ppt/slides/slide58.xml><?xml version="1.0" encoding="utf-8"?>
-<p:sld xmlns:a="http://schemas.openxmlformats.org/drawingml/2006/main" xmlns:r="http://schemas.openxmlformats.org/officeDocument/2006/relationships" xmlns:p="http://schemas.openxmlformats.org/presentationml/2006/main">
-  <p:cSld>
-    <p:spTree>
-      <p:nvGrpSpPr>
-        <p:cNvPr id="1" name=""/>
-        <p:cNvGrpSpPr/>
-        <p:nvPr/>
-      </p:nvGrpSpPr>
-      <p:grpSpPr>
-        <a:xfrm>
-          <a:off x="0" y="0"/>
-          <a:ext cx="0" cy="0"/>
-          <a:chOff x="0" y="0"/>
-          <a:chExt cx="0" cy="0"/>
-        </a:xfrm>
-      </p:grpSpPr>
-      <p:sp>
-        <p:nvSpPr>
-          <p:cNvPr id="2" name="Título 1"/>
-          <p:cNvSpPr>
-            <a:spLocks noGrp="1"/>
-          </p:cNvSpPr>
-          <p:nvPr>
-            <p:ph type="title"/>
-          </p:nvPr>
-        </p:nvSpPr>
-        <p:spPr/>
-        <p:txBody>
-          <a:bodyPr/>
-          <a:lstStyle/>
-          <a:p>
-            <a:pPr eaLnBrk="1" hangingPunct="1"/>
-            <a:r>
-              <a:rPr lang="pt-BR" dirty="0" smtClean="0"/>
-              <a:t>Projeto Final</a:t>
-            </a:r>
-            <a:endParaRPr lang="pt-BR" dirty="0"/>
-          </a:p>
-        </p:txBody>
-      </p:sp>
-      <p:sp>
-        <p:nvSpPr>
-          <p:cNvPr id="3" name="Espaço Reservado para Conteúdo 2"/>
-          <p:cNvSpPr>
-            <a:spLocks noGrp="1"/>
-          </p:cNvSpPr>
-          <p:nvPr>
-            <p:ph idx="1"/>
-          </p:nvPr>
-        </p:nvSpPr>
-        <p:spPr/>
-        <p:txBody>
-          <a:bodyPr/>
-          <a:lstStyle/>
-          <a:p>
-            <a:endParaRPr lang="pt-BR"/>
-          </a:p>
-        </p:txBody>
-      </p:sp>
-      <p:sp>
-        <p:nvSpPr>
-          <p:cNvPr id="4" name="Espaço Reservado para Número de Slide 3"/>
-          <p:cNvSpPr>
-            <a:spLocks noGrp="1"/>
-          </p:cNvSpPr>
-          <p:nvPr>
-            <p:ph type="sldNum" sz="quarter" idx="12"/>
-          </p:nvPr>
-        </p:nvSpPr>
-        <p:spPr/>
-        <p:txBody>
-          <a:bodyPr/>
-          <a:lstStyle/>
-          <a:p>
-            <a:pPr>
-              <a:defRPr/>
-            </a:pPr>
-            <a:fld id="{EF19A0F5-F849-4C78-8624-C3A50979DE44}" type="slidenum">
-              <a:rPr lang="pt-BR" smtClean="0"/>
-              <a:pPr>
-                <a:defRPr/>
-              </a:pPr>
-              <a:t>58</a:t>
             </a:fld>
             <a:endParaRPr lang="pt-BR"/>
           </a:p>

</xml_diff>